<commit_message>
new Endpoint for get Products info in cart
</commit_message>
<xml_diff>
--- a/Docs/API/product.pptx
+++ b/Docs/API/product.pptx
@@ -7,6 +7,9 @@
   <p:sldIdLst>
     <p:sldId id="256" r:id="rId2"/>
     <p:sldId id="257" r:id="rId3"/>
+    <p:sldId id="258" r:id="rId4"/>
+    <p:sldId id="259" r:id="rId5"/>
+    <p:sldId id="260" r:id="rId6"/>
   </p:sldIdLst>
   <p:sldSz cx="12192000" cy="6858000"/>
   <p:notesSz cx="6858000" cy="9144000"/>
@@ -105,6 +108,11 @@
       </a:defRPr>
     </a:lvl9pPr>
   </p:defaultTextStyle>
+  <p:extLst>
+    <p:ext uri="{EFAFB233-063F-42B5-8137-9DF3F51BA10A}">
+      <p15:sldGuideLst xmlns:p15="http://schemas.microsoft.com/office/powerpoint/2012/main"/>
+    </p:ext>
+  </p:extLst>
 </p:presentation>
 </file>
 
@@ -337,7 +345,7 @@
           <a:p>
             <a:fld id="{D8A0B6F2-4A3A-46BF-8B98-B658E741CCB2}" type="datetimeFigureOut">
               <a:rPr lang="en-IN" smtClean="0"/>
-              <a:t>25-08-2020</a:t>
+              <a:t>31-08-2020</a:t>
             </a:fld>
             <a:endParaRPr lang="en-IN"/>
           </a:p>
@@ -671,7 +679,7 @@
           <a:p>
             <a:fld id="{D8A0B6F2-4A3A-46BF-8B98-B658E741CCB2}" type="datetimeFigureOut">
               <a:rPr lang="en-IN" smtClean="0"/>
-              <a:t>25-08-2020</a:t>
+              <a:t>31-08-2020</a:t>
             </a:fld>
             <a:endParaRPr lang="en-IN"/>
           </a:p>
@@ -949,7 +957,7 @@
           <a:p>
             <a:fld id="{D8A0B6F2-4A3A-46BF-8B98-B658E741CCB2}" type="datetimeFigureOut">
               <a:rPr lang="en-IN" smtClean="0"/>
-              <a:t>25-08-2020</a:t>
+              <a:t>31-08-2020</a:t>
             </a:fld>
             <a:endParaRPr lang="en-IN"/>
           </a:p>
@@ -1517,7 +1525,7 @@
           <a:p>
             <a:fld id="{D8A0B6F2-4A3A-46BF-8B98-B658E741CCB2}" type="datetimeFigureOut">
               <a:rPr lang="en-IN" smtClean="0"/>
-              <a:t>25-08-2020</a:t>
+              <a:t>31-08-2020</a:t>
             </a:fld>
             <a:endParaRPr lang="en-IN"/>
           </a:p>
@@ -1795,7 +1803,7 @@
           <a:p>
             <a:fld id="{D8A0B6F2-4A3A-46BF-8B98-B658E741CCB2}" type="datetimeFigureOut">
               <a:rPr lang="en-IN" smtClean="0"/>
-              <a:t>25-08-2020</a:t>
+              <a:t>31-08-2020</a:t>
             </a:fld>
             <a:endParaRPr lang="en-IN"/>
           </a:p>
@@ -2357,7 +2365,7 @@
           <a:p>
             <a:fld id="{D8A0B6F2-4A3A-46BF-8B98-B658E741CCB2}" type="datetimeFigureOut">
               <a:rPr lang="en-IN" smtClean="0"/>
-              <a:t>25-08-2020</a:t>
+              <a:t>31-08-2020</a:t>
             </a:fld>
             <a:endParaRPr lang="en-IN"/>
           </a:p>
@@ -2684,7 +2692,7 @@
           <a:p>
             <a:fld id="{D8A0B6F2-4A3A-46BF-8B98-B658E741CCB2}" type="datetimeFigureOut">
               <a:rPr lang="en-IN" smtClean="0"/>
-              <a:t>25-08-2020</a:t>
+              <a:t>31-08-2020</a:t>
             </a:fld>
             <a:endParaRPr lang="en-IN"/>
           </a:p>
@@ -2861,7 +2869,7 @@
           <a:p>
             <a:fld id="{D8A0B6F2-4A3A-46BF-8B98-B658E741CCB2}" type="datetimeFigureOut">
               <a:rPr lang="en-IN" smtClean="0"/>
-              <a:t>25-08-2020</a:t>
+              <a:t>31-08-2020</a:t>
             </a:fld>
             <a:endParaRPr lang="en-IN"/>
           </a:p>
@@ -3099,7 +3107,7 @@
           <a:p>
             <a:fld id="{D8A0B6F2-4A3A-46BF-8B98-B658E741CCB2}" type="datetimeFigureOut">
               <a:rPr lang="en-IN" smtClean="0"/>
-              <a:t>25-08-2020</a:t>
+              <a:t>31-08-2020</a:t>
             </a:fld>
             <a:endParaRPr lang="en-IN"/>
           </a:p>
@@ -3299,7 +3307,7 @@
           <a:p>
             <a:fld id="{D8A0B6F2-4A3A-46BF-8B98-B658E741CCB2}" type="datetimeFigureOut">
               <a:rPr lang="en-IN" smtClean="0"/>
-              <a:t>25-08-2020</a:t>
+              <a:t>31-08-2020</a:t>
             </a:fld>
             <a:endParaRPr lang="en-IN"/>
           </a:p>
@@ -3575,7 +3583,7 @@
           <a:p>
             <a:fld id="{D8A0B6F2-4A3A-46BF-8B98-B658E741CCB2}" type="datetimeFigureOut">
               <a:rPr lang="en-IN" smtClean="0"/>
-              <a:t>25-08-2020</a:t>
+              <a:t>31-08-2020</a:t>
             </a:fld>
             <a:endParaRPr lang="en-IN"/>
           </a:p>
@@ -3841,7 +3849,7 @@
           <a:p>
             <a:fld id="{D8A0B6F2-4A3A-46BF-8B98-B658E741CCB2}" type="datetimeFigureOut">
               <a:rPr lang="en-IN" smtClean="0"/>
-              <a:t>25-08-2020</a:t>
+              <a:t>31-08-2020</a:t>
             </a:fld>
             <a:endParaRPr lang="en-IN"/>
           </a:p>
@@ -4215,7 +4223,7 @@
           <a:p>
             <a:fld id="{D8A0B6F2-4A3A-46BF-8B98-B658E741CCB2}" type="datetimeFigureOut">
               <a:rPr lang="en-IN" smtClean="0"/>
-              <a:t>25-08-2020</a:t>
+              <a:t>31-08-2020</a:t>
             </a:fld>
             <a:endParaRPr lang="en-IN"/>
           </a:p>
@@ -4363,7 +4371,7 @@
           <a:p>
             <a:fld id="{D8A0B6F2-4A3A-46BF-8B98-B658E741CCB2}" type="datetimeFigureOut">
               <a:rPr lang="en-IN" smtClean="0"/>
-              <a:t>25-08-2020</a:t>
+              <a:t>31-08-2020</a:t>
             </a:fld>
             <a:endParaRPr lang="en-IN"/>
           </a:p>
@@ -4488,7 +4496,7 @@
           <a:p>
             <a:fld id="{D8A0B6F2-4A3A-46BF-8B98-B658E741CCB2}" type="datetimeFigureOut">
               <a:rPr lang="en-IN" smtClean="0"/>
-              <a:t>25-08-2020</a:t>
+              <a:t>31-08-2020</a:t>
             </a:fld>
             <a:endParaRPr lang="en-IN"/>
           </a:p>
@@ -4773,7 +4781,7 @@
           <a:p>
             <a:fld id="{D8A0B6F2-4A3A-46BF-8B98-B658E741CCB2}" type="datetimeFigureOut">
               <a:rPr lang="en-IN" smtClean="0"/>
-              <a:t>25-08-2020</a:t>
+              <a:t>31-08-2020</a:t>
             </a:fld>
             <a:endParaRPr lang="en-IN"/>
           </a:p>
@@ -5097,7 +5105,7 @@
           <a:p>
             <a:fld id="{D8A0B6F2-4A3A-46BF-8B98-B658E741CCB2}" type="datetimeFigureOut">
               <a:rPr lang="en-IN" smtClean="0"/>
-              <a:t>25-08-2020</a:t>
+              <a:t>31-08-2020</a:t>
             </a:fld>
             <a:endParaRPr lang="en-IN"/>
           </a:p>
@@ -5311,7 +5319,7 @@
           <a:p>
             <a:fld id="{D8A0B6F2-4A3A-46BF-8B98-B658E741CCB2}" type="datetimeFigureOut">
               <a:rPr lang="en-IN" smtClean="0"/>
-              <a:t>25-08-2020</a:t>
+              <a:t>31-08-2020</a:t>
             </a:fld>
             <a:endParaRPr lang="en-IN"/>
           </a:p>
@@ -5965,7 +5973,15 @@
           <a:p>
             <a:r>
               <a:rPr lang="en-US" dirty="0"/>
-              <a:t>Get All Product Categories</a:t>
+              <a:t>Get All Product Categories (</a:t>
+            </a:r>
+            <a:r>
+              <a:rPr lang="en-US" sz="2200" cap="none" dirty="0"/>
+              <a:t>Method : GET</a:t>
+            </a:r>
+            <a:r>
+              <a:rPr lang="en-US" dirty="0"/>
+              <a:t>)</a:t>
             </a:r>
             <a:endParaRPr lang="en-IN" dirty="0"/>
           </a:p>
@@ -6593,6 +6609,2484 @@
     <p:extLst>
       <p:ext uri="{BB962C8B-B14F-4D97-AF65-F5344CB8AC3E}">
         <p14:creationId xmlns:p14="http://schemas.microsoft.com/office/powerpoint/2010/main" val="1715222015"/>
+      </p:ext>
+    </p:extLst>
+  </p:cSld>
+  <p:clrMapOvr>
+    <a:masterClrMapping/>
+  </p:clrMapOvr>
+</p:sld>
+</file>
+
+<file path=ppt/slides/slide3.xml><?xml version="1.0" encoding="utf-8"?>
+<p:sld xmlns:a="http://schemas.openxmlformats.org/drawingml/2006/main" xmlns:r="http://schemas.openxmlformats.org/officeDocument/2006/relationships" xmlns:p="http://schemas.openxmlformats.org/presentationml/2006/main">
+  <p:cSld>
+    <p:spTree>
+      <p:nvGrpSpPr>
+        <p:cNvPr id="1" name=""/>
+        <p:cNvGrpSpPr/>
+        <p:nvPr/>
+      </p:nvGrpSpPr>
+      <p:grpSpPr>
+        <a:xfrm>
+          <a:off x="0" y="0"/>
+          <a:ext cx="0" cy="0"/>
+          <a:chOff x="0" y="0"/>
+          <a:chExt cx="0" cy="0"/>
+        </a:xfrm>
+      </p:grpSpPr>
+      <p:sp>
+        <p:nvSpPr>
+          <p:cNvPr id="2" name="Title 1">
+            <a:extLst>
+              <a:ext uri="{FF2B5EF4-FFF2-40B4-BE49-F238E27FC236}">
+                <a16:creationId xmlns:a16="http://schemas.microsoft.com/office/drawing/2014/main" id="{267734D0-072E-4A3D-B846-797B7EB3D892}"/>
+              </a:ext>
+            </a:extLst>
+          </p:cNvPr>
+          <p:cNvSpPr>
+            <a:spLocks noGrp="1"/>
+          </p:cNvSpPr>
+          <p:nvPr>
+            <p:ph type="title"/>
+          </p:nvPr>
+        </p:nvSpPr>
+        <p:spPr>
+          <a:xfrm>
+            <a:off x="0" y="0"/>
+            <a:ext cx="8731154" cy="727881"/>
+          </a:xfrm>
+        </p:spPr>
+        <p:txBody>
+          <a:bodyPr/>
+          <a:lstStyle/>
+          <a:p>
+            <a:r>
+              <a:rPr lang="en-US" dirty="0"/>
+              <a:t>GET ALL PRODUCTS (</a:t>
+            </a:r>
+            <a:r>
+              <a:rPr lang="en-US" sz="2800" cap="none" dirty="0"/>
+              <a:t>Method : GET</a:t>
+            </a:r>
+            <a:r>
+              <a:rPr lang="en-US" dirty="0"/>
+              <a:t>)</a:t>
+            </a:r>
+            <a:endParaRPr lang="en-IN" dirty="0"/>
+          </a:p>
+        </p:txBody>
+      </p:sp>
+      <p:sp>
+        <p:nvSpPr>
+          <p:cNvPr id="3" name="Content Placeholder 2">
+            <a:extLst>
+              <a:ext uri="{FF2B5EF4-FFF2-40B4-BE49-F238E27FC236}">
+                <a16:creationId xmlns:a16="http://schemas.microsoft.com/office/drawing/2014/main" id="{BDF299CE-768A-4D0E-9FDD-67661287E395}"/>
+              </a:ext>
+            </a:extLst>
+          </p:cNvPr>
+          <p:cNvSpPr>
+            <a:spLocks noGrp="1"/>
+          </p:cNvSpPr>
+          <p:nvPr>
+            <p:ph idx="1"/>
+          </p:nvPr>
+        </p:nvSpPr>
+        <p:spPr>
+          <a:xfrm>
+            <a:off x="109182" y="600501"/>
+            <a:ext cx="11982733" cy="6155141"/>
+          </a:xfrm>
+        </p:spPr>
+        <p:txBody>
+          <a:bodyPr>
+            <a:normAutofit/>
+          </a:bodyPr>
+          <a:lstStyle/>
+          <a:p>
+            <a:r>
+              <a:rPr lang="en-US" dirty="0"/>
+              <a:t>API Endpoint : </a:t>
+            </a:r>
+            <a:r>
+              <a:rPr lang="en-IN" dirty="0">
+                <a:hlinkClick r:id="rId2"/>
+              </a:rPr>
+              <a:t>https://lexa-api.uc.r.appspot.com</a:t>
+            </a:r>
+            <a:r>
+              <a:rPr lang="en-IN" b="0" i="0" dirty="0">
+                <a:solidFill>
+                  <a:srgbClr val="F0F0F0"/>
+                </a:solidFill>
+                <a:effectLst/>
+                <a:latin typeface="OpenSans"/>
+                <a:hlinkClick r:id="rId2"/>
+              </a:rPr>
+              <a:t>/product/getProducts</a:t>
+            </a:r>
+            <a:endParaRPr lang="en-IN" b="0" i="0" dirty="0">
+              <a:solidFill>
+                <a:srgbClr val="F0F0F0"/>
+              </a:solidFill>
+              <a:effectLst/>
+              <a:latin typeface="OpenSans"/>
+            </a:endParaRPr>
+          </a:p>
+          <a:p>
+            <a:r>
+              <a:rPr lang="en-IN" dirty="0">
+                <a:solidFill>
+                  <a:srgbClr val="F0F0F0"/>
+                </a:solidFill>
+                <a:latin typeface="OpenSans"/>
+              </a:rPr>
+              <a:t>Example : </a:t>
+            </a:r>
+            <a:r>
+              <a:rPr lang="en-IN" b="0" dirty="0">
+                <a:solidFill>
+                  <a:srgbClr val="DCDCDC"/>
+                </a:solidFill>
+                <a:effectLst/>
+                <a:latin typeface="Consolas" panose="020B0609020204030204" pitchFamily="49" charset="0"/>
+              </a:rPr>
+              <a:t>{</a:t>
+            </a:r>
+            <a:endParaRPr lang="en-IN" dirty="0">
+              <a:solidFill>
+                <a:srgbClr val="D4D4D4"/>
+              </a:solidFill>
+              <a:latin typeface="Consolas" panose="020B0609020204030204" pitchFamily="49" charset="0"/>
+            </a:endParaRPr>
+          </a:p>
+          <a:p>
+            <a:pPr marL="0" indent="0">
+              <a:buNone/>
+            </a:pPr>
+            <a:r>
+              <a:rPr lang="en-IN" sz="800" dirty="0">
+                <a:solidFill>
+                  <a:srgbClr val="9CDCFE"/>
+                </a:solidFill>
+                <a:latin typeface="Consolas" panose="020B0609020204030204" pitchFamily="49" charset="0"/>
+              </a:rPr>
+              <a:t>     </a:t>
+            </a:r>
+            <a:r>
+              <a:rPr lang="en-IN" sz="800" b="0" dirty="0">
+                <a:solidFill>
+                  <a:srgbClr val="9CDCFE"/>
+                </a:solidFill>
+                <a:effectLst/>
+                <a:latin typeface="Consolas" panose="020B0609020204030204" pitchFamily="49" charset="0"/>
+              </a:rPr>
+              <a:t>"foundResults"</a:t>
+            </a:r>
+            <a:r>
+              <a:rPr lang="en-IN" sz="800" b="0" dirty="0">
+                <a:solidFill>
+                  <a:srgbClr val="DCDCDC"/>
+                </a:solidFill>
+                <a:effectLst/>
+                <a:latin typeface="Consolas" panose="020B0609020204030204" pitchFamily="49" charset="0"/>
+              </a:rPr>
+              <a:t>:</a:t>
+            </a:r>
+            <a:r>
+              <a:rPr lang="en-IN" sz="800" b="0" dirty="0">
+                <a:solidFill>
+                  <a:srgbClr val="D4D4D4"/>
+                </a:solidFill>
+                <a:effectLst/>
+                <a:latin typeface="Consolas" panose="020B0609020204030204" pitchFamily="49" charset="0"/>
+              </a:rPr>
+              <a:t> </a:t>
+            </a:r>
+            <a:r>
+              <a:rPr lang="en-IN" sz="800" dirty="0">
+                <a:solidFill>
+                  <a:srgbClr val="B5CEA8"/>
+                </a:solidFill>
+                <a:latin typeface="Consolas" panose="020B0609020204030204" pitchFamily="49" charset="0"/>
+              </a:rPr>
+              <a:t>1</a:t>
+            </a:r>
+            <a:r>
+              <a:rPr lang="en-IN" sz="800" b="0" dirty="0">
+                <a:solidFill>
+                  <a:srgbClr val="DCDCDC"/>
+                </a:solidFill>
+                <a:effectLst/>
+                <a:latin typeface="Consolas" panose="020B0609020204030204" pitchFamily="49" charset="0"/>
+              </a:rPr>
+              <a:t>,</a:t>
+            </a:r>
+            <a:endParaRPr lang="en-IN" sz="800" b="0" dirty="0">
+              <a:solidFill>
+                <a:srgbClr val="D4D4D4"/>
+              </a:solidFill>
+              <a:effectLst/>
+              <a:latin typeface="Consolas" panose="020B0609020204030204" pitchFamily="49" charset="0"/>
+            </a:endParaRPr>
+          </a:p>
+          <a:p>
+            <a:pPr marL="0" indent="0">
+              <a:buNone/>
+            </a:pPr>
+            <a:r>
+              <a:rPr lang="en-IN" sz="900" b="0" dirty="0">
+                <a:solidFill>
+                  <a:srgbClr val="D4D4D4"/>
+                </a:solidFill>
+                <a:effectLst/>
+                <a:latin typeface="Consolas" panose="020B0609020204030204" pitchFamily="49" charset="0"/>
+              </a:rPr>
+              <a:t>    </a:t>
+            </a:r>
+            <a:r>
+              <a:rPr lang="en-IN" sz="900" b="0" dirty="0">
+                <a:solidFill>
+                  <a:srgbClr val="9CDCFE"/>
+                </a:solidFill>
+                <a:effectLst/>
+                <a:latin typeface="Consolas" panose="020B0609020204030204" pitchFamily="49" charset="0"/>
+              </a:rPr>
+              <a:t>"message"</a:t>
+            </a:r>
+            <a:r>
+              <a:rPr lang="en-IN" sz="900" b="0" dirty="0">
+                <a:solidFill>
+                  <a:srgbClr val="DCDCDC"/>
+                </a:solidFill>
+                <a:effectLst/>
+                <a:latin typeface="Consolas" panose="020B0609020204030204" pitchFamily="49" charset="0"/>
+              </a:rPr>
+              <a:t>:</a:t>
+            </a:r>
+            <a:r>
+              <a:rPr lang="en-IN" sz="900" b="0" dirty="0">
+                <a:solidFill>
+                  <a:srgbClr val="D4D4D4"/>
+                </a:solidFill>
+                <a:effectLst/>
+                <a:latin typeface="Consolas" panose="020B0609020204030204" pitchFamily="49" charset="0"/>
+              </a:rPr>
+              <a:t> </a:t>
+            </a:r>
+            <a:r>
+              <a:rPr lang="en-IN" sz="900" b="0" dirty="0">
+                <a:solidFill>
+                  <a:srgbClr val="CE9178"/>
+                </a:solidFill>
+                <a:effectLst/>
+                <a:latin typeface="Consolas" panose="020B0609020204030204" pitchFamily="49" charset="0"/>
+              </a:rPr>
+              <a:t>"List Of Products"</a:t>
+            </a:r>
+            <a:r>
+              <a:rPr lang="en-IN" sz="900" b="0" dirty="0">
+                <a:solidFill>
+                  <a:srgbClr val="DCDCDC"/>
+                </a:solidFill>
+                <a:effectLst/>
+                <a:latin typeface="Consolas" panose="020B0609020204030204" pitchFamily="49" charset="0"/>
+              </a:rPr>
+              <a:t>,</a:t>
+            </a:r>
+            <a:endParaRPr lang="en-IN" sz="900" b="0" dirty="0">
+              <a:solidFill>
+                <a:srgbClr val="D4D4D4"/>
+              </a:solidFill>
+              <a:effectLst/>
+              <a:latin typeface="Consolas" panose="020B0609020204030204" pitchFamily="49" charset="0"/>
+            </a:endParaRPr>
+          </a:p>
+          <a:p>
+            <a:pPr marL="0" indent="0">
+              <a:buNone/>
+            </a:pPr>
+            <a:r>
+              <a:rPr lang="en-IN" sz="900" b="0" dirty="0">
+                <a:solidFill>
+                  <a:srgbClr val="D4D4D4"/>
+                </a:solidFill>
+                <a:effectLst/>
+                <a:latin typeface="Consolas" panose="020B0609020204030204" pitchFamily="49" charset="0"/>
+              </a:rPr>
+              <a:t>    </a:t>
+            </a:r>
+            <a:r>
+              <a:rPr lang="en-IN" sz="900" b="0" dirty="0">
+                <a:solidFill>
+                  <a:srgbClr val="9CDCFE"/>
+                </a:solidFill>
+                <a:effectLst/>
+                <a:latin typeface="Consolas" panose="020B0609020204030204" pitchFamily="49" charset="0"/>
+              </a:rPr>
+              <a:t>"details"</a:t>
+            </a:r>
+            <a:r>
+              <a:rPr lang="en-IN" sz="900" b="0" dirty="0">
+                <a:solidFill>
+                  <a:srgbClr val="DCDCDC"/>
+                </a:solidFill>
+                <a:effectLst/>
+                <a:latin typeface="Consolas" panose="020B0609020204030204" pitchFamily="49" charset="0"/>
+              </a:rPr>
+              <a:t>:</a:t>
+            </a:r>
+            <a:r>
+              <a:rPr lang="en-IN" sz="900" b="0" dirty="0">
+                <a:solidFill>
+                  <a:srgbClr val="D4D4D4"/>
+                </a:solidFill>
+                <a:effectLst/>
+                <a:latin typeface="Consolas" panose="020B0609020204030204" pitchFamily="49" charset="0"/>
+              </a:rPr>
+              <a:t> </a:t>
+            </a:r>
+            <a:r>
+              <a:rPr lang="en-IN" sz="900" b="0" dirty="0">
+                <a:solidFill>
+                  <a:srgbClr val="DCDCDC"/>
+                </a:solidFill>
+                <a:effectLst/>
+                <a:latin typeface="Consolas" panose="020B0609020204030204" pitchFamily="49" charset="0"/>
+              </a:rPr>
+              <a:t>[</a:t>
+            </a:r>
+            <a:endParaRPr lang="en-IN" sz="900" b="0" dirty="0">
+              <a:solidFill>
+                <a:srgbClr val="D4D4D4"/>
+              </a:solidFill>
+              <a:effectLst/>
+              <a:latin typeface="Consolas" panose="020B0609020204030204" pitchFamily="49" charset="0"/>
+            </a:endParaRPr>
+          </a:p>
+          <a:p>
+            <a:pPr marL="0" indent="0">
+              <a:buNone/>
+            </a:pPr>
+            <a:r>
+              <a:rPr lang="en-IN" sz="900" b="0" dirty="0">
+                <a:solidFill>
+                  <a:srgbClr val="D4D4D4"/>
+                </a:solidFill>
+                <a:effectLst/>
+                <a:latin typeface="Consolas" panose="020B0609020204030204" pitchFamily="49" charset="0"/>
+              </a:rPr>
+              <a:t>        </a:t>
+            </a:r>
+            <a:r>
+              <a:rPr lang="en-IN" sz="900" b="0" dirty="0">
+                <a:solidFill>
+                  <a:srgbClr val="DCDCDC"/>
+                </a:solidFill>
+                <a:effectLst/>
+                <a:latin typeface="Consolas" panose="020B0609020204030204" pitchFamily="49" charset="0"/>
+              </a:rPr>
+              <a:t>{</a:t>
+            </a:r>
+            <a:endParaRPr lang="en-IN" sz="900" b="0" dirty="0">
+              <a:solidFill>
+                <a:srgbClr val="D4D4D4"/>
+              </a:solidFill>
+              <a:effectLst/>
+              <a:latin typeface="Consolas" panose="020B0609020204030204" pitchFamily="49" charset="0"/>
+            </a:endParaRPr>
+          </a:p>
+          <a:p>
+            <a:pPr marL="0" indent="0">
+              <a:buNone/>
+            </a:pPr>
+            <a:r>
+              <a:rPr lang="en-IN" sz="900" b="0" dirty="0">
+                <a:solidFill>
+                  <a:srgbClr val="D4D4D4"/>
+                </a:solidFill>
+                <a:effectLst/>
+                <a:latin typeface="Consolas" panose="020B0609020204030204" pitchFamily="49" charset="0"/>
+              </a:rPr>
+              <a:t>            </a:t>
+            </a:r>
+            <a:r>
+              <a:rPr lang="en-IN" sz="900" b="0" dirty="0">
+                <a:solidFill>
+                  <a:srgbClr val="9CDCFE"/>
+                </a:solidFill>
+                <a:effectLst/>
+                <a:latin typeface="Consolas" panose="020B0609020204030204" pitchFamily="49" charset="0"/>
+              </a:rPr>
+              <a:t>"_id"</a:t>
+            </a:r>
+            <a:r>
+              <a:rPr lang="en-IN" sz="900" b="0" dirty="0">
+                <a:solidFill>
+                  <a:srgbClr val="DCDCDC"/>
+                </a:solidFill>
+                <a:effectLst/>
+                <a:latin typeface="Consolas" panose="020B0609020204030204" pitchFamily="49" charset="0"/>
+              </a:rPr>
+              <a:t>:</a:t>
+            </a:r>
+            <a:r>
+              <a:rPr lang="en-IN" sz="900" b="0" dirty="0">
+                <a:solidFill>
+                  <a:srgbClr val="D4D4D4"/>
+                </a:solidFill>
+                <a:effectLst/>
+                <a:latin typeface="Consolas" panose="020B0609020204030204" pitchFamily="49" charset="0"/>
+              </a:rPr>
+              <a:t> </a:t>
+            </a:r>
+            <a:r>
+              <a:rPr lang="en-IN" sz="900" b="0" dirty="0">
+                <a:solidFill>
+                  <a:srgbClr val="CE9178"/>
+                </a:solidFill>
+                <a:effectLst/>
+                <a:latin typeface="Consolas" panose="020B0609020204030204" pitchFamily="49" charset="0"/>
+              </a:rPr>
+              <a:t>"5f46d2da8b7db3676021b0aa"</a:t>
+            </a:r>
+            <a:r>
+              <a:rPr lang="en-IN" sz="900" b="0" dirty="0">
+                <a:solidFill>
+                  <a:srgbClr val="DCDCDC"/>
+                </a:solidFill>
+                <a:effectLst/>
+                <a:latin typeface="Consolas" panose="020B0609020204030204" pitchFamily="49" charset="0"/>
+              </a:rPr>
+              <a:t>,</a:t>
+            </a:r>
+            <a:endParaRPr lang="en-IN" sz="900" b="0" dirty="0">
+              <a:solidFill>
+                <a:srgbClr val="D4D4D4"/>
+              </a:solidFill>
+              <a:effectLst/>
+              <a:latin typeface="Consolas" panose="020B0609020204030204" pitchFamily="49" charset="0"/>
+            </a:endParaRPr>
+          </a:p>
+          <a:p>
+            <a:pPr marL="0" indent="0">
+              <a:buNone/>
+            </a:pPr>
+            <a:r>
+              <a:rPr lang="en-IN" sz="900" b="0" dirty="0">
+                <a:solidFill>
+                  <a:srgbClr val="D4D4D4"/>
+                </a:solidFill>
+                <a:effectLst/>
+                <a:latin typeface="Consolas" panose="020B0609020204030204" pitchFamily="49" charset="0"/>
+              </a:rPr>
+              <a:t>            </a:t>
+            </a:r>
+            <a:r>
+              <a:rPr lang="en-IN" sz="900" b="0" dirty="0">
+                <a:solidFill>
+                  <a:srgbClr val="9CDCFE"/>
+                </a:solidFill>
+                <a:effectLst/>
+                <a:latin typeface="Consolas" panose="020B0609020204030204" pitchFamily="49" charset="0"/>
+              </a:rPr>
+              <a:t>"productName"</a:t>
+            </a:r>
+            <a:r>
+              <a:rPr lang="en-IN" sz="900" b="0" dirty="0">
+                <a:solidFill>
+                  <a:srgbClr val="DCDCDC"/>
+                </a:solidFill>
+                <a:effectLst/>
+                <a:latin typeface="Consolas" panose="020B0609020204030204" pitchFamily="49" charset="0"/>
+              </a:rPr>
+              <a:t>:</a:t>
+            </a:r>
+            <a:r>
+              <a:rPr lang="en-IN" sz="900" b="0" dirty="0">
+                <a:solidFill>
+                  <a:srgbClr val="D4D4D4"/>
+                </a:solidFill>
+                <a:effectLst/>
+                <a:latin typeface="Consolas" panose="020B0609020204030204" pitchFamily="49" charset="0"/>
+              </a:rPr>
+              <a:t> </a:t>
+            </a:r>
+            <a:r>
+              <a:rPr lang="en-IN" sz="900" b="0" dirty="0">
+                <a:solidFill>
+                  <a:srgbClr val="CE9178"/>
+                </a:solidFill>
+                <a:effectLst/>
+                <a:latin typeface="Consolas" panose="020B0609020204030204" pitchFamily="49" charset="0"/>
+              </a:rPr>
+              <a:t>"Apple iPhone 11 (64GB) - Black"</a:t>
+            </a:r>
+            <a:r>
+              <a:rPr lang="en-IN" sz="900" b="0" dirty="0">
+                <a:solidFill>
+                  <a:srgbClr val="DCDCDC"/>
+                </a:solidFill>
+                <a:effectLst/>
+                <a:latin typeface="Consolas" panose="020B0609020204030204" pitchFamily="49" charset="0"/>
+              </a:rPr>
+              <a:t>,</a:t>
+            </a:r>
+            <a:endParaRPr lang="en-IN" sz="900" b="0" dirty="0">
+              <a:solidFill>
+                <a:srgbClr val="D4D4D4"/>
+              </a:solidFill>
+              <a:effectLst/>
+              <a:latin typeface="Consolas" panose="020B0609020204030204" pitchFamily="49" charset="0"/>
+            </a:endParaRPr>
+          </a:p>
+          <a:p>
+            <a:pPr marL="0" indent="0">
+              <a:buNone/>
+            </a:pPr>
+            <a:r>
+              <a:rPr lang="en-IN" sz="900" b="0" dirty="0">
+                <a:solidFill>
+                  <a:srgbClr val="D4D4D4"/>
+                </a:solidFill>
+                <a:effectLst/>
+                <a:latin typeface="Consolas" panose="020B0609020204030204" pitchFamily="49" charset="0"/>
+              </a:rPr>
+              <a:t>            </a:t>
+            </a:r>
+            <a:r>
+              <a:rPr lang="en-IN" sz="900" b="0" dirty="0">
+                <a:solidFill>
+                  <a:srgbClr val="9CDCFE"/>
+                </a:solidFill>
+                <a:effectLst/>
+                <a:latin typeface="Consolas" panose="020B0609020204030204" pitchFamily="49" charset="0"/>
+              </a:rPr>
+              <a:t>"categoryId"</a:t>
+            </a:r>
+            <a:r>
+              <a:rPr lang="en-IN" sz="900" b="0" dirty="0">
+                <a:solidFill>
+                  <a:srgbClr val="DCDCDC"/>
+                </a:solidFill>
+                <a:effectLst/>
+                <a:latin typeface="Consolas" panose="020B0609020204030204" pitchFamily="49" charset="0"/>
+              </a:rPr>
+              <a:t>:</a:t>
+            </a:r>
+            <a:r>
+              <a:rPr lang="en-IN" sz="900" b="0" dirty="0">
+                <a:solidFill>
+                  <a:srgbClr val="D4D4D4"/>
+                </a:solidFill>
+                <a:effectLst/>
+                <a:latin typeface="Consolas" panose="020B0609020204030204" pitchFamily="49" charset="0"/>
+              </a:rPr>
+              <a:t> </a:t>
+            </a:r>
+            <a:r>
+              <a:rPr lang="en-IN" sz="900" b="0" dirty="0">
+                <a:solidFill>
+                  <a:srgbClr val="CE9178"/>
+                </a:solidFill>
+                <a:effectLst/>
+                <a:latin typeface="Consolas" panose="020B0609020204030204" pitchFamily="49" charset="0"/>
+              </a:rPr>
+              <a:t>"5f45937abd14352638c6e791"</a:t>
+            </a:r>
+            <a:r>
+              <a:rPr lang="en-IN" sz="900" b="0" dirty="0">
+                <a:solidFill>
+                  <a:srgbClr val="DCDCDC"/>
+                </a:solidFill>
+                <a:effectLst/>
+                <a:latin typeface="Consolas" panose="020B0609020204030204" pitchFamily="49" charset="0"/>
+              </a:rPr>
+              <a:t>,</a:t>
+            </a:r>
+            <a:endParaRPr lang="en-IN" sz="900" b="0" dirty="0">
+              <a:solidFill>
+                <a:srgbClr val="D4D4D4"/>
+              </a:solidFill>
+              <a:effectLst/>
+              <a:latin typeface="Consolas" panose="020B0609020204030204" pitchFamily="49" charset="0"/>
+            </a:endParaRPr>
+          </a:p>
+          <a:p>
+            <a:pPr marL="0" indent="0">
+              <a:buNone/>
+            </a:pPr>
+            <a:r>
+              <a:rPr lang="en-IN" sz="900" b="0" dirty="0">
+                <a:solidFill>
+                  <a:srgbClr val="D4D4D4"/>
+                </a:solidFill>
+                <a:effectLst/>
+                <a:latin typeface="Consolas" panose="020B0609020204030204" pitchFamily="49" charset="0"/>
+              </a:rPr>
+              <a:t>            </a:t>
+            </a:r>
+            <a:r>
+              <a:rPr lang="en-IN" sz="900" b="0" dirty="0">
+                <a:solidFill>
+                  <a:srgbClr val="9CDCFE"/>
+                </a:solidFill>
+                <a:effectLst/>
+                <a:latin typeface="Consolas" panose="020B0609020204030204" pitchFamily="49" charset="0"/>
+              </a:rPr>
+              <a:t>"productPrice"</a:t>
+            </a:r>
+            <a:r>
+              <a:rPr lang="en-IN" sz="900" b="0" dirty="0">
+                <a:solidFill>
+                  <a:srgbClr val="DCDCDC"/>
+                </a:solidFill>
+                <a:effectLst/>
+                <a:latin typeface="Consolas" panose="020B0609020204030204" pitchFamily="49" charset="0"/>
+              </a:rPr>
+              <a:t>:</a:t>
+            </a:r>
+            <a:r>
+              <a:rPr lang="en-IN" sz="900" b="0" dirty="0">
+                <a:solidFill>
+                  <a:srgbClr val="D4D4D4"/>
+                </a:solidFill>
+                <a:effectLst/>
+                <a:latin typeface="Consolas" panose="020B0609020204030204" pitchFamily="49" charset="0"/>
+              </a:rPr>
+              <a:t> </a:t>
+            </a:r>
+            <a:r>
+              <a:rPr lang="en-IN" sz="900" b="0" dirty="0">
+                <a:solidFill>
+                  <a:srgbClr val="B5CEA8"/>
+                </a:solidFill>
+                <a:effectLst/>
+                <a:latin typeface="Consolas" panose="020B0609020204030204" pitchFamily="49" charset="0"/>
+              </a:rPr>
+              <a:t>68300</a:t>
+            </a:r>
+            <a:r>
+              <a:rPr lang="en-IN" sz="900" b="0" dirty="0">
+                <a:solidFill>
+                  <a:srgbClr val="DCDCDC"/>
+                </a:solidFill>
+                <a:effectLst/>
+                <a:latin typeface="Consolas" panose="020B0609020204030204" pitchFamily="49" charset="0"/>
+              </a:rPr>
+              <a:t>,</a:t>
+            </a:r>
+            <a:endParaRPr lang="en-IN" sz="900" b="0" dirty="0">
+              <a:solidFill>
+                <a:srgbClr val="D4D4D4"/>
+              </a:solidFill>
+              <a:effectLst/>
+              <a:latin typeface="Consolas" panose="020B0609020204030204" pitchFamily="49" charset="0"/>
+            </a:endParaRPr>
+          </a:p>
+          <a:p>
+            <a:pPr marL="0" indent="0">
+              <a:buNone/>
+            </a:pPr>
+            <a:r>
+              <a:rPr lang="en-IN" sz="900" b="0" dirty="0">
+                <a:solidFill>
+                  <a:srgbClr val="D4D4D4"/>
+                </a:solidFill>
+                <a:effectLst/>
+                <a:latin typeface="Consolas" panose="020B0609020204030204" pitchFamily="49" charset="0"/>
+              </a:rPr>
+              <a:t>            </a:t>
+            </a:r>
+            <a:r>
+              <a:rPr lang="en-IN" sz="900" b="0" dirty="0">
+                <a:solidFill>
+                  <a:srgbClr val="9CDCFE"/>
+                </a:solidFill>
+                <a:effectLst/>
+                <a:latin typeface="Consolas" panose="020B0609020204030204" pitchFamily="49" charset="0"/>
+              </a:rPr>
+              <a:t>"productCoverImage"</a:t>
+            </a:r>
+            <a:r>
+              <a:rPr lang="en-IN" sz="900" b="0" dirty="0">
+                <a:solidFill>
+                  <a:srgbClr val="DCDCDC"/>
+                </a:solidFill>
+                <a:effectLst/>
+                <a:latin typeface="Consolas" panose="020B0609020204030204" pitchFamily="49" charset="0"/>
+              </a:rPr>
+              <a:t>:</a:t>
+            </a:r>
+            <a:r>
+              <a:rPr lang="en-IN" sz="900" b="0" dirty="0">
+                <a:solidFill>
+                  <a:srgbClr val="D4D4D4"/>
+                </a:solidFill>
+                <a:effectLst/>
+                <a:latin typeface="Consolas" panose="020B0609020204030204" pitchFamily="49" charset="0"/>
+              </a:rPr>
+              <a:t> </a:t>
+            </a:r>
+            <a:r>
+              <a:rPr lang="en-IN" sz="900" b="0" dirty="0">
+                <a:solidFill>
+                  <a:srgbClr val="CE9178"/>
+                </a:solidFill>
+                <a:effectLst/>
+                <a:latin typeface="Consolas" panose="020B0609020204030204" pitchFamily="49" charset="0"/>
+              </a:rPr>
+              <a:t>"https://storage.googleapis.com/lexa-productcovers/iphone11.jpg"</a:t>
+            </a:r>
+            <a:r>
+              <a:rPr lang="en-IN" sz="900" b="0" dirty="0">
+                <a:solidFill>
+                  <a:srgbClr val="DCDCDC"/>
+                </a:solidFill>
+                <a:effectLst/>
+                <a:latin typeface="Consolas" panose="020B0609020204030204" pitchFamily="49" charset="0"/>
+              </a:rPr>
+              <a:t>,</a:t>
+            </a:r>
+            <a:endParaRPr lang="en-IN" sz="900" b="0" dirty="0">
+              <a:solidFill>
+                <a:srgbClr val="D4D4D4"/>
+              </a:solidFill>
+              <a:effectLst/>
+              <a:latin typeface="Consolas" panose="020B0609020204030204" pitchFamily="49" charset="0"/>
+            </a:endParaRPr>
+          </a:p>
+          <a:p>
+            <a:pPr marL="0" indent="0">
+              <a:buNone/>
+            </a:pPr>
+            <a:r>
+              <a:rPr lang="en-IN" sz="900" b="0" dirty="0">
+                <a:solidFill>
+                  <a:srgbClr val="D4D4D4"/>
+                </a:solidFill>
+                <a:effectLst/>
+                <a:latin typeface="Consolas" panose="020B0609020204030204" pitchFamily="49" charset="0"/>
+              </a:rPr>
+              <a:t>            </a:t>
+            </a:r>
+            <a:r>
+              <a:rPr lang="en-IN" sz="900" b="0" dirty="0">
+                <a:solidFill>
+                  <a:srgbClr val="9CDCFE"/>
+                </a:solidFill>
+                <a:effectLst/>
+                <a:latin typeface="Consolas" panose="020B0609020204030204" pitchFamily="49" charset="0"/>
+              </a:rPr>
+              <a:t>"id"</a:t>
+            </a:r>
+            <a:r>
+              <a:rPr lang="en-IN" sz="900" b="0" dirty="0">
+                <a:solidFill>
+                  <a:srgbClr val="DCDCDC"/>
+                </a:solidFill>
+                <a:effectLst/>
+                <a:latin typeface="Consolas" panose="020B0609020204030204" pitchFamily="49" charset="0"/>
+              </a:rPr>
+              <a:t>:</a:t>
+            </a:r>
+            <a:r>
+              <a:rPr lang="en-IN" sz="900" b="0" dirty="0">
+                <a:solidFill>
+                  <a:srgbClr val="D4D4D4"/>
+                </a:solidFill>
+                <a:effectLst/>
+                <a:latin typeface="Consolas" panose="020B0609020204030204" pitchFamily="49" charset="0"/>
+              </a:rPr>
+              <a:t> </a:t>
+            </a:r>
+            <a:r>
+              <a:rPr lang="en-IN" sz="900" b="0" dirty="0">
+                <a:solidFill>
+                  <a:srgbClr val="CE9178"/>
+                </a:solidFill>
+                <a:effectLst/>
+                <a:latin typeface="Consolas" panose="020B0609020204030204" pitchFamily="49" charset="0"/>
+              </a:rPr>
+              <a:t>"5f46d2da8b7db3676021b0aa"</a:t>
+            </a:r>
+            <a:endParaRPr lang="en-IN" sz="900" b="0" dirty="0">
+              <a:solidFill>
+                <a:srgbClr val="D4D4D4"/>
+              </a:solidFill>
+              <a:effectLst/>
+              <a:latin typeface="Consolas" panose="020B0609020204030204" pitchFamily="49" charset="0"/>
+            </a:endParaRPr>
+          </a:p>
+          <a:p>
+            <a:pPr marL="0" indent="0">
+              <a:buNone/>
+            </a:pPr>
+            <a:r>
+              <a:rPr lang="en-IN" sz="900" b="0" dirty="0">
+                <a:solidFill>
+                  <a:srgbClr val="D4D4D4"/>
+                </a:solidFill>
+                <a:effectLst/>
+                <a:latin typeface="Consolas" panose="020B0609020204030204" pitchFamily="49" charset="0"/>
+              </a:rPr>
+              <a:t>        </a:t>
+            </a:r>
+            <a:r>
+              <a:rPr lang="en-IN" sz="900" b="0" dirty="0">
+                <a:solidFill>
+                  <a:srgbClr val="DCDCDC"/>
+                </a:solidFill>
+                <a:effectLst/>
+                <a:latin typeface="Consolas" panose="020B0609020204030204" pitchFamily="49" charset="0"/>
+              </a:rPr>
+              <a:t>}</a:t>
+            </a:r>
+          </a:p>
+          <a:p>
+            <a:pPr marL="0" indent="0">
+              <a:buNone/>
+            </a:pPr>
+            <a:r>
+              <a:rPr lang="en-IN" sz="900" b="0" dirty="0">
+                <a:solidFill>
+                  <a:srgbClr val="D4D4D4"/>
+                </a:solidFill>
+                <a:effectLst/>
+                <a:latin typeface="Consolas" panose="020B0609020204030204" pitchFamily="49" charset="0"/>
+              </a:rPr>
+              <a:t>	]</a:t>
+            </a:r>
+          </a:p>
+          <a:p>
+            <a:pPr>
+              <a:buFont typeface="Arial" panose="020B0604020202020204" pitchFamily="34" charset="0"/>
+              <a:buChar char="•"/>
+            </a:pPr>
+            <a:r>
+              <a:rPr lang="en-IN" b="0" dirty="0">
+                <a:solidFill>
+                  <a:srgbClr val="D4D4D4"/>
+                </a:solidFill>
+                <a:effectLst/>
+                <a:latin typeface="Consolas" panose="020B0609020204030204" pitchFamily="49" charset="0"/>
+              </a:rPr>
+              <a:t>Gets all the products by uploaded order.</a:t>
+            </a:r>
+          </a:p>
+          <a:p>
+            <a:pPr>
+              <a:buFont typeface="Arial" panose="020B0604020202020204" pitchFamily="34" charset="0"/>
+              <a:buChar char="•"/>
+            </a:pPr>
+            <a:r>
+              <a:rPr lang="en-IN" dirty="0">
+                <a:solidFill>
+                  <a:srgbClr val="D4D4D4"/>
+                </a:solidFill>
+                <a:latin typeface="Consolas" panose="020B0609020204030204" pitchFamily="49" charset="0"/>
+              </a:rPr>
+              <a:t>This route may not be that much useful that much ,but this route has chained queries attached to it!!!</a:t>
+            </a:r>
+            <a:endParaRPr lang="en-IN" dirty="0"/>
+          </a:p>
+        </p:txBody>
+      </p:sp>
+    </p:spTree>
+    <p:extLst>
+      <p:ext uri="{BB962C8B-B14F-4D97-AF65-F5344CB8AC3E}">
+        <p14:creationId xmlns:p14="http://schemas.microsoft.com/office/powerpoint/2010/main" val="688723732"/>
+      </p:ext>
+    </p:extLst>
+  </p:cSld>
+  <p:clrMapOvr>
+    <a:masterClrMapping/>
+  </p:clrMapOvr>
+</p:sld>
+</file>
+
+<file path=ppt/slides/slide4.xml><?xml version="1.0" encoding="utf-8"?>
+<p:sld xmlns:a="http://schemas.openxmlformats.org/drawingml/2006/main" xmlns:r="http://schemas.openxmlformats.org/officeDocument/2006/relationships" xmlns:p="http://schemas.openxmlformats.org/presentationml/2006/main">
+  <p:cSld>
+    <p:spTree>
+      <p:nvGrpSpPr>
+        <p:cNvPr id="1" name=""/>
+        <p:cNvGrpSpPr/>
+        <p:nvPr/>
+      </p:nvGrpSpPr>
+      <p:grpSpPr>
+        <a:xfrm>
+          <a:off x="0" y="0"/>
+          <a:ext cx="0" cy="0"/>
+          <a:chOff x="0" y="0"/>
+          <a:chExt cx="0" cy="0"/>
+        </a:xfrm>
+      </p:grpSpPr>
+      <p:sp>
+        <p:nvSpPr>
+          <p:cNvPr id="2" name="Title 1">
+            <a:extLst>
+              <a:ext uri="{FF2B5EF4-FFF2-40B4-BE49-F238E27FC236}">
+                <a16:creationId xmlns:a16="http://schemas.microsoft.com/office/drawing/2014/main" id="{BBADED51-DC71-4524-8779-C03A2ED79858}"/>
+              </a:ext>
+            </a:extLst>
+          </p:cNvPr>
+          <p:cNvSpPr>
+            <a:spLocks noGrp="1"/>
+          </p:cNvSpPr>
+          <p:nvPr>
+            <p:ph type="title"/>
+          </p:nvPr>
+        </p:nvSpPr>
+        <p:spPr>
+          <a:xfrm>
+            <a:off x="0" y="0"/>
+            <a:ext cx="12192000" cy="791570"/>
+          </a:xfrm>
+        </p:spPr>
+        <p:txBody>
+          <a:bodyPr>
+            <a:normAutofit/>
+          </a:bodyPr>
+          <a:lstStyle/>
+          <a:p>
+            <a:r>
+              <a:rPr lang="en-US" dirty="0"/>
+              <a:t>Chained Methods OF GET Products </a:t>
+            </a:r>
+            <a:r>
+              <a:rPr lang="en-US" sz="2700" dirty="0"/>
+              <a:t>(</a:t>
+            </a:r>
+            <a:r>
+              <a:rPr lang="en-US" sz="2700" cap="none" dirty="0"/>
+              <a:t>Method : GET</a:t>
+            </a:r>
+            <a:r>
+              <a:rPr lang="en-US" sz="2700" dirty="0"/>
+              <a:t>)</a:t>
+            </a:r>
+            <a:endParaRPr lang="en-IN" dirty="0"/>
+          </a:p>
+        </p:txBody>
+      </p:sp>
+      <p:sp>
+        <p:nvSpPr>
+          <p:cNvPr id="3" name="Content Placeholder 2">
+            <a:extLst>
+              <a:ext uri="{FF2B5EF4-FFF2-40B4-BE49-F238E27FC236}">
+                <a16:creationId xmlns:a16="http://schemas.microsoft.com/office/drawing/2014/main" id="{694DE449-2BE1-4F8A-B3BD-800A0D7575D2}"/>
+              </a:ext>
+            </a:extLst>
+          </p:cNvPr>
+          <p:cNvSpPr>
+            <a:spLocks noGrp="1"/>
+          </p:cNvSpPr>
+          <p:nvPr>
+            <p:ph idx="1"/>
+          </p:nvPr>
+        </p:nvSpPr>
+        <p:spPr>
+          <a:xfrm>
+            <a:off x="95535" y="605051"/>
+            <a:ext cx="11969086" cy="6123294"/>
+          </a:xfrm>
+        </p:spPr>
+        <p:txBody>
+          <a:bodyPr/>
+          <a:lstStyle/>
+          <a:p>
+            <a:r>
+              <a:rPr lang="en-US" dirty="0"/>
+              <a:t>API ENDPOINTS :</a:t>
+            </a:r>
+            <a:r>
+              <a:rPr lang="en-IN" dirty="0">
+                <a:hlinkClick r:id="rId2"/>
+              </a:rPr>
+              <a:t> </a:t>
+            </a:r>
+            <a:r>
+              <a:rPr lang="en-IN" dirty="0">
+                <a:hlinkClick r:id="rId3"/>
+              </a:rPr>
+              <a:t>https://lexaapi.uc.r.appspot.com/</a:t>
+            </a:r>
+            <a:r>
+              <a:rPr lang="en-IN" dirty="0"/>
+              <a:t>  ---- chains?</a:t>
+            </a:r>
+            <a:endParaRPr lang="en-US" dirty="0"/>
+          </a:p>
+          <a:p>
+            <a:pPr>
+              <a:buFont typeface="Wingdings" panose="05000000000000000000" pitchFamily="2" charset="2"/>
+              <a:buChar char="Ø"/>
+            </a:pPr>
+            <a:r>
+              <a:rPr lang="en-US" dirty="0"/>
+              <a:t>Get products by category type(takes: categoryId) : </a:t>
+            </a:r>
+            <a:r>
+              <a:rPr lang="en-IN" b="0" i="0" dirty="0">
+                <a:solidFill>
+                  <a:srgbClr val="F0F0F0"/>
+                </a:solidFill>
+                <a:effectLst/>
+                <a:latin typeface="OpenSans"/>
+                <a:hlinkClick r:id="rId2"/>
+              </a:rPr>
+              <a:t>/product/</a:t>
+            </a:r>
+            <a:r>
+              <a:rPr lang="en-IN" b="0" i="0" dirty="0" err="1">
+                <a:solidFill>
+                  <a:srgbClr val="F0F0F0"/>
+                </a:solidFill>
+                <a:effectLst/>
+                <a:latin typeface="OpenSans"/>
+                <a:hlinkClick r:id="rId2"/>
+              </a:rPr>
+              <a:t>getProducts?categoryId</a:t>
+            </a:r>
+            <a:r>
+              <a:rPr lang="en-IN" b="0" i="0" dirty="0">
+                <a:solidFill>
+                  <a:srgbClr val="F0F0F0"/>
+                </a:solidFill>
+                <a:effectLst/>
+                <a:latin typeface="OpenSans"/>
+                <a:hlinkClick r:id="rId2"/>
+              </a:rPr>
+              <a:t>=5f45937abd14352638c6e791</a:t>
+            </a:r>
+            <a:endParaRPr lang="en-IN" b="0" i="0" dirty="0">
+              <a:solidFill>
+                <a:srgbClr val="F0F0F0"/>
+              </a:solidFill>
+              <a:effectLst/>
+              <a:latin typeface="OpenSans"/>
+            </a:endParaRPr>
+          </a:p>
+          <a:p>
+            <a:pPr>
+              <a:buFont typeface="Wingdings" panose="05000000000000000000" pitchFamily="2" charset="2"/>
+              <a:buChar char="Ø"/>
+            </a:pPr>
+            <a:r>
+              <a:rPr lang="en-IN" dirty="0"/>
+              <a:t>Get product by Exact ProductName (rare use case) :</a:t>
+            </a:r>
+            <a:r>
+              <a:rPr lang="en-US" b="0" i="0" dirty="0">
+                <a:solidFill>
+                  <a:srgbClr val="F0F0F0"/>
+                </a:solidFill>
+                <a:effectLst/>
+                <a:latin typeface="OpenSans"/>
+              </a:rPr>
+              <a:t> </a:t>
+            </a:r>
+            <a:r>
+              <a:rPr lang="en-US" b="0" i="0" dirty="0">
+                <a:solidFill>
+                  <a:srgbClr val="F0F0F0"/>
+                </a:solidFill>
+                <a:effectLst/>
+                <a:latin typeface="OpenSans"/>
+                <a:hlinkClick r:id="rId3"/>
+              </a:rPr>
+              <a:t>/product/getProducts?productName=Apple iPhone 11 (64GB) – Black</a:t>
+            </a:r>
+            <a:endParaRPr lang="en-US" b="0" i="0" dirty="0">
+              <a:solidFill>
+                <a:srgbClr val="F0F0F0"/>
+              </a:solidFill>
+              <a:effectLst/>
+              <a:latin typeface="OpenSans"/>
+            </a:endParaRPr>
+          </a:p>
+          <a:p>
+            <a:pPr>
+              <a:buFont typeface="Wingdings" panose="05000000000000000000" pitchFamily="2" charset="2"/>
+              <a:buChar char="Ø"/>
+            </a:pPr>
+            <a:r>
+              <a:rPr lang="en-IN" dirty="0"/>
+              <a:t>Get product by Search Term(takes : fieldname/searchTerm): </a:t>
+            </a:r>
+            <a:r>
+              <a:rPr lang="en-US" b="0" i="0" dirty="0">
+                <a:solidFill>
+                  <a:srgbClr val="F0F0F0"/>
+                </a:solidFill>
+                <a:effectLst/>
+                <a:latin typeface="OpenSans"/>
+                <a:hlinkClick r:id="rId4" action="ppaction://hlinkfile"/>
+              </a:rPr>
+              <a:t>/product/getProducts?searchin=productName&amp;searchTerm=z</a:t>
+            </a:r>
+            <a:endParaRPr lang="en-US" b="0" i="0" dirty="0">
+              <a:solidFill>
+                <a:srgbClr val="F0F0F0"/>
+              </a:solidFill>
+              <a:effectLst/>
+              <a:latin typeface="OpenSans"/>
+            </a:endParaRPr>
+          </a:p>
+          <a:p>
+            <a:pPr>
+              <a:buFont typeface="Wingdings" panose="05000000000000000000" pitchFamily="2" charset="2"/>
+              <a:buChar char="Ø"/>
+            </a:pPr>
+            <a:r>
+              <a:rPr lang="en-US" b="0" i="0" dirty="0">
+                <a:solidFill>
+                  <a:srgbClr val="F0F0F0"/>
+                </a:solidFill>
+                <a:effectLst/>
+                <a:latin typeface="OpenSans"/>
+              </a:rPr>
+              <a:t>Any methods can be chained to one another!!!</a:t>
+            </a:r>
+          </a:p>
+          <a:p>
+            <a:pPr>
+              <a:buFont typeface="Wingdings" panose="05000000000000000000" pitchFamily="2" charset="2"/>
+              <a:buChar char="Ø"/>
+            </a:pPr>
+            <a:r>
+              <a:rPr lang="en-US" dirty="0">
+                <a:solidFill>
+                  <a:srgbClr val="F0F0F0"/>
+                </a:solidFill>
+                <a:latin typeface="OpenSans"/>
+              </a:rPr>
+              <a:t>Additional Query methods available:</a:t>
+            </a:r>
+          </a:p>
+          <a:p>
+            <a:pPr lvl="1">
+              <a:buFont typeface="Wingdings" panose="05000000000000000000" pitchFamily="2" charset="2"/>
+              <a:buChar char="v"/>
+            </a:pPr>
+            <a:r>
+              <a:rPr lang="en-US" b="0" i="0" dirty="0">
+                <a:solidFill>
+                  <a:srgbClr val="F0F0F0"/>
+                </a:solidFill>
+                <a:effectLst/>
+                <a:latin typeface="OpenSans"/>
+              </a:rPr>
+              <a:t>Pagination :  ?page=1 </a:t>
+            </a:r>
+          </a:p>
+          <a:p>
+            <a:pPr lvl="1">
+              <a:buFont typeface="Wingdings" panose="05000000000000000000" pitchFamily="2" charset="2"/>
+              <a:buChar char="v"/>
+            </a:pPr>
+            <a:r>
+              <a:rPr lang="en-US" dirty="0">
+                <a:solidFill>
+                  <a:srgbClr val="F0F0F0"/>
+                </a:solidFill>
+                <a:latin typeface="OpenSans"/>
+              </a:rPr>
+              <a:t>Fields :  fields=ProductName , Id, etc...,</a:t>
+            </a:r>
+          </a:p>
+          <a:p>
+            <a:pPr lvl="1">
+              <a:buFont typeface="Wingdings" panose="05000000000000000000" pitchFamily="2" charset="2"/>
+              <a:buChar char="v"/>
+            </a:pPr>
+            <a:r>
+              <a:rPr lang="en-US" dirty="0">
+                <a:solidFill>
+                  <a:srgbClr val="F0F0F0"/>
+                </a:solidFill>
+                <a:latin typeface="OpenSans"/>
+              </a:rPr>
+              <a:t>Pagination with Results restriction : ?page=1&amp;limit=10</a:t>
+            </a:r>
+          </a:p>
+          <a:p>
+            <a:pPr lvl="1">
+              <a:buFont typeface="Wingdings" panose="05000000000000000000" pitchFamily="2" charset="2"/>
+              <a:buChar char="v"/>
+            </a:pPr>
+            <a:endParaRPr lang="en-US" b="0" i="0" dirty="0">
+              <a:solidFill>
+                <a:srgbClr val="F0F0F0"/>
+              </a:solidFill>
+              <a:effectLst/>
+              <a:latin typeface="OpenSans"/>
+            </a:endParaRPr>
+          </a:p>
+          <a:p>
+            <a:pPr>
+              <a:buFont typeface="Wingdings" panose="05000000000000000000" pitchFamily="2" charset="2"/>
+              <a:buChar char="Ø"/>
+            </a:pPr>
+            <a:endParaRPr lang="en-IN" dirty="0"/>
+          </a:p>
+        </p:txBody>
+      </p:sp>
+    </p:spTree>
+    <p:extLst>
+      <p:ext uri="{BB962C8B-B14F-4D97-AF65-F5344CB8AC3E}">
+        <p14:creationId xmlns:p14="http://schemas.microsoft.com/office/powerpoint/2010/main" val="3732573019"/>
+      </p:ext>
+    </p:extLst>
+  </p:cSld>
+  <p:clrMapOvr>
+    <a:masterClrMapping/>
+  </p:clrMapOvr>
+</p:sld>
+</file>
+
+<file path=ppt/slides/slide5.xml><?xml version="1.0" encoding="utf-8"?>
+<p:sld xmlns:a="http://schemas.openxmlformats.org/drawingml/2006/main" xmlns:r="http://schemas.openxmlformats.org/officeDocument/2006/relationships" xmlns:p="http://schemas.openxmlformats.org/presentationml/2006/main">
+  <p:cSld>
+    <p:spTree>
+      <p:nvGrpSpPr>
+        <p:cNvPr id="1" name=""/>
+        <p:cNvGrpSpPr/>
+        <p:nvPr/>
+      </p:nvGrpSpPr>
+      <p:grpSpPr>
+        <a:xfrm>
+          <a:off x="0" y="0"/>
+          <a:ext cx="0" cy="0"/>
+          <a:chOff x="0" y="0"/>
+          <a:chExt cx="0" cy="0"/>
+        </a:xfrm>
+      </p:grpSpPr>
+      <p:sp>
+        <p:nvSpPr>
+          <p:cNvPr id="2" name="Title 1">
+            <a:extLst>
+              <a:ext uri="{FF2B5EF4-FFF2-40B4-BE49-F238E27FC236}">
+                <a16:creationId xmlns:a16="http://schemas.microsoft.com/office/drawing/2014/main" id="{619879C8-14C8-4CD9-8091-DE42358F7A83}"/>
+              </a:ext>
+            </a:extLst>
+          </p:cNvPr>
+          <p:cNvSpPr>
+            <a:spLocks noGrp="1"/>
+          </p:cNvSpPr>
+          <p:nvPr>
+            <p:ph type="title"/>
+          </p:nvPr>
+        </p:nvSpPr>
+        <p:spPr>
+          <a:xfrm>
+            <a:off x="0" y="0"/>
+            <a:ext cx="11296933" cy="618699"/>
+          </a:xfrm>
+        </p:spPr>
+        <p:txBody>
+          <a:bodyPr>
+            <a:normAutofit fontScale="90000"/>
+          </a:bodyPr>
+          <a:lstStyle/>
+          <a:p>
+            <a:r>
+              <a:rPr lang="en-US" dirty="0"/>
+              <a:t>Get Details About Products in cart(METHOD : POST)</a:t>
+            </a:r>
+            <a:endParaRPr lang="en-IN" dirty="0"/>
+          </a:p>
+        </p:txBody>
+      </p:sp>
+      <p:sp>
+        <p:nvSpPr>
+          <p:cNvPr id="3" name="Content Placeholder 2">
+            <a:extLst>
+              <a:ext uri="{FF2B5EF4-FFF2-40B4-BE49-F238E27FC236}">
+                <a16:creationId xmlns:a16="http://schemas.microsoft.com/office/drawing/2014/main" id="{72A5688A-5D19-4A71-8819-7D437E3B15B2}"/>
+              </a:ext>
+            </a:extLst>
+          </p:cNvPr>
+          <p:cNvSpPr>
+            <a:spLocks noGrp="1"/>
+          </p:cNvSpPr>
+          <p:nvPr>
+            <p:ph idx="1"/>
+          </p:nvPr>
+        </p:nvSpPr>
+        <p:spPr>
+          <a:xfrm>
+            <a:off x="150125" y="618699"/>
+            <a:ext cx="11928144" cy="6109647"/>
+          </a:xfrm>
+        </p:spPr>
+        <p:txBody>
+          <a:bodyPr>
+            <a:normAutofit fontScale="47500" lnSpcReduction="20000"/>
+          </a:bodyPr>
+          <a:lstStyle/>
+          <a:p>
+            <a:r>
+              <a:rPr lang="en-US" sz="5600" dirty="0"/>
+              <a:t>API ENDPOINT : </a:t>
+            </a:r>
+            <a:r>
+              <a:rPr lang="en-IN" sz="5600" dirty="0">
+                <a:hlinkClick r:id="rId2"/>
+              </a:rPr>
+              <a:t>https://lexaapi.uc.r.appspot.com/api/v1/</a:t>
+            </a:r>
+            <a:r>
+              <a:rPr lang="en-IN" sz="5600" b="0" i="0" dirty="0">
+                <a:solidFill>
+                  <a:srgbClr val="F0F0F0"/>
+                </a:solidFill>
+                <a:effectLst/>
+                <a:latin typeface="OpenSans"/>
+                <a:hlinkClick r:id="rId2"/>
+              </a:rPr>
+              <a:t>product/getProductsDetailsInCart</a:t>
+            </a:r>
+            <a:endParaRPr lang="en-IN" sz="5600" b="0" i="0" dirty="0">
+              <a:solidFill>
+                <a:srgbClr val="F0F0F0"/>
+              </a:solidFill>
+              <a:effectLst/>
+              <a:latin typeface="OpenSans"/>
+            </a:endParaRPr>
+          </a:p>
+          <a:p>
+            <a:r>
+              <a:rPr lang="en-IN" sz="5600" dirty="0"/>
+              <a:t>This Routes Doesn’t loop through list and reduce fetch time instead it uses mongo DB's $in method with collection to find the list of products with there unique Ids.</a:t>
+            </a:r>
+          </a:p>
+          <a:p>
+            <a:r>
+              <a:rPr lang="en-IN" sz="5600" dirty="0"/>
+              <a:t>This routes take exact cartsItems as req.body’s key </a:t>
+            </a:r>
+          </a:p>
+          <a:p>
+            <a:r>
+              <a:rPr lang="en-IN" sz="2000" dirty="0"/>
+              <a:t>Example</a:t>
+            </a:r>
+          </a:p>
+          <a:p>
+            <a:r>
+              <a:rPr lang="en-IN" sz="2000" dirty="0"/>
+              <a:t>Input : </a:t>
+            </a:r>
+            <a:r>
+              <a:rPr lang="en-IN" sz="2000" b="0" dirty="0">
+                <a:solidFill>
+                  <a:srgbClr val="D4D4D4"/>
+                </a:solidFill>
+                <a:effectLst/>
+                <a:latin typeface="Consolas" panose="020B0609020204030204" pitchFamily="49" charset="0"/>
+              </a:rPr>
+              <a:t>{</a:t>
+            </a:r>
+            <a:r>
+              <a:rPr lang="en-IN" sz="2000" b="0" dirty="0">
+                <a:solidFill>
+                  <a:srgbClr val="9CDCFE"/>
+                </a:solidFill>
+                <a:effectLst/>
+                <a:latin typeface="Consolas" panose="020B0609020204030204" pitchFamily="49" charset="0"/>
+              </a:rPr>
+              <a:t>"cartItems"</a:t>
+            </a:r>
+            <a:r>
+              <a:rPr lang="en-IN" sz="2000" b="0" dirty="0">
+                <a:solidFill>
+                  <a:srgbClr val="D4D4D4"/>
+                </a:solidFill>
+                <a:effectLst/>
+                <a:latin typeface="Consolas" panose="020B0609020204030204" pitchFamily="49" charset="0"/>
+              </a:rPr>
+              <a:t> </a:t>
+            </a:r>
+            <a:r>
+              <a:rPr lang="en-IN" sz="2000" b="0" dirty="0">
+                <a:solidFill>
+                  <a:srgbClr val="DCDCDC"/>
+                </a:solidFill>
+                <a:effectLst/>
+                <a:latin typeface="Consolas" panose="020B0609020204030204" pitchFamily="49" charset="0"/>
+              </a:rPr>
+              <a:t>:[</a:t>
+            </a:r>
+            <a:r>
+              <a:rPr lang="en-IN" sz="2000" b="0" dirty="0">
+                <a:solidFill>
+                  <a:srgbClr val="9CDCFE"/>
+                </a:solidFill>
+                <a:effectLst/>
+                <a:latin typeface="Consolas" panose="020B0609020204030204" pitchFamily="49" charset="0"/>
+              </a:rPr>
+              <a:t>"5f47986c87c2644624079997"</a:t>
+            </a:r>
+            <a:r>
+              <a:rPr lang="en-IN" sz="2000" b="0" dirty="0">
+                <a:solidFill>
+                  <a:srgbClr val="DCDCDC"/>
+                </a:solidFill>
+                <a:effectLst/>
+                <a:latin typeface="Consolas" panose="020B0609020204030204" pitchFamily="49" charset="0"/>
+              </a:rPr>
+              <a:t>,</a:t>
+            </a:r>
+            <a:r>
+              <a:rPr lang="en-IN" sz="2000" b="0" dirty="0">
+                <a:solidFill>
+                  <a:srgbClr val="9CDCFE"/>
+                </a:solidFill>
+                <a:effectLst/>
+                <a:latin typeface="Consolas" panose="020B0609020204030204" pitchFamily="49" charset="0"/>
+              </a:rPr>
+              <a:t>"5f479cdc87c2644624079998"</a:t>
+            </a:r>
+            <a:r>
+              <a:rPr lang="en-IN" sz="2000" b="0" dirty="0">
+                <a:solidFill>
+                  <a:srgbClr val="DCDCDC"/>
+                </a:solidFill>
+                <a:effectLst/>
+                <a:latin typeface="Consolas" panose="020B0609020204030204" pitchFamily="49" charset="0"/>
+              </a:rPr>
+              <a:t>]}</a:t>
+            </a:r>
+            <a:endParaRPr lang="en-IN" sz="2000" b="0" dirty="0">
+              <a:solidFill>
+                <a:srgbClr val="D4D4D4"/>
+              </a:solidFill>
+              <a:effectLst/>
+              <a:latin typeface="Consolas" panose="020B0609020204030204" pitchFamily="49" charset="0"/>
+            </a:endParaRPr>
+          </a:p>
+          <a:p>
+            <a:r>
+              <a:rPr lang="en-IN" sz="2000" dirty="0"/>
+              <a:t>Output : </a:t>
+            </a:r>
+            <a:r>
+              <a:rPr lang="en-IN" sz="2000" b="0" dirty="0">
+                <a:solidFill>
+                  <a:srgbClr val="DCDCDC"/>
+                </a:solidFill>
+                <a:effectLst/>
+                <a:latin typeface="Consolas" panose="020B0609020204030204" pitchFamily="49" charset="0"/>
+              </a:rPr>
+              <a:t>{</a:t>
+            </a:r>
+            <a:r>
+              <a:rPr lang="en-IN" sz="2000" b="0" dirty="0">
+                <a:solidFill>
+                  <a:srgbClr val="9CDCFE"/>
+                </a:solidFill>
+                <a:effectLst/>
+                <a:latin typeface="Consolas" panose="020B0609020204030204" pitchFamily="49" charset="0"/>
+              </a:rPr>
+              <a:t>"foundResults"</a:t>
+            </a:r>
+            <a:r>
+              <a:rPr lang="en-IN" sz="2000" b="0" dirty="0">
+                <a:solidFill>
+                  <a:srgbClr val="DCDCDC"/>
+                </a:solidFill>
+                <a:effectLst/>
+                <a:latin typeface="Consolas" panose="020B0609020204030204" pitchFamily="49" charset="0"/>
+              </a:rPr>
+              <a:t>:</a:t>
+            </a:r>
+            <a:r>
+              <a:rPr lang="en-IN" sz="2000" b="0" dirty="0">
+                <a:solidFill>
+                  <a:srgbClr val="D4D4D4"/>
+                </a:solidFill>
+                <a:effectLst/>
+                <a:latin typeface="Consolas" panose="020B0609020204030204" pitchFamily="49" charset="0"/>
+              </a:rPr>
+              <a:t> </a:t>
+            </a:r>
+            <a:r>
+              <a:rPr lang="en-IN" sz="2000" b="0" dirty="0">
+                <a:solidFill>
+                  <a:srgbClr val="B5CEA8"/>
+                </a:solidFill>
+                <a:effectLst/>
+                <a:latin typeface="Consolas" panose="020B0609020204030204" pitchFamily="49" charset="0"/>
+              </a:rPr>
+              <a:t>2</a:t>
+            </a:r>
+            <a:r>
+              <a:rPr lang="en-IN" sz="2000" b="0" dirty="0">
+                <a:solidFill>
+                  <a:srgbClr val="DCDCDC"/>
+                </a:solidFill>
+                <a:effectLst/>
+                <a:latin typeface="Consolas" panose="020B0609020204030204" pitchFamily="49" charset="0"/>
+              </a:rPr>
+              <a:t>,</a:t>
+            </a:r>
+            <a:r>
+              <a:rPr lang="en-IN" sz="2000" b="0" dirty="0">
+                <a:solidFill>
+                  <a:srgbClr val="9CDCFE"/>
+                </a:solidFill>
+                <a:effectLst/>
+                <a:latin typeface="Consolas" panose="020B0609020204030204" pitchFamily="49" charset="0"/>
+              </a:rPr>
+              <a:t>"message"</a:t>
+            </a:r>
+            <a:r>
+              <a:rPr lang="en-IN" sz="2000" b="0" dirty="0">
+                <a:solidFill>
+                  <a:srgbClr val="DCDCDC"/>
+                </a:solidFill>
+                <a:effectLst/>
+                <a:latin typeface="Consolas" panose="020B0609020204030204" pitchFamily="49" charset="0"/>
+              </a:rPr>
+              <a:t>:</a:t>
+            </a:r>
+            <a:r>
+              <a:rPr lang="en-IN" sz="2000" b="0" dirty="0">
+                <a:solidFill>
+                  <a:srgbClr val="D4D4D4"/>
+                </a:solidFill>
+                <a:effectLst/>
+                <a:latin typeface="Consolas" panose="020B0609020204030204" pitchFamily="49" charset="0"/>
+              </a:rPr>
+              <a:t> </a:t>
+            </a:r>
+            <a:r>
+              <a:rPr lang="en-IN" sz="2000" b="0" dirty="0">
+                <a:solidFill>
+                  <a:srgbClr val="CE9178"/>
+                </a:solidFill>
+                <a:effectLst/>
+                <a:latin typeface="Consolas" panose="020B0609020204030204" pitchFamily="49" charset="0"/>
+              </a:rPr>
+              <a:t>"Details Of Products in Cart"</a:t>
+            </a:r>
+            <a:r>
+              <a:rPr lang="en-IN" sz="2000" b="0" dirty="0">
+                <a:solidFill>
+                  <a:srgbClr val="DCDCDC"/>
+                </a:solidFill>
+                <a:effectLst/>
+                <a:latin typeface="Consolas" panose="020B0609020204030204" pitchFamily="49" charset="0"/>
+              </a:rPr>
+              <a:t>,</a:t>
+            </a:r>
+            <a:endParaRPr lang="en-IN" sz="2000" b="0" dirty="0">
+              <a:solidFill>
+                <a:srgbClr val="D4D4D4"/>
+              </a:solidFill>
+              <a:effectLst/>
+              <a:latin typeface="Consolas" panose="020B0609020204030204" pitchFamily="49" charset="0"/>
+            </a:endParaRPr>
+          </a:p>
+          <a:p>
+            <a:r>
+              <a:rPr lang="en-IN" sz="2000" b="0" dirty="0">
+                <a:solidFill>
+                  <a:srgbClr val="D4D4D4"/>
+                </a:solidFill>
+                <a:effectLst/>
+                <a:latin typeface="Consolas" panose="020B0609020204030204" pitchFamily="49" charset="0"/>
+              </a:rPr>
+              <a:t>    </a:t>
+            </a:r>
+            <a:r>
+              <a:rPr lang="en-IN" sz="2000" b="0" dirty="0">
+                <a:solidFill>
+                  <a:srgbClr val="9CDCFE"/>
+                </a:solidFill>
+                <a:effectLst/>
+                <a:latin typeface="Consolas" panose="020B0609020204030204" pitchFamily="49" charset="0"/>
+              </a:rPr>
+              <a:t>"details"</a:t>
+            </a:r>
+            <a:r>
+              <a:rPr lang="en-IN" sz="2000" b="0" dirty="0">
+                <a:solidFill>
+                  <a:srgbClr val="DCDCDC"/>
+                </a:solidFill>
+                <a:effectLst/>
+                <a:latin typeface="Consolas" panose="020B0609020204030204" pitchFamily="49" charset="0"/>
+              </a:rPr>
+              <a:t>:</a:t>
+            </a:r>
+            <a:r>
+              <a:rPr lang="en-IN" sz="2000" b="0" dirty="0">
+                <a:solidFill>
+                  <a:srgbClr val="D4D4D4"/>
+                </a:solidFill>
+                <a:effectLst/>
+                <a:latin typeface="Consolas" panose="020B0609020204030204" pitchFamily="49" charset="0"/>
+              </a:rPr>
+              <a:t> </a:t>
+            </a:r>
+            <a:r>
+              <a:rPr lang="en-IN" sz="2000" b="0" dirty="0">
+                <a:solidFill>
+                  <a:srgbClr val="DCDCDC"/>
+                </a:solidFill>
+                <a:effectLst/>
+                <a:latin typeface="Consolas" panose="020B0609020204030204" pitchFamily="49" charset="0"/>
+              </a:rPr>
+              <a:t>[{</a:t>
+            </a:r>
+            <a:endParaRPr lang="en-IN" sz="2000" b="0" dirty="0">
+              <a:solidFill>
+                <a:srgbClr val="D4D4D4"/>
+              </a:solidFill>
+              <a:effectLst/>
+              <a:latin typeface="Consolas" panose="020B0609020204030204" pitchFamily="49" charset="0"/>
+            </a:endParaRPr>
+          </a:p>
+          <a:p>
+            <a:r>
+              <a:rPr lang="en-IN" sz="2000" b="0" dirty="0">
+                <a:solidFill>
+                  <a:srgbClr val="D4D4D4"/>
+                </a:solidFill>
+                <a:effectLst/>
+                <a:latin typeface="Consolas" panose="020B0609020204030204" pitchFamily="49" charset="0"/>
+              </a:rPr>
+              <a:t>            </a:t>
+            </a:r>
+            <a:r>
+              <a:rPr lang="en-IN" sz="2000" b="0" dirty="0">
+                <a:solidFill>
+                  <a:srgbClr val="9CDCFE"/>
+                </a:solidFill>
+                <a:effectLst/>
+                <a:latin typeface="Consolas" panose="020B0609020204030204" pitchFamily="49" charset="0"/>
+              </a:rPr>
+              <a:t>"_id"</a:t>
+            </a:r>
+            <a:r>
+              <a:rPr lang="en-IN" sz="2000" b="0" dirty="0">
+                <a:solidFill>
+                  <a:srgbClr val="DCDCDC"/>
+                </a:solidFill>
+                <a:effectLst/>
+                <a:latin typeface="Consolas" panose="020B0609020204030204" pitchFamily="49" charset="0"/>
+              </a:rPr>
+              <a:t>:</a:t>
+            </a:r>
+            <a:r>
+              <a:rPr lang="en-IN" sz="2000" b="0" dirty="0">
+                <a:solidFill>
+                  <a:srgbClr val="D4D4D4"/>
+                </a:solidFill>
+                <a:effectLst/>
+                <a:latin typeface="Consolas" panose="020B0609020204030204" pitchFamily="49" charset="0"/>
+              </a:rPr>
+              <a:t> </a:t>
+            </a:r>
+            <a:r>
+              <a:rPr lang="en-IN" sz="2000" b="0" dirty="0">
+                <a:solidFill>
+                  <a:srgbClr val="CE9178"/>
+                </a:solidFill>
+                <a:effectLst/>
+                <a:latin typeface="Consolas" panose="020B0609020204030204" pitchFamily="49" charset="0"/>
+              </a:rPr>
+              <a:t>"5f47986c87c2644624079997"</a:t>
+            </a:r>
+            <a:r>
+              <a:rPr lang="en-IN" sz="2000" b="0" dirty="0">
+                <a:solidFill>
+                  <a:srgbClr val="DCDCDC"/>
+                </a:solidFill>
+                <a:effectLst/>
+                <a:latin typeface="Consolas" panose="020B0609020204030204" pitchFamily="49" charset="0"/>
+              </a:rPr>
+              <a:t>,</a:t>
+            </a:r>
+            <a:endParaRPr lang="en-IN" sz="2000" b="0" dirty="0">
+              <a:solidFill>
+                <a:srgbClr val="D4D4D4"/>
+              </a:solidFill>
+              <a:effectLst/>
+              <a:latin typeface="Consolas" panose="020B0609020204030204" pitchFamily="49" charset="0"/>
+            </a:endParaRPr>
+          </a:p>
+          <a:p>
+            <a:r>
+              <a:rPr lang="en-IN" sz="2000" b="0" dirty="0">
+                <a:solidFill>
+                  <a:srgbClr val="D4D4D4"/>
+                </a:solidFill>
+                <a:effectLst/>
+                <a:latin typeface="Consolas" panose="020B0609020204030204" pitchFamily="49" charset="0"/>
+              </a:rPr>
+              <a:t>            </a:t>
+            </a:r>
+            <a:r>
+              <a:rPr lang="en-IN" sz="2000" b="0" dirty="0">
+                <a:solidFill>
+                  <a:srgbClr val="9CDCFE"/>
+                </a:solidFill>
+                <a:effectLst/>
+                <a:latin typeface="Consolas" panose="020B0609020204030204" pitchFamily="49" charset="0"/>
+              </a:rPr>
+              <a:t>"productName"</a:t>
+            </a:r>
+            <a:r>
+              <a:rPr lang="en-IN" sz="2000" b="0" dirty="0">
+                <a:solidFill>
+                  <a:srgbClr val="DCDCDC"/>
+                </a:solidFill>
+                <a:effectLst/>
+                <a:latin typeface="Consolas" panose="020B0609020204030204" pitchFamily="49" charset="0"/>
+              </a:rPr>
+              <a:t>:</a:t>
+            </a:r>
+            <a:r>
+              <a:rPr lang="en-IN" sz="2000" b="0" dirty="0">
+                <a:solidFill>
+                  <a:srgbClr val="D4D4D4"/>
+                </a:solidFill>
+                <a:effectLst/>
+                <a:latin typeface="Consolas" panose="020B0609020204030204" pitchFamily="49" charset="0"/>
+              </a:rPr>
+              <a:t> </a:t>
+            </a:r>
+            <a:r>
+              <a:rPr lang="en-IN" sz="2000" b="0" dirty="0">
+                <a:solidFill>
+                  <a:srgbClr val="CE9178"/>
+                </a:solidFill>
+                <a:effectLst/>
+                <a:latin typeface="Consolas" panose="020B0609020204030204" pitchFamily="49" charset="0"/>
+              </a:rPr>
+              <a:t>"OnePlus 8 (Glacial Green 6GB RAM+128GB Storage)"</a:t>
+            </a:r>
+            <a:r>
+              <a:rPr lang="en-IN" sz="2000" b="0" dirty="0">
+                <a:solidFill>
+                  <a:srgbClr val="DCDCDC"/>
+                </a:solidFill>
+                <a:effectLst/>
+                <a:latin typeface="Consolas" panose="020B0609020204030204" pitchFamily="49" charset="0"/>
+              </a:rPr>
+              <a:t>,</a:t>
+            </a:r>
+            <a:endParaRPr lang="en-IN" sz="2000" b="0" dirty="0">
+              <a:solidFill>
+                <a:srgbClr val="D4D4D4"/>
+              </a:solidFill>
+              <a:effectLst/>
+              <a:latin typeface="Consolas" panose="020B0609020204030204" pitchFamily="49" charset="0"/>
+            </a:endParaRPr>
+          </a:p>
+          <a:p>
+            <a:r>
+              <a:rPr lang="en-IN" sz="2000" b="0" dirty="0">
+                <a:solidFill>
+                  <a:srgbClr val="D4D4D4"/>
+                </a:solidFill>
+                <a:effectLst/>
+                <a:latin typeface="Consolas" panose="020B0609020204030204" pitchFamily="49" charset="0"/>
+              </a:rPr>
+              <a:t>            </a:t>
+            </a:r>
+            <a:r>
+              <a:rPr lang="en-IN" sz="2000" b="0" dirty="0">
+                <a:solidFill>
+                  <a:srgbClr val="9CDCFE"/>
+                </a:solidFill>
+                <a:effectLst/>
+                <a:latin typeface="Consolas" panose="020B0609020204030204" pitchFamily="49" charset="0"/>
+              </a:rPr>
+              <a:t>"categoryId"</a:t>
+            </a:r>
+            <a:r>
+              <a:rPr lang="en-IN" sz="2000" b="0" dirty="0">
+                <a:solidFill>
+                  <a:srgbClr val="DCDCDC"/>
+                </a:solidFill>
+                <a:effectLst/>
+                <a:latin typeface="Consolas" panose="020B0609020204030204" pitchFamily="49" charset="0"/>
+              </a:rPr>
+              <a:t>:</a:t>
+            </a:r>
+            <a:r>
+              <a:rPr lang="en-IN" sz="2000" b="0" dirty="0">
+                <a:solidFill>
+                  <a:srgbClr val="D4D4D4"/>
+                </a:solidFill>
+                <a:effectLst/>
+                <a:latin typeface="Consolas" panose="020B0609020204030204" pitchFamily="49" charset="0"/>
+              </a:rPr>
+              <a:t> </a:t>
+            </a:r>
+            <a:r>
+              <a:rPr lang="en-IN" sz="2000" b="0" dirty="0">
+                <a:solidFill>
+                  <a:srgbClr val="CE9178"/>
+                </a:solidFill>
+                <a:effectLst/>
+                <a:latin typeface="Consolas" panose="020B0609020204030204" pitchFamily="49" charset="0"/>
+              </a:rPr>
+              <a:t>"5f45937abd14352638c6e791"</a:t>
+            </a:r>
+            <a:r>
+              <a:rPr lang="en-IN" sz="2000" b="0" dirty="0">
+                <a:solidFill>
+                  <a:srgbClr val="DCDCDC"/>
+                </a:solidFill>
+                <a:effectLst/>
+                <a:latin typeface="Consolas" panose="020B0609020204030204" pitchFamily="49" charset="0"/>
+              </a:rPr>
+              <a:t>,</a:t>
+            </a:r>
+            <a:endParaRPr lang="en-IN" sz="2000" b="0" dirty="0">
+              <a:solidFill>
+                <a:srgbClr val="D4D4D4"/>
+              </a:solidFill>
+              <a:effectLst/>
+              <a:latin typeface="Consolas" panose="020B0609020204030204" pitchFamily="49" charset="0"/>
+            </a:endParaRPr>
+          </a:p>
+          <a:p>
+            <a:r>
+              <a:rPr lang="en-IN" sz="2000" b="0" dirty="0">
+                <a:solidFill>
+                  <a:srgbClr val="D4D4D4"/>
+                </a:solidFill>
+                <a:effectLst/>
+                <a:latin typeface="Consolas" panose="020B0609020204030204" pitchFamily="49" charset="0"/>
+              </a:rPr>
+              <a:t>            </a:t>
+            </a:r>
+            <a:r>
+              <a:rPr lang="en-IN" sz="2000" b="0" dirty="0">
+                <a:solidFill>
+                  <a:srgbClr val="9CDCFE"/>
+                </a:solidFill>
+                <a:effectLst/>
+                <a:latin typeface="Consolas" panose="020B0609020204030204" pitchFamily="49" charset="0"/>
+              </a:rPr>
+              <a:t>"productPrice"</a:t>
+            </a:r>
+            <a:r>
+              <a:rPr lang="en-IN" sz="2000" b="0" dirty="0">
+                <a:solidFill>
+                  <a:srgbClr val="DCDCDC"/>
+                </a:solidFill>
+                <a:effectLst/>
+                <a:latin typeface="Consolas" panose="020B0609020204030204" pitchFamily="49" charset="0"/>
+              </a:rPr>
+              <a:t>:</a:t>
+            </a:r>
+            <a:r>
+              <a:rPr lang="en-IN" sz="2000" b="0" dirty="0">
+                <a:solidFill>
+                  <a:srgbClr val="D4D4D4"/>
+                </a:solidFill>
+                <a:effectLst/>
+                <a:latin typeface="Consolas" panose="020B0609020204030204" pitchFamily="49" charset="0"/>
+              </a:rPr>
+              <a:t> </a:t>
+            </a:r>
+            <a:r>
+              <a:rPr lang="en-IN" sz="2000" b="0" dirty="0">
+                <a:solidFill>
+                  <a:srgbClr val="B5CEA8"/>
+                </a:solidFill>
+                <a:effectLst/>
+                <a:latin typeface="Consolas" panose="020B0609020204030204" pitchFamily="49" charset="0"/>
+              </a:rPr>
+              <a:t>41999</a:t>
+            </a:r>
+            <a:r>
+              <a:rPr lang="en-IN" sz="2000" b="0" dirty="0">
+                <a:solidFill>
+                  <a:srgbClr val="DCDCDC"/>
+                </a:solidFill>
+                <a:effectLst/>
+                <a:latin typeface="Consolas" panose="020B0609020204030204" pitchFamily="49" charset="0"/>
+              </a:rPr>
+              <a:t>,</a:t>
+            </a:r>
+            <a:endParaRPr lang="en-IN" sz="2000" b="0" dirty="0">
+              <a:solidFill>
+                <a:srgbClr val="D4D4D4"/>
+              </a:solidFill>
+              <a:effectLst/>
+              <a:latin typeface="Consolas" panose="020B0609020204030204" pitchFamily="49" charset="0"/>
+            </a:endParaRPr>
+          </a:p>
+          <a:p>
+            <a:r>
+              <a:rPr lang="en-IN" sz="2000" b="0" dirty="0">
+                <a:solidFill>
+                  <a:srgbClr val="D4D4D4"/>
+                </a:solidFill>
+                <a:effectLst/>
+                <a:latin typeface="Consolas" panose="020B0609020204030204" pitchFamily="49" charset="0"/>
+              </a:rPr>
+              <a:t>            </a:t>
+            </a:r>
+            <a:r>
+              <a:rPr lang="en-IN" sz="2000" b="0" dirty="0">
+                <a:solidFill>
+                  <a:srgbClr val="9CDCFE"/>
+                </a:solidFill>
+                <a:effectLst/>
+                <a:latin typeface="Consolas" panose="020B0609020204030204" pitchFamily="49" charset="0"/>
+              </a:rPr>
+              <a:t>"productCoverImage"</a:t>
+            </a:r>
+            <a:r>
+              <a:rPr lang="en-IN" sz="2000" b="0" dirty="0">
+                <a:solidFill>
+                  <a:srgbClr val="DCDCDC"/>
+                </a:solidFill>
+                <a:effectLst/>
+                <a:latin typeface="Consolas" panose="020B0609020204030204" pitchFamily="49" charset="0"/>
+              </a:rPr>
+              <a:t>:</a:t>
+            </a:r>
+            <a:r>
+              <a:rPr lang="en-IN" sz="2000" b="0" dirty="0">
+                <a:solidFill>
+                  <a:srgbClr val="D4D4D4"/>
+                </a:solidFill>
+                <a:effectLst/>
+                <a:latin typeface="Consolas" panose="020B0609020204030204" pitchFamily="49" charset="0"/>
+              </a:rPr>
+              <a:t> </a:t>
+            </a:r>
+            <a:r>
+              <a:rPr lang="en-IN" sz="2000" b="0" dirty="0">
+                <a:solidFill>
+                  <a:srgbClr val="CE9178"/>
+                </a:solidFill>
+                <a:effectLst/>
+                <a:latin typeface="Consolas" panose="020B0609020204030204" pitchFamily="49" charset="0"/>
+              </a:rPr>
+              <a:t>"https://storage.googleapis.com/lexa-product-covers/oneplus8glacialgreen.jpg"</a:t>
+            </a:r>
+            <a:r>
+              <a:rPr lang="en-IN" sz="2000" b="0" dirty="0">
+                <a:solidFill>
+                  <a:srgbClr val="DCDCDC"/>
+                </a:solidFill>
+                <a:effectLst/>
+                <a:latin typeface="Consolas" panose="020B0609020204030204" pitchFamily="49" charset="0"/>
+              </a:rPr>
+              <a:t>,</a:t>
+            </a:r>
+            <a:endParaRPr lang="en-IN" sz="2000" b="0" dirty="0">
+              <a:solidFill>
+                <a:srgbClr val="D4D4D4"/>
+              </a:solidFill>
+              <a:effectLst/>
+              <a:latin typeface="Consolas" panose="020B0609020204030204" pitchFamily="49" charset="0"/>
+            </a:endParaRPr>
+          </a:p>
+          <a:p>
+            <a:r>
+              <a:rPr lang="en-IN" sz="2000" b="0" dirty="0">
+                <a:solidFill>
+                  <a:srgbClr val="D4D4D4"/>
+                </a:solidFill>
+                <a:effectLst/>
+                <a:latin typeface="Consolas" panose="020B0609020204030204" pitchFamily="49" charset="0"/>
+              </a:rPr>
+              <a:t>            </a:t>
+            </a:r>
+            <a:r>
+              <a:rPr lang="en-IN" sz="2000" b="0" dirty="0">
+                <a:solidFill>
+                  <a:srgbClr val="9CDCFE"/>
+                </a:solidFill>
+                <a:effectLst/>
+                <a:latin typeface="Consolas" panose="020B0609020204030204" pitchFamily="49" charset="0"/>
+              </a:rPr>
+              <a:t>"id"</a:t>
+            </a:r>
+            <a:r>
+              <a:rPr lang="en-IN" sz="2000" b="0" dirty="0">
+                <a:solidFill>
+                  <a:srgbClr val="DCDCDC"/>
+                </a:solidFill>
+                <a:effectLst/>
+                <a:latin typeface="Consolas" panose="020B0609020204030204" pitchFamily="49" charset="0"/>
+              </a:rPr>
+              <a:t>:</a:t>
+            </a:r>
+            <a:r>
+              <a:rPr lang="en-IN" sz="2000" b="0" dirty="0">
+                <a:solidFill>
+                  <a:srgbClr val="D4D4D4"/>
+                </a:solidFill>
+                <a:effectLst/>
+                <a:latin typeface="Consolas" panose="020B0609020204030204" pitchFamily="49" charset="0"/>
+              </a:rPr>
+              <a:t> </a:t>
+            </a:r>
+            <a:r>
+              <a:rPr lang="en-IN" sz="2000" b="0" dirty="0">
+                <a:solidFill>
+                  <a:srgbClr val="CE9178"/>
+                </a:solidFill>
+                <a:effectLst/>
+                <a:latin typeface="Consolas" panose="020B0609020204030204" pitchFamily="49" charset="0"/>
+              </a:rPr>
+              <a:t>"5f47986c87c2644624079997"</a:t>
+            </a:r>
+            <a:r>
+              <a:rPr lang="en-IN" sz="2000" b="0" dirty="0">
+                <a:solidFill>
+                  <a:srgbClr val="DCDCDC"/>
+                </a:solidFill>
+                <a:effectLst/>
+                <a:latin typeface="Consolas" panose="020B0609020204030204" pitchFamily="49" charset="0"/>
+              </a:rPr>
+              <a:t>},{</a:t>
+            </a:r>
+            <a:endParaRPr lang="en-IN" sz="2000" b="0" dirty="0">
+              <a:solidFill>
+                <a:srgbClr val="D4D4D4"/>
+              </a:solidFill>
+              <a:effectLst/>
+              <a:latin typeface="Consolas" panose="020B0609020204030204" pitchFamily="49" charset="0"/>
+            </a:endParaRPr>
+          </a:p>
+          <a:p>
+            <a:r>
+              <a:rPr lang="en-IN" sz="2000" b="0" dirty="0">
+                <a:solidFill>
+                  <a:srgbClr val="D4D4D4"/>
+                </a:solidFill>
+                <a:effectLst/>
+                <a:latin typeface="Consolas" panose="020B0609020204030204" pitchFamily="49" charset="0"/>
+              </a:rPr>
+              <a:t>            </a:t>
+            </a:r>
+            <a:r>
+              <a:rPr lang="en-IN" sz="2000" b="0" dirty="0">
+                <a:solidFill>
+                  <a:srgbClr val="9CDCFE"/>
+                </a:solidFill>
+                <a:effectLst/>
+                <a:latin typeface="Consolas" panose="020B0609020204030204" pitchFamily="49" charset="0"/>
+              </a:rPr>
+              <a:t>"_id"</a:t>
+            </a:r>
+            <a:r>
+              <a:rPr lang="en-IN" sz="2000" b="0" dirty="0">
+                <a:solidFill>
+                  <a:srgbClr val="DCDCDC"/>
+                </a:solidFill>
+                <a:effectLst/>
+                <a:latin typeface="Consolas" panose="020B0609020204030204" pitchFamily="49" charset="0"/>
+              </a:rPr>
+              <a:t>:</a:t>
+            </a:r>
+            <a:r>
+              <a:rPr lang="en-IN" sz="2000" b="0" dirty="0">
+                <a:solidFill>
+                  <a:srgbClr val="D4D4D4"/>
+                </a:solidFill>
+                <a:effectLst/>
+                <a:latin typeface="Consolas" panose="020B0609020204030204" pitchFamily="49" charset="0"/>
+              </a:rPr>
+              <a:t> </a:t>
+            </a:r>
+            <a:r>
+              <a:rPr lang="en-IN" sz="2000" b="0" dirty="0">
+                <a:solidFill>
+                  <a:srgbClr val="CE9178"/>
+                </a:solidFill>
+                <a:effectLst/>
+                <a:latin typeface="Consolas" panose="020B0609020204030204" pitchFamily="49" charset="0"/>
+              </a:rPr>
+              <a:t>"5f479cdc87c2644624079998"</a:t>
+            </a:r>
+            <a:r>
+              <a:rPr lang="en-IN" sz="2000" b="0" dirty="0">
+                <a:solidFill>
+                  <a:srgbClr val="DCDCDC"/>
+                </a:solidFill>
+                <a:effectLst/>
+                <a:latin typeface="Consolas" panose="020B0609020204030204" pitchFamily="49" charset="0"/>
+              </a:rPr>
+              <a:t>,</a:t>
+            </a:r>
+            <a:endParaRPr lang="en-IN" sz="2000" b="0" dirty="0">
+              <a:solidFill>
+                <a:srgbClr val="D4D4D4"/>
+              </a:solidFill>
+              <a:effectLst/>
+              <a:latin typeface="Consolas" panose="020B0609020204030204" pitchFamily="49" charset="0"/>
+            </a:endParaRPr>
+          </a:p>
+          <a:p>
+            <a:r>
+              <a:rPr lang="en-IN" sz="2000" b="0" dirty="0">
+                <a:solidFill>
+                  <a:srgbClr val="D4D4D4"/>
+                </a:solidFill>
+                <a:effectLst/>
+                <a:latin typeface="Consolas" panose="020B0609020204030204" pitchFamily="49" charset="0"/>
+              </a:rPr>
+              <a:t>            </a:t>
+            </a:r>
+            <a:r>
+              <a:rPr lang="en-IN" sz="2000" b="0" dirty="0">
+                <a:solidFill>
+                  <a:srgbClr val="9CDCFE"/>
+                </a:solidFill>
+                <a:effectLst/>
+                <a:latin typeface="Consolas" panose="020B0609020204030204" pitchFamily="49" charset="0"/>
+              </a:rPr>
+              <a:t>"productName"</a:t>
+            </a:r>
+            <a:r>
+              <a:rPr lang="en-IN" sz="2000" b="0" dirty="0">
+                <a:solidFill>
+                  <a:srgbClr val="DCDCDC"/>
+                </a:solidFill>
+                <a:effectLst/>
+                <a:latin typeface="Consolas" panose="020B0609020204030204" pitchFamily="49" charset="0"/>
+              </a:rPr>
+              <a:t>:</a:t>
+            </a:r>
+            <a:r>
+              <a:rPr lang="en-IN" sz="2000" b="0" dirty="0">
+                <a:solidFill>
+                  <a:srgbClr val="D4D4D4"/>
+                </a:solidFill>
+                <a:effectLst/>
+                <a:latin typeface="Consolas" panose="020B0609020204030204" pitchFamily="49" charset="0"/>
+              </a:rPr>
+              <a:t> </a:t>
+            </a:r>
+            <a:r>
+              <a:rPr lang="en-IN" sz="2000" b="0" dirty="0">
+                <a:solidFill>
+                  <a:srgbClr val="CE9178"/>
+                </a:solidFill>
+                <a:effectLst/>
+                <a:latin typeface="Consolas" panose="020B0609020204030204" pitchFamily="49" charset="0"/>
+              </a:rPr>
+              <a:t>"Apple iPhone 11 (64GB) - Black"</a:t>
+            </a:r>
+            <a:r>
+              <a:rPr lang="en-IN" sz="2000" b="0" dirty="0">
+                <a:solidFill>
+                  <a:srgbClr val="DCDCDC"/>
+                </a:solidFill>
+                <a:effectLst/>
+                <a:latin typeface="Consolas" panose="020B0609020204030204" pitchFamily="49" charset="0"/>
+              </a:rPr>
+              <a:t>,</a:t>
+            </a:r>
+            <a:endParaRPr lang="en-IN" sz="2000" b="0" dirty="0">
+              <a:solidFill>
+                <a:srgbClr val="D4D4D4"/>
+              </a:solidFill>
+              <a:effectLst/>
+              <a:latin typeface="Consolas" panose="020B0609020204030204" pitchFamily="49" charset="0"/>
+            </a:endParaRPr>
+          </a:p>
+          <a:p>
+            <a:r>
+              <a:rPr lang="en-IN" sz="2000" b="0" dirty="0">
+                <a:solidFill>
+                  <a:srgbClr val="D4D4D4"/>
+                </a:solidFill>
+                <a:effectLst/>
+                <a:latin typeface="Consolas" panose="020B0609020204030204" pitchFamily="49" charset="0"/>
+              </a:rPr>
+              <a:t>            </a:t>
+            </a:r>
+            <a:r>
+              <a:rPr lang="en-IN" sz="2000" b="0" dirty="0">
+                <a:solidFill>
+                  <a:srgbClr val="9CDCFE"/>
+                </a:solidFill>
+                <a:effectLst/>
+                <a:latin typeface="Consolas" panose="020B0609020204030204" pitchFamily="49" charset="0"/>
+              </a:rPr>
+              <a:t>"categoryId"</a:t>
+            </a:r>
+            <a:r>
+              <a:rPr lang="en-IN" sz="2000" b="0" dirty="0">
+                <a:solidFill>
+                  <a:srgbClr val="DCDCDC"/>
+                </a:solidFill>
+                <a:effectLst/>
+                <a:latin typeface="Consolas" panose="020B0609020204030204" pitchFamily="49" charset="0"/>
+              </a:rPr>
+              <a:t>:</a:t>
+            </a:r>
+            <a:r>
+              <a:rPr lang="en-IN" sz="2000" b="0" dirty="0">
+                <a:solidFill>
+                  <a:srgbClr val="D4D4D4"/>
+                </a:solidFill>
+                <a:effectLst/>
+                <a:latin typeface="Consolas" panose="020B0609020204030204" pitchFamily="49" charset="0"/>
+              </a:rPr>
+              <a:t> </a:t>
+            </a:r>
+            <a:r>
+              <a:rPr lang="en-IN" sz="2000" b="0" dirty="0">
+                <a:solidFill>
+                  <a:srgbClr val="CE9178"/>
+                </a:solidFill>
+                <a:effectLst/>
+                <a:latin typeface="Consolas" panose="020B0609020204030204" pitchFamily="49" charset="0"/>
+              </a:rPr>
+              <a:t>"5f45937abd14352638c6e791"</a:t>
+            </a:r>
+            <a:r>
+              <a:rPr lang="en-IN" sz="2000" b="0" dirty="0">
+                <a:solidFill>
+                  <a:srgbClr val="DCDCDC"/>
+                </a:solidFill>
+                <a:effectLst/>
+                <a:latin typeface="Consolas" panose="020B0609020204030204" pitchFamily="49" charset="0"/>
+              </a:rPr>
+              <a:t>,</a:t>
+            </a:r>
+            <a:endParaRPr lang="en-IN" sz="2000" b="0" dirty="0">
+              <a:solidFill>
+                <a:srgbClr val="D4D4D4"/>
+              </a:solidFill>
+              <a:effectLst/>
+              <a:latin typeface="Consolas" panose="020B0609020204030204" pitchFamily="49" charset="0"/>
+            </a:endParaRPr>
+          </a:p>
+          <a:p>
+            <a:r>
+              <a:rPr lang="en-IN" sz="2000" b="0" dirty="0">
+                <a:solidFill>
+                  <a:srgbClr val="D4D4D4"/>
+                </a:solidFill>
+                <a:effectLst/>
+                <a:latin typeface="Consolas" panose="020B0609020204030204" pitchFamily="49" charset="0"/>
+              </a:rPr>
+              <a:t>            </a:t>
+            </a:r>
+            <a:r>
+              <a:rPr lang="en-IN" sz="2000" b="0" dirty="0">
+                <a:solidFill>
+                  <a:srgbClr val="9CDCFE"/>
+                </a:solidFill>
+                <a:effectLst/>
+                <a:latin typeface="Consolas" panose="020B0609020204030204" pitchFamily="49" charset="0"/>
+              </a:rPr>
+              <a:t>"productPrice"</a:t>
+            </a:r>
+            <a:r>
+              <a:rPr lang="en-IN" sz="2000" b="0" dirty="0">
+                <a:solidFill>
+                  <a:srgbClr val="DCDCDC"/>
+                </a:solidFill>
+                <a:effectLst/>
+                <a:latin typeface="Consolas" panose="020B0609020204030204" pitchFamily="49" charset="0"/>
+              </a:rPr>
+              <a:t>:</a:t>
+            </a:r>
+            <a:r>
+              <a:rPr lang="en-IN" sz="2000" b="0" dirty="0">
+                <a:solidFill>
+                  <a:srgbClr val="D4D4D4"/>
+                </a:solidFill>
+                <a:effectLst/>
+                <a:latin typeface="Consolas" panose="020B0609020204030204" pitchFamily="49" charset="0"/>
+              </a:rPr>
+              <a:t> </a:t>
+            </a:r>
+            <a:r>
+              <a:rPr lang="en-IN" sz="2000" b="0" dirty="0">
+                <a:solidFill>
+                  <a:srgbClr val="B5CEA8"/>
+                </a:solidFill>
+                <a:effectLst/>
+                <a:latin typeface="Consolas" panose="020B0609020204030204" pitchFamily="49" charset="0"/>
+              </a:rPr>
+              <a:t>68300</a:t>
+            </a:r>
+            <a:r>
+              <a:rPr lang="en-IN" sz="2000" b="0" dirty="0">
+                <a:solidFill>
+                  <a:srgbClr val="DCDCDC"/>
+                </a:solidFill>
+                <a:effectLst/>
+                <a:latin typeface="Consolas" panose="020B0609020204030204" pitchFamily="49" charset="0"/>
+              </a:rPr>
+              <a:t>,</a:t>
+            </a:r>
+            <a:endParaRPr lang="en-IN" sz="2000" b="0" dirty="0">
+              <a:solidFill>
+                <a:srgbClr val="D4D4D4"/>
+              </a:solidFill>
+              <a:effectLst/>
+              <a:latin typeface="Consolas" panose="020B0609020204030204" pitchFamily="49" charset="0"/>
+            </a:endParaRPr>
+          </a:p>
+          <a:p>
+            <a:r>
+              <a:rPr lang="en-IN" sz="2000" b="0" dirty="0">
+                <a:solidFill>
+                  <a:srgbClr val="D4D4D4"/>
+                </a:solidFill>
+                <a:effectLst/>
+                <a:latin typeface="Consolas" panose="020B0609020204030204" pitchFamily="49" charset="0"/>
+              </a:rPr>
+              <a:t>            </a:t>
+            </a:r>
+            <a:r>
+              <a:rPr lang="en-IN" sz="2000" b="0" dirty="0">
+                <a:solidFill>
+                  <a:srgbClr val="9CDCFE"/>
+                </a:solidFill>
+                <a:effectLst/>
+                <a:latin typeface="Consolas" panose="020B0609020204030204" pitchFamily="49" charset="0"/>
+              </a:rPr>
+              <a:t>"productCoverImage"</a:t>
+            </a:r>
+            <a:r>
+              <a:rPr lang="en-IN" sz="2000" b="0" dirty="0">
+                <a:solidFill>
+                  <a:srgbClr val="DCDCDC"/>
+                </a:solidFill>
+                <a:effectLst/>
+                <a:latin typeface="Consolas" panose="020B0609020204030204" pitchFamily="49" charset="0"/>
+              </a:rPr>
+              <a:t>:</a:t>
+            </a:r>
+            <a:r>
+              <a:rPr lang="en-IN" sz="2000" b="0" dirty="0">
+                <a:solidFill>
+                  <a:srgbClr val="D4D4D4"/>
+                </a:solidFill>
+                <a:effectLst/>
+                <a:latin typeface="Consolas" panose="020B0609020204030204" pitchFamily="49" charset="0"/>
+              </a:rPr>
+              <a:t> </a:t>
+            </a:r>
+            <a:r>
+              <a:rPr lang="en-IN" sz="2000" b="0" dirty="0">
+                <a:solidFill>
+                  <a:srgbClr val="CE9178"/>
+                </a:solidFill>
+                <a:effectLst/>
+                <a:latin typeface="Consolas" panose="020B0609020204030204" pitchFamily="49" charset="0"/>
+              </a:rPr>
+              <a:t>"https://storage.googleapis.com/lexa-product-covers/iphone11.jpg"</a:t>
+            </a:r>
+            <a:r>
+              <a:rPr lang="en-IN" sz="2000" b="0" dirty="0">
+                <a:solidFill>
+                  <a:srgbClr val="DCDCDC"/>
+                </a:solidFill>
+                <a:effectLst/>
+                <a:latin typeface="Consolas" panose="020B0609020204030204" pitchFamily="49" charset="0"/>
+              </a:rPr>
+              <a:t>,</a:t>
+            </a:r>
+            <a:endParaRPr lang="en-IN" sz="2000" b="0" dirty="0">
+              <a:solidFill>
+                <a:srgbClr val="D4D4D4"/>
+              </a:solidFill>
+              <a:effectLst/>
+              <a:latin typeface="Consolas" panose="020B0609020204030204" pitchFamily="49" charset="0"/>
+            </a:endParaRPr>
+          </a:p>
+          <a:p>
+            <a:r>
+              <a:rPr lang="en-IN" sz="2000" b="0" dirty="0">
+                <a:solidFill>
+                  <a:srgbClr val="D4D4D4"/>
+                </a:solidFill>
+                <a:effectLst/>
+                <a:latin typeface="Consolas" panose="020B0609020204030204" pitchFamily="49" charset="0"/>
+              </a:rPr>
+              <a:t>            </a:t>
+            </a:r>
+            <a:r>
+              <a:rPr lang="en-IN" sz="2000" b="0" dirty="0">
+                <a:solidFill>
+                  <a:srgbClr val="9CDCFE"/>
+                </a:solidFill>
+                <a:effectLst/>
+                <a:latin typeface="Consolas" panose="020B0609020204030204" pitchFamily="49" charset="0"/>
+              </a:rPr>
+              <a:t>"id"</a:t>
+            </a:r>
+            <a:r>
+              <a:rPr lang="en-IN" sz="2000" b="0" dirty="0">
+                <a:solidFill>
+                  <a:srgbClr val="DCDCDC"/>
+                </a:solidFill>
+                <a:effectLst/>
+                <a:latin typeface="Consolas" panose="020B0609020204030204" pitchFamily="49" charset="0"/>
+              </a:rPr>
+              <a:t>:</a:t>
+            </a:r>
+            <a:r>
+              <a:rPr lang="en-IN" sz="2000" b="0" dirty="0">
+                <a:solidFill>
+                  <a:srgbClr val="D4D4D4"/>
+                </a:solidFill>
+                <a:effectLst/>
+                <a:latin typeface="Consolas" panose="020B0609020204030204" pitchFamily="49" charset="0"/>
+              </a:rPr>
+              <a:t> </a:t>
+            </a:r>
+            <a:r>
+              <a:rPr lang="en-IN" sz="2000" b="0" dirty="0">
+                <a:solidFill>
+                  <a:srgbClr val="CE9178"/>
+                </a:solidFill>
+                <a:effectLst/>
+                <a:latin typeface="Consolas" panose="020B0609020204030204" pitchFamily="49" charset="0"/>
+              </a:rPr>
+              <a:t>"5f479cdc87c2644624079998"</a:t>
+            </a:r>
+            <a:r>
+              <a:rPr lang="en-IN" sz="2000" b="0" dirty="0">
+                <a:solidFill>
+                  <a:srgbClr val="DCDCDC"/>
+                </a:solidFill>
+                <a:effectLst/>
+                <a:latin typeface="Consolas" panose="020B0609020204030204" pitchFamily="49" charset="0"/>
+              </a:rPr>
+              <a:t>}]}</a:t>
+            </a:r>
+            <a:endParaRPr lang="en-IN" sz="2000" b="0" dirty="0">
+              <a:solidFill>
+                <a:srgbClr val="D4D4D4"/>
+              </a:solidFill>
+              <a:effectLst/>
+              <a:latin typeface="Consolas" panose="020B0609020204030204" pitchFamily="49" charset="0"/>
+            </a:endParaRPr>
+          </a:p>
+          <a:p>
+            <a:endParaRPr lang="en-IN" dirty="0"/>
+          </a:p>
+        </p:txBody>
+      </p:sp>
+    </p:spTree>
+    <p:extLst>
+      <p:ext uri="{BB962C8B-B14F-4D97-AF65-F5344CB8AC3E}">
+        <p14:creationId xmlns:p14="http://schemas.microsoft.com/office/powerpoint/2010/main" val="2535831858"/>
       </p:ext>
     </p:extLst>
   </p:cSld>

</xml_diff>

<commit_message>
new endpoints with example pics added
</commit_message>
<xml_diff>
--- a/Docs/API/product.pptx
+++ b/Docs/API/product.pptx
@@ -10,6 +10,7 @@
     <p:sldId id="258" r:id="rId4"/>
     <p:sldId id="259" r:id="rId5"/>
     <p:sldId id="260" r:id="rId6"/>
+    <p:sldId id="261" r:id="rId7"/>
   </p:sldIdLst>
   <p:sldSz cx="12192000" cy="6858000"/>
   <p:notesSz cx="6858000" cy="9144000"/>
@@ -345,7 +346,7 @@
           <a:p>
             <a:fld id="{D8A0B6F2-4A3A-46BF-8B98-B658E741CCB2}" type="datetimeFigureOut">
               <a:rPr lang="en-IN" smtClean="0"/>
-              <a:t>31-08-2020</a:t>
+              <a:t>02-09-2020</a:t>
             </a:fld>
             <a:endParaRPr lang="en-IN"/>
           </a:p>
@@ -679,7 +680,7 @@
           <a:p>
             <a:fld id="{D8A0B6F2-4A3A-46BF-8B98-B658E741CCB2}" type="datetimeFigureOut">
               <a:rPr lang="en-IN" smtClean="0"/>
-              <a:t>31-08-2020</a:t>
+              <a:t>02-09-2020</a:t>
             </a:fld>
             <a:endParaRPr lang="en-IN"/>
           </a:p>
@@ -957,7 +958,7 @@
           <a:p>
             <a:fld id="{D8A0B6F2-4A3A-46BF-8B98-B658E741CCB2}" type="datetimeFigureOut">
               <a:rPr lang="en-IN" smtClean="0"/>
-              <a:t>31-08-2020</a:t>
+              <a:t>02-09-2020</a:t>
             </a:fld>
             <a:endParaRPr lang="en-IN"/>
           </a:p>
@@ -1525,7 +1526,7 @@
           <a:p>
             <a:fld id="{D8A0B6F2-4A3A-46BF-8B98-B658E741CCB2}" type="datetimeFigureOut">
               <a:rPr lang="en-IN" smtClean="0"/>
-              <a:t>31-08-2020</a:t>
+              <a:t>02-09-2020</a:t>
             </a:fld>
             <a:endParaRPr lang="en-IN"/>
           </a:p>
@@ -1803,7 +1804,7 @@
           <a:p>
             <a:fld id="{D8A0B6F2-4A3A-46BF-8B98-B658E741CCB2}" type="datetimeFigureOut">
               <a:rPr lang="en-IN" smtClean="0"/>
-              <a:t>31-08-2020</a:t>
+              <a:t>02-09-2020</a:t>
             </a:fld>
             <a:endParaRPr lang="en-IN"/>
           </a:p>
@@ -2365,7 +2366,7 @@
           <a:p>
             <a:fld id="{D8A0B6F2-4A3A-46BF-8B98-B658E741CCB2}" type="datetimeFigureOut">
               <a:rPr lang="en-IN" smtClean="0"/>
-              <a:t>31-08-2020</a:t>
+              <a:t>02-09-2020</a:t>
             </a:fld>
             <a:endParaRPr lang="en-IN"/>
           </a:p>
@@ -2692,7 +2693,7 @@
           <a:p>
             <a:fld id="{D8A0B6F2-4A3A-46BF-8B98-B658E741CCB2}" type="datetimeFigureOut">
               <a:rPr lang="en-IN" smtClean="0"/>
-              <a:t>31-08-2020</a:t>
+              <a:t>02-09-2020</a:t>
             </a:fld>
             <a:endParaRPr lang="en-IN"/>
           </a:p>
@@ -2869,7 +2870,7 @@
           <a:p>
             <a:fld id="{D8A0B6F2-4A3A-46BF-8B98-B658E741CCB2}" type="datetimeFigureOut">
               <a:rPr lang="en-IN" smtClean="0"/>
-              <a:t>31-08-2020</a:t>
+              <a:t>02-09-2020</a:t>
             </a:fld>
             <a:endParaRPr lang="en-IN"/>
           </a:p>
@@ -3107,7 +3108,7 @@
           <a:p>
             <a:fld id="{D8A0B6F2-4A3A-46BF-8B98-B658E741CCB2}" type="datetimeFigureOut">
               <a:rPr lang="en-IN" smtClean="0"/>
-              <a:t>31-08-2020</a:t>
+              <a:t>02-09-2020</a:t>
             </a:fld>
             <a:endParaRPr lang="en-IN"/>
           </a:p>
@@ -3307,7 +3308,7 @@
           <a:p>
             <a:fld id="{D8A0B6F2-4A3A-46BF-8B98-B658E741CCB2}" type="datetimeFigureOut">
               <a:rPr lang="en-IN" smtClean="0"/>
-              <a:t>31-08-2020</a:t>
+              <a:t>02-09-2020</a:t>
             </a:fld>
             <a:endParaRPr lang="en-IN"/>
           </a:p>
@@ -3583,7 +3584,7 @@
           <a:p>
             <a:fld id="{D8A0B6F2-4A3A-46BF-8B98-B658E741CCB2}" type="datetimeFigureOut">
               <a:rPr lang="en-IN" smtClean="0"/>
-              <a:t>31-08-2020</a:t>
+              <a:t>02-09-2020</a:t>
             </a:fld>
             <a:endParaRPr lang="en-IN"/>
           </a:p>
@@ -3849,7 +3850,7 @@
           <a:p>
             <a:fld id="{D8A0B6F2-4A3A-46BF-8B98-B658E741CCB2}" type="datetimeFigureOut">
               <a:rPr lang="en-IN" smtClean="0"/>
-              <a:t>31-08-2020</a:t>
+              <a:t>02-09-2020</a:t>
             </a:fld>
             <a:endParaRPr lang="en-IN"/>
           </a:p>
@@ -4223,7 +4224,7 @@
           <a:p>
             <a:fld id="{D8A0B6F2-4A3A-46BF-8B98-B658E741CCB2}" type="datetimeFigureOut">
               <a:rPr lang="en-IN" smtClean="0"/>
-              <a:t>31-08-2020</a:t>
+              <a:t>02-09-2020</a:t>
             </a:fld>
             <a:endParaRPr lang="en-IN"/>
           </a:p>
@@ -4371,7 +4372,7 @@
           <a:p>
             <a:fld id="{D8A0B6F2-4A3A-46BF-8B98-B658E741CCB2}" type="datetimeFigureOut">
               <a:rPr lang="en-IN" smtClean="0"/>
-              <a:t>31-08-2020</a:t>
+              <a:t>02-09-2020</a:t>
             </a:fld>
             <a:endParaRPr lang="en-IN"/>
           </a:p>
@@ -4496,7 +4497,7 @@
           <a:p>
             <a:fld id="{D8A0B6F2-4A3A-46BF-8B98-B658E741CCB2}" type="datetimeFigureOut">
               <a:rPr lang="en-IN" smtClean="0"/>
-              <a:t>31-08-2020</a:t>
+              <a:t>02-09-2020</a:t>
             </a:fld>
             <a:endParaRPr lang="en-IN"/>
           </a:p>
@@ -4781,7 +4782,7 @@
           <a:p>
             <a:fld id="{D8A0B6F2-4A3A-46BF-8B98-B658E741CCB2}" type="datetimeFigureOut">
               <a:rPr lang="en-IN" smtClean="0"/>
-              <a:t>31-08-2020</a:t>
+              <a:t>02-09-2020</a:t>
             </a:fld>
             <a:endParaRPr lang="en-IN"/>
           </a:p>
@@ -5105,7 +5106,7 @@
           <a:p>
             <a:fld id="{D8A0B6F2-4A3A-46BF-8B98-B658E741CCB2}" type="datetimeFigureOut">
               <a:rPr lang="en-IN" smtClean="0"/>
-              <a:t>31-08-2020</a:t>
+              <a:t>02-09-2020</a:t>
             </a:fld>
             <a:endParaRPr lang="en-IN"/>
           </a:p>
@@ -5319,7 +5320,7 @@
           <a:p>
             <a:fld id="{D8A0B6F2-4A3A-46BF-8B98-B658E741CCB2}" type="datetimeFigureOut">
               <a:rPr lang="en-IN" smtClean="0"/>
-              <a:t>31-08-2020</a:t>
+              <a:t>02-09-2020</a:t>
             </a:fld>
             <a:endParaRPr lang="en-IN"/>
           </a:p>
@@ -5961,7 +5962,7 @@
         </p:nvSpPr>
         <p:spPr>
           <a:xfrm>
-            <a:off x="122830" y="313898"/>
+            <a:off x="54591" y="0"/>
             <a:ext cx="8894927" cy="618699"/>
           </a:xfrm>
         </p:spPr>
@@ -6005,28 +6006,28 @@
         </p:nvSpPr>
         <p:spPr>
           <a:xfrm>
-            <a:off x="122830" y="1187355"/>
-            <a:ext cx="11928143" cy="5500048"/>
+            <a:off x="150126" y="618699"/>
+            <a:ext cx="7492621" cy="1815152"/>
           </a:xfrm>
         </p:spPr>
         <p:txBody>
           <a:bodyPr>
-            <a:normAutofit fontScale="77500" lnSpcReduction="20000"/>
+            <a:noAutofit/>
           </a:bodyPr>
           <a:lstStyle/>
           <a:p>
             <a:r>
-              <a:rPr lang="en-US" dirty="0"/>
+              <a:rPr lang="en-US" sz="1200" dirty="0"/>
               <a:t>API Endpoint : </a:t>
             </a:r>
             <a:r>
-              <a:rPr lang="en-IN" dirty="0">
+              <a:rPr lang="en-IN" sz="1200" dirty="0">
                 <a:hlinkClick r:id="rId2"/>
               </a:rPr>
               <a:t>https://lexa-api.uc.r.appspot.com/api/v1/</a:t>
             </a:r>
             <a:r>
-              <a:rPr lang="en-IN" b="0" i="0" dirty="0">
+              <a:rPr lang="en-IN" sz="1200" b="0" i="0" dirty="0">
                 <a:solidFill>
                   <a:srgbClr val="F0F0F0"/>
                 </a:solidFill>
@@ -6036,7 +6037,7 @@
               </a:rPr>
               <a:t>getAllCategories</a:t>
             </a:r>
-            <a:endParaRPr lang="en-IN" b="0" i="0" dirty="0">
+            <a:endParaRPr lang="en-IN" sz="1200" b="0" i="0" dirty="0">
               <a:solidFill>
                 <a:srgbClr val="F0F0F0"/>
               </a:solidFill>
@@ -6046,7 +6047,7 @@
           </a:p>
           <a:p>
             <a:r>
-              <a:rPr lang="en-IN" dirty="0">
+              <a:rPr lang="en-IN" sz="1200" dirty="0">
                 <a:solidFill>
                   <a:srgbClr val="F0F0F0"/>
                 </a:solidFill>
@@ -6057,7 +6058,7 @@
           </a:p>
           <a:p>
             <a:r>
-              <a:rPr lang="en-IN" dirty="0">
+              <a:rPr lang="en-IN" sz="1200" dirty="0">
                 <a:solidFill>
                   <a:srgbClr val="F0F0F0"/>
                 </a:solidFill>
@@ -6072,7 +6073,7 @@
               <a:buChar char="Ø"/>
             </a:pPr>
             <a:r>
-              <a:rPr lang="en-IN" dirty="0">
+              <a:rPr lang="en-IN" sz="1200" dirty="0">
                 <a:solidFill>
                   <a:srgbClr val="F0F0F0"/>
                 </a:solidFill>
@@ -6087,7 +6088,7 @@
               <a:buChar char="Ø"/>
             </a:pPr>
             <a:r>
-              <a:rPr lang="en-IN" dirty="0">
+              <a:rPr lang="en-IN" sz="1200" dirty="0">
                 <a:solidFill>
                   <a:srgbClr val="F0F0F0"/>
                 </a:solidFill>
@@ -6102,7 +6103,7 @@
               <a:buChar char="Ø"/>
             </a:pPr>
             <a:r>
-              <a:rPr lang="en-IN" dirty="0">
+              <a:rPr lang="en-IN" sz="1200" dirty="0">
                 <a:solidFill>
                   <a:srgbClr val="F0F0F0"/>
                 </a:solidFill>
@@ -6110,17 +6111,6 @@
               </a:rPr>
               <a:t>ID</a:t>
             </a:r>
-          </a:p>
-          <a:p>
-            <a:pPr marL="457200" lvl="1" indent="0">
-              <a:buNone/>
-            </a:pPr>
-            <a:endParaRPr lang="en-IN" dirty="0">
-              <a:solidFill>
-                <a:srgbClr val="F0F0F0"/>
-              </a:solidFill>
-              <a:latin typeface="OpenSans"/>
-            </a:endParaRPr>
           </a:p>
           <a:p>
             <a:pPr>
@@ -6128,7 +6118,7 @@
               <a:buChar char="•"/>
             </a:pPr>
             <a:r>
-              <a:rPr lang="en-IN" dirty="0">
+              <a:rPr lang="en-IN" sz="1200" dirty="0">
                 <a:solidFill>
                   <a:srgbClr val="F0F0F0"/>
                 </a:solidFill>
@@ -6137,474 +6127,44 @@
               <a:t>Example : </a:t>
             </a:r>
           </a:p>
-          <a:p>
-            <a:pPr marL="0" indent="0">
-              <a:buNone/>
-            </a:pPr>
-            <a:r>
-              <a:rPr lang="en-IN" b="0" dirty="0">
-                <a:solidFill>
-                  <a:srgbClr val="9CDCFE"/>
-                </a:solidFill>
-                <a:effectLst/>
-                <a:latin typeface="Consolas" panose="020B0609020204030204" pitchFamily="49" charset="0"/>
-              </a:rPr>
-              <a:t>	{</a:t>
-            </a:r>
-          </a:p>
-          <a:p>
-            <a:pPr marL="0" indent="0">
-              <a:buNone/>
-            </a:pPr>
-            <a:r>
-              <a:rPr lang="en-IN" b="0" dirty="0">
-                <a:solidFill>
-                  <a:srgbClr val="9CDCFE"/>
-                </a:solidFill>
-                <a:effectLst/>
-                <a:latin typeface="Consolas" panose="020B0609020204030204" pitchFamily="49" charset="0"/>
-              </a:rPr>
-              <a:t>		"message"</a:t>
-            </a:r>
-            <a:r>
-              <a:rPr lang="en-IN" b="0" dirty="0">
-                <a:solidFill>
-                  <a:srgbClr val="DCDCDC"/>
-                </a:solidFill>
-                <a:effectLst/>
-                <a:latin typeface="Consolas" panose="020B0609020204030204" pitchFamily="49" charset="0"/>
-              </a:rPr>
-              <a:t>:</a:t>
-            </a:r>
-            <a:r>
-              <a:rPr lang="en-IN" b="0" dirty="0">
-                <a:solidFill>
-                  <a:srgbClr val="D4D4D4"/>
-                </a:solidFill>
-                <a:effectLst/>
-                <a:latin typeface="Consolas" panose="020B0609020204030204" pitchFamily="49" charset="0"/>
-              </a:rPr>
-              <a:t> </a:t>
-            </a:r>
-            <a:r>
-              <a:rPr lang="en-IN" b="0" dirty="0">
-                <a:solidFill>
-                  <a:srgbClr val="CE9178"/>
-                </a:solidFill>
-                <a:effectLst/>
-                <a:latin typeface="Consolas" panose="020B0609020204030204" pitchFamily="49" charset="0"/>
-              </a:rPr>
-              <a:t>"List Of Categories"</a:t>
-            </a:r>
-            <a:r>
-              <a:rPr lang="en-IN" b="0" dirty="0">
-                <a:solidFill>
-                  <a:srgbClr val="DCDCDC"/>
-                </a:solidFill>
-                <a:effectLst/>
-                <a:latin typeface="Consolas" panose="020B0609020204030204" pitchFamily="49" charset="0"/>
-              </a:rPr>
-              <a:t>,</a:t>
-            </a:r>
-            <a:endParaRPr lang="en-IN" b="0" dirty="0">
-              <a:solidFill>
-                <a:srgbClr val="D4D4D4"/>
-              </a:solidFill>
-              <a:effectLst/>
-              <a:latin typeface="Consolas" panose="020B0609020204030204" pitchFamily="49" charset="0"/>
-            </a:endParaRPr>
-          </a:p>
-          <a:p>
-            <a:pPr marL="0" indent="0">
-              <a:buNone/>
-            </a:pPr>
-            <a:r>
-              <a:rPr lang="en-IN" b="0" dirty="0">
-                <a:solidFill>
-                  <a:srgbClr val="D4D4D4"/>
-                </a:solidFill>
-                <a:effectLst/>
-                <a:latin typeface="Consolas" panose="020B0609020204030204" pitchFamily="49" charset="0"/>
-              </a:rPr>
-              <a:t>    	</a:t>
-            </a:r>
-            <a:r>
-              <a:rPr lang="en-IN" b="0" dirty="0">
-                <a:solidFill>
-                  <a:srgbClr val="9CDCFE"/>
-                </a:solidFill>
-                <a:effectLst/>
-                <a:latin typeface="Consolas" panose="020B0609020204030204" pitchFamily="49" charset="0"/>
-              </a:rPr>
-              <a:t>"details"</a:t>
-            </a:r>
-            <a:r>
-              <a:rPr lang="en-IN" b="0" dirty="0">
-                <a:solidFill>
-                  <a:srgbClr val="DCDCDC"/>
-                </a:solidFill>
-                <a:effectLst/>
-                <a:latin typeface="Consolas" panose="020B0609020204030204" pitchFamily="49" charset="0"/>
-              </a:rPr>
-              <a:t>:</a:t>
-            </a:r>
-            <a:r>
-              <a:rPr lang="en-IN" b="0" dirty="0">
-                <a:solidFill>
-                  <a:srgbClr val="D4D4D4"/>
-                </a:solidFill>
-                <a:effectLst/>
-                <a:latin typeface="Consolas" panose="020B0609020204030204" pitchFamily="49" charset="0"/>
-              </a:rPr>
-              <a:t> </a:t>
-            </a:r>
-            <a:r>
-              <a:rPr lang="en-IN" b="0" dirty="0">
-                <a:solidFill>
-                  <a:srgbClr val="DCDCDC"/>
-                </a:solidFill>
-                <a:effectLst/>
-                <a:latin typeface="Consolas" panose="020B0609020204030204" pitchFamily="49" charset="0"/>
-              </a:rPr>
-              <a:t>[</a:t>
-            </a:r>
-            <a:endParaRPr lang="en-IN" b="0" dirty="0">
-              <a:solidFill>
-                <a:srgbClr val="D4D4D4"/>
-              </a:solidFill>
-              <a:effectLst/>
-              <a:latin typeface="Consolas" panose="020B0609020204030204" pitchFamily="49" charset="0"/>
-            </a:endParaRPr>
-          </a:p>
-          <a:p>
-            <a:pPr marL="0" indent="0">
-              <a:buNone/>
-            </a:pPr>
-            <a:r>
-              <a:rPr lang="en-IN" b="0" dirty="0">
-                <a:solidFill>
-                  <a:srgbClr val="D4D4D4"/>
-                </a:solidFill>
-                <a:effectLst/>
-                <a:latin typeface="Consolas" panose="020B0609020204030204" pitchFamily="49" charset="0"/>
-              </a:rPr>
-              <a:t>        	</a:t>
-            </a:r>
-            <a:r>
-              <a:rPr lang="en-IN" b="0" dirty="0">
-                <a:solidFill>
-                  <a:srgbClr val="DCDCDC"/>
-                </a:solidFill>
-                <a:effectLst/>
-                <a:latin typeface="Consolas" panose="020B0609020204030204" pitchFamily="49" charset="0"/>
-              </a:rPr>
-              <a:t>{</a:t>
-            </a:r>
-            <a:endParaRPr lang="en-IN" b="0" dirty="0">
-              <a:solidFill>
-                <a:srgbClr val="D4D4D4"/>
-              </a:solidFill>
-              <a:effectLst/>
-              <a:latin typeface="Consolas" panose="020B0609020204030204" pitchFamily="49" charset="0"/>
-            </a:endParaRPr>
-          </a:p>
-          <a:p>
-            <a:pPr marL="0" indent="0">
-              <a:buNone/>
-            </a:pPr>
-            <a:r>
-              <a:rPr lang="en-IN" b="0" dirty="0">
-                <a:solidFill>
-                  <a:srgbClr val="D4D4D4"/>
-                </a:solidFill>
-                <a:effectLst/>
-                <a:latin typeface="Consolas" panose="020B0609020204030204" pitchFamily="49" charset="0"/>
-              </a:rPr>
-              <a:t>           </a:t>
-            </a:r>
-            <a:r>
-              <a:rPr lang="en-IN" b="0" dirty="0">
-                <a:solidFill>
-                  <a:srgbClr val="9CDCFE"/>
-                </a:solidFill>
-                <a:effectLst/>
-                <a:latin typeface="Consolas" panose="020B0609020204030204" pitchFamily="49" charset="0"/>
-              </a:rPr>
-              <a:t>"_id"</a:t>
-            </a:r>
-            <a:r>
-              <a:rPr lang="en-IN" b="0" dirty="0">
-                <a:solidFill>
-                  <a:srgbClr val="DCDCDC"/>
-                </a:solidFill>
-                <a:effectLst/>
-                <a:latin typeface="Consolas" panose="020B0609020204030204" pitchFamily="49" charset="0"/>
-              </a:rPr>
-              <a:t>:</a:t>
-            </a:r>
-            <a:r>
-              <a:rPr lang="en-IN" b="0" dirty="0">
-                <a:solidFill>
-                  <a:srgbClr val="D4D4D4"/>
-                </a:solidFill>
-                <a:effectLst/>
-                <a:latin typeface="Consolas" panose="020B0609020204030204" pitchFamily="49" charset="0"/>
-              </a:rPr>
-              <a:t> </a:t>
-            </a:r>
-            <a:r>
-              <a:rPr lang="en-IN" b="0" dirty="0">
-                <a:solidFill>
-                  <a:srgbClr val="CE9178"/>
-                </a:solidFill>
-                <a:effectLst/>
-                <a:latin typeface="Consolas" panose="020B0609020204030204" pitchFamily="49" charset="0"/>
-              </a:rPr>
-              <a:t>"5f454b478b3000300cf15651"</a:t>
-            </a:r>
-            <a:r>
-              <a:rPr lang="en-IN" b="0" dirty="0">
-                <a:solidFill>
-                  <a:srgbClr val="DCDCDC"/>
-                </a:solidFill>
-                <a:effectLst/>
-                <a:latin typeface="Consolas" panose="020B0609020204030204" pitchFamily="49" charset="0"/>
-              </a:rPr>
-              <a:t>,</a:t>
-            </a:r>
-            <a:endParaRPr lang="en-IN" b="0" dirty="0">
-              <a:solidFill>
-                <a:srgbClr val="D4D4D4"/>
-              </a:solidFill>
-              <a:effectLst/>
-              <a:latin typeface="Consolas" panose="020B0609020204030204" pitchFamily="49" charset="0"/>
-            </a:endParaRPr>
-          </a:p>
-          <a:p>
-            <a:pPr marL="0" indent="0">
-              <a:buNone/>
-            </a:pPr>
-            <a:r>
-              <a:rPr lang="en-IN" b="0" dirty="0">
-                <a:solidFill>
-                  <a:srgbClr val="D4D4D4"/>
-                </a:solidFill>
-                <a:effectLst/>
-                <a:latin typeface="Consolas" panose="020B0609020204030204" pitchFamily="49" charset="0"/>
-              </a:rPr>
-              <a:t>           </a:t>
-            </a:r>
-            <a:r>
-              <a:rPr lang="en-IN" b="0" dirty="0">
-                <a:solidFill>
-                  <a:srgbClr val="9CDCFE"/>
-                </a:solidFill>
-                <a:effectLst/>
-                <a:latin typeface="Consolas" panose="020B0609020204030204" pitchFamily="49" charset="0"/>
-              </a:rPr>
-              <a:t>"categoryName"</a:t>
-            </a:r>
-            <a:r>
-              <a:rPr lang="en-IN" b="0" dirty="0">
-                <a:solidFill>
-                  <a:srgbClr val="DCDCDC"/>
-                </a:solidFill>
-                <a:effectLst/>
-                <a:latin typeface="Consolas" panose="020B0609020204030204" pitchFamily="49" charset="0"/>
-              </a:rPr>
-              <a:t>:</a:t>
-            </a:r>
-            <a:r>
-              <a:rPr lang="en-IN" b="0" dirty="0">
-                <a:solidFill>
-                  <a:srgbClr val="D4D4D4"/>
-                </a:solidFill>
-                <a:effectLst/>
-                <a:latin typeface="Consolas" panose="020B0609020204030204" pitchFamily="49" charset="0"/>
-              </a:rPr>
-              <a:t> </a:t>
-            </a:r>
-            <a:r>
-              <a:rPr lang="en-IN" b="0" dirty="0">
-                <a:solidFill>
-                  <a:srgbClr val="CE9178"/>
-                </a:solidFill>
-                <a:effectLst/>
-                <a:latin typeface="Consolas" panose="020B0609020204030204" pitchFamily="49" charset="0"/>
-              </a:rPr>
-              <a:t>"Mobiles"</a:t>
-            </a:r>
-            <a:r>
-              <a:rPr lang="en-IN" b="0" dirty="0">
-                <a:solidFill>
-                  <a:srgbClr val="DCDCDC"/>
-                </a:solidFill>
-                <a:effectLst/>
-                <a:latin typeface="Consolas" panose="020B0609020204030204" pitchFamily="49" charset="0"/>
-              </a:rPr>
-              <a:t>,</a:t>
-            </a:r>
-            <a:endParaRPr lang="en-IN" b="0" dirty="0">
-              <a:solidFill>
-                <a:srgbClr val="D4D4D4"/>
-              </a:solidFill>
-              <a:effectLst/>
-              <a:latin typeface="Consolas" panose="020B0609020204030204" pitchFamily="49" charset="0"/>
-            </a:endParaRPr>
-          </a:p>
-          <a:p>
-            <a:pPr marL="0" indent="0">
-              <a:buNone/>
-            </a:pPr>
-            <a:r>
-              <a:rPr lang="en-IN" b="0" dirty="0">
-                <a:solidFill>
-                  <a:srgbClr val="D4D4D4"/>
-                </a:solidFill>
-                <a:effectLst/>
-                <a:latin typeface="Consolas" panose="020B0609020204030204" pitchFamily="49" charset="0"/>
-              </a:rPr>
-              <a:t>           </a:t>
-            </a:r>
-            <a:r>
-              <a:rPr lang="en-IN" b="0" dirty="0">
-                <a:solidFill>
-                  <a:srgbClr val="9CDCFE"/>
-                </a:solidFill>
-                <a:effectLst/>
-                <a:latin typeface="Consolas" panose="020B0609020204030204" pitchFamily="49" charset="0"/>
-              </a:rPr>
-              <a:t>"categoryIcon"</a:t>
-            </a:r>
-            <a:r>
-              <a:rPr lang="en-IN" b="0" dirty="0">
-                <a:solidFill>
-                  <a:srgbClr val="DCDCDC"/>
-                </a:solidFill>
-                <a:effectLst/>
-                <a:latin typeface="Consolas" panose="020B0609020204030204" pitchFamily="49" charset="0"/>
-              </a:rPr>
-              <a:t>:</a:t>
-            </a:r>
-            <a:r>
-              <a:rPr lang="en-IN" b="0" dirty="0">
-                <a:solidFill>
-                  <a:srgbClr val="D4D4D4"/>
-                </a:solidFill>
-                <a:effectLst/>
-                <a:latin typeface="Consolas" panose="020B0609020204030204" pitchFamily="49" charset="0"/>
-              </a:rPr>
-              <a:t> </a:t>
-            </a:r>
-            <a:r>
-              <a:rPr lang="en-IN" b="0" dirty="0">
-                <a:solidFill>
-                  <a:srgbClr val="CE9178"/>
-                </a:solidFill>
-                <a:effectLst/>
-                <a:latin typeface="Consolas" panose="020B0609020204030204" pitchFamily="49" charset="0"/>
-              </a:rPr>
-              <a:t>"https://storage.cloud.google.com/lexa-product-categories/mobiles-category.png"</a:t>
-            </a:r>
-            <a:r>
-              <a:rPr lang="en-IN" b="0" dirty="0">
-                <a:solidFill>
-                  <a:srgbClr val="DCDCDC"/>
-                </a:solidFill>
-                <a:effectLst/>
-                <a:latin typeface="Consolas" panose="020B0609020204030204" pitchFamily="49" charset="0"/>
-              </a:rPr>
-              <a:t>,</a:t>
-            </a:r>
-            <a:endParaRPr lang="en-IN" b="0" dirty="0">
-              <a:solidFill>
-                <a:srgbClr val="D4D4D4"/>
-              </a:solidFill>
-              <a:effectLst/>
-              <a:latin typeface="Consolas" panose="020B0609020204030204" pitchFamily="49" charset="0"/>
-            </a:endParaRPr>
-          </a:p>
-          <a:p>
-            <a:pPr marL="0" indent="0">
-              <a:buNone/>
-            </a:pPr>
-            <a:r>
-              <a:rPr lang="en-IN" b="0" dirty="0">
-                <a:solidFill>
-                  <a:srgbClr val="D4D4D4"/>
-                </a:solidFill>
-                <a:effectLst/>
-                <a:latin typeface="Consolas" panose="020B0609020204030204" pitchFamily="49" charset="0"/>
-              </a:rPr>
-              <a:t>       	</a:t>
-            </a:r>
-            <a:r>
-              <a:rPr lang="en-IN" b="0" dirty="0">
-                <a:solidFill>
-                  <a:srgbClr val="DCDCDC"/>
-                </a:solidFill>
-                <a:effectLst/>
-                <a:latin typeface="Consolas" panose="020B0609020204030204" pitchFamily="49" charset="0"/>
-              </a:rPr>
-              <a:t>}</a:t>
-            </a:r>
-          </a:p>
-          <a:p>
-            <a:pPr marL="0" indent="0">
-              <a:buNone/>
-            </a:pPr>
-            <a:r>
-              <a:rPr lang="en-IN" dirty="0">
-                <a:solidFill>
-                  <a:srgbClr val="DCDCDC"/>
-                </a:solidFill>
-                <a:latin typeface="Consolas" panose="020B0609020204030204" pitchFamily="49" charset="0"/>
-              </a:rPr>
-              <a:t>			]</a:t>
-            </a:r>
-            <a:endParaRPr lang="en-IN" b="0" dirty="0">
-              <a:solidFill>
-                <a:srgbClr val="DCDCDC"/>
-              </a:solidFill>
-              <a:effectLst/>
-              <a:latin typeface="Consolas" panose="020B0609020204030204" pitchFamily="49" charset="0"/>
-            </a:endParaRPr>
-          </a:p>
-          <a:p>
-            <a:pPr marL="0" indent="0">
-              <a:buNone/>
-            </a:pPr>
-            <a:r>
-              <a:rPr lang="en-IN" dirty="0">
-                <a:solidFill>
-                  <a:srgbClr val="DCDCDC"/>
-                </a:solidFill>
-                <a:latin typeface="Consolas" panose="020B0609020204030204" pitchFamily="49" charset="0"/>
-              </a:rPr>
-              <a:t>   }</a:t>
-            </a:r>
-            <a:endParaRPr lang="en-IN" b="0" dirty="0">
-              <a:solidFill>
-                <a:srgbClr val="D4D4D4"/>
-              </a:solidFill>
-              <a:effectLst/>
-              <a:latin typeface="Consolas" panose="020B0609020204030204" pitchFamily="49" charset="0"/>
-            </a:endParaRPr>
-          </a:p>
-          <a:p>
-            <a:pPr lvl="1">
-              <a:buFont typeface="Wingdings" panose="05000000000000000000" pitchFamily="2" charset="2"/>
-              <a:buChar char="v"/>
-            </a:pPr>
-            <a:endParaRPr lang="en-IN" dirty="0">
-              <a:solidFill>
-                <a:srgbClr val="F0F0F0"/>
-              </a:solidFill>
-              <a:latin typeface="OpenSans"/>
-            </a:endParaRPr>
-          </a:p>
-        </p:txBody>
-      </p:sp>
+        </p:txBody>
+      </p:sp>
+      <p:pic>
+        <p:nvPicPr>
+          <p:cNvPr id="5" name="Picture 4">
+            <a:extLst>
+              <a:ext uri="{FF2B5EF4-FFF2-40B4-BE49-F238E27FC236}">
+                <a16:creationId xmlns:a16="http://schemas.microsoft.com/office/drawing/2014/main" id="{213E547A-2AAB-4E9C-9498-9D5F4F5AC825}"/>
+              </a:ext>
+            </a:extLst>
+          </p:cNvPr>
+          <p:cNvPicPr>
+            <a:picLocks noChangeAspect="1"/>
+          </p:cNvPicPr>
+          <p:nvPr/>
+        </p:nvPicPr>
+        <p:blipFill>
+          <a:blip r:embed="rId3">
+            <a:extLst>
+              <a:ext uri="{28A0092B-C50C-407E-A947-70E740481C1C}">
+                <a14:useLocalDpi xmlns:a14="http://schemas.microsoft.com/office/drawing/2010/main" val="0"/>
+              </a:ext>
+            </a:extLst>
+          </a:blip>
+          <a:stretch>
+            <a:fillRect/>
+          </a:stretch>
+        </p:blipFill>
+        <p:spPr>
+          <a:xfrm>
+            <a:off x="272956" y="2622487"/>
+            <a:ext cx="11641540" cy="4119507"/>
+          </a:xfrm>
+          <a:prstGeom prst="rect">
+            <a:avLst/>
+          </a:prstGeom>
+        </p:spPr>
+      </p:pic>
     </p:spTree>
     <p:extLst>
       <p:ext uri="{BB962C8B-B14F-4D97-AF65-F5344CB8AC3E}">
@@ -6695,13 +6255,13 @@
         </p:nvSpPr>
         <p:spPr>
           <a:xfrm>
-            <a:off x="109182" y="600501"/>
-            <a:ext cx="11982733" cy="6155141"/>
+            <a:off x="109183" y="600502"/>
+            <a:ext cx="11300346" cy="1760562"/>
           </a:xfrm>
         </p:spPr>
         <p:txBody>
           <a:bodyPr>
-            <a:normAutofit/>
+            <a:normAutofit lnSpcReduction="10000"/>
           </a:bodyPr>
           <a:lstStyle/>
           <a:p>
@@ -6762,704 +6322,6 @@
             </a:endParaRPr>
           </a:p>
           <a:p>
-            <a:pPr marL="0" indent="0">
-              <a:buNone/>
-            </a:pPr>
-            <a:r>
-              <a:rPr lang="en-IN" sz="800" dirty="0">
-                <a:solidFill>
-                  <a:srgbClr val="9CDCFE"/>
-                </a:solidFill>
-                <a:latin typeface="Consolas" panose="020B0609020204030204" pitchFamily="49" charset="0"/>
-              </a:rPr>
-              <a:t>     </a:t>
-            </a:r>
-            <a:r>
-              <a:rPr lang="en-IN" sz="800" b="0" dirty="0">
-                <a:solidFill>
-                  <a:srgbClr val="9CDCFE"/>
-                </a:solidFill>
-                <a:effectLst/>
-                <a:latin typeface="Consolas" panose="020B0609020204030204" pitchFamily="49" charset="0"/>
-              </a:rPr>
-              <a:t>"foundResults"</a:t>
-            </a:r>
-            <a:r>
-              <a:rPr lang="en-IN" sz="800" b="0" dirty="0">
-                <a:solidFill>
-                  <a:srgbClr val="DCDCDC"/>
-                </a:solidFill>
-                <a:effectLst/>
-                <a:latin typeface="Consolas" panose="020B0609020204030204" pitchFamily="49" charset="0"/>
-              </a:rPr>
-              <a:t>:</a:t>
-            </a:r>
-            <a:r>
-              <a:rPr lang="en-IN" sz="800" b="0" dirty="0">
-                <a:solidFill>
-                  <a:srgbClr val="D4D4D4"/>
-                </a:solidFill>
-                <a:effectLst/>
-                <a:latin typeface="Consolas" panose="020B0609020204030204" pitchFamily="49" charset="0"/>
-              </a:rPr>
-              <a:t> </a:t>
-            </a:r>
-            <a:r>
-              <a:rPr lang="en-IN" sz="800" dirty="0">
-                <a:solidFill>
-                  <a:srgbClr val="B5CEA8"/>
-                </a:solidFill>
-                <a:latin typeface="Consolas" panose="020B0609020204030204" pitchFamily="49" charset="0"/>
-              </a:rPr>
-              <a:t>1</a:t>
-            </a:r>
-            <a:r>
-              <a:rPr lang="en-IN" sz="800" b="0" dirty="0">
-                <a:solidFill>
-                  <a:srgbClr val="DCDCDC"/>
-                </a:solidFill>
-                <a:effectLst/>
-                <a:latin typeface="Consolas" panose="020B0609020204030204" pitchFamily="49" charset="0"/>
-              </a:rPr>
-              <a:t>,</a:t>
-            </a:r>
-            <a:endParaRPr lang="en-IN" sz="800" b="0" dirty="0">
-              <a:solidFill>
-                <a:srgbClr val="D4D4D4"/>
-              </a:solidFill>
-              <a:effectLst/>
-              <a:latin typeface="Consolas" panose="020B0609020204030204" pitchFamily="49" charset="0"/>
-            </a:endParaRPr>
-          </a:p>
-          <a:p>
-            <a:pPr marL="0" indent="0">
-              <a:buNone/>
-            </a:pPr>
-            <a:r>
-              <a:rPr lang="en-IN" sz="900" b="0" dirty="0">
-                <a:solidFill>
-                  <a:srgbClr val="D4D4D4"/>
-                </a:solidFill>
-                <a:effectLst/>
-                <a:latin typeface="Consolas" panose="020B0609020204030204" pitchFamily="49" charset="0"/>
-              </a:rPr>
-              <a:t>    </a:t>
-            </a:r>
-            <a:r>
-              <a:rPr lang="en-IN" sz="900" b="0" dirty="0">
-                <a:solidFill>
-                  <a:srgbClr val="9CDCFE"/>
-                </a:solidFill>
-                <a:effectLst/>
-                <a:latin typeface="Consolas" panose="020B0609020204030204" pitchFamily="49" charset="0"/>
-              </a:rPr>
-              <a:t>"message"</a:t>
-            </a:r>
-            <a:r>
-              <a:rPr lang="en-IN" sz="900" b="0" dirty="0">
-                <a:solidFill>
-                  <a:srgbClr val="DCDCDC"/>
-                </a:solidFill>
-                <a:effectLst/>
-                <a:latin typeface="Consolas" panose="020B0609020204030204" pitchFamily="49" charset="0"/>
-              </a:rPr>
-              <a:t>:</a:t>
-            </a:r>
-            <a:r>
-              <a:rPr lang="en-IN" sz="900" b="0" dirty="0">
-                <a:solidFill>
-                  <a:srgbClr val="D4D4D4"/>
-                </a:solidFill>
-                <a:effectLst/>
-                <a:latin typeface="Consolas" panose="020B0609020204030204" pitchFamily="49" charset="0"/>
-              </a:rPr>
-              <a:t> </a:t>
-            </a:r>
-            <a:r>
-              <a:rPr lang="en-IN" sz="900" b="0" dirty="0">
-                <a:solidFill>
-                  <a:srgbClr val="CE9178"/>
-                </a:solidFill>
-                <a:effectLst/>
-                <a:latin typeface="Consolas" panose="020B0609020204030204" pitchFamily="49" charset="0"/>
-              </a:rPr>
-              <a:t>"List Of Products"</a:t>
-            </a:r>
-            <a:r>
-              <a:rPr lang="en-IN" sz="900" b="0" dirty="0">
-                <a:solidFill>
-                  <a:srgbClr val="DCDCDC"/>
-                </a:solidFill>
-                <a:effectLst/>
-                <a:latin typeface="Consolas" panose="020B0609020204030204" pitchFamily="49" charset="0"/>
-              </a:rPr>
-              <a:t>,</a:t>
-            </a:r>
-            <a:endParaRPr lang="en-IN" sz="900" b="0" dirty="0">
-              <a:solidFill>
-                <a:srgbClr val="D4D4D4"/>
-              </a:solidFill>
-              <a:effectLst/>
-              <a:latin typeface="Consolas" panose="020B0609020204030204" pitchFamily="49" charset="0"/>
-            </a:endParaRPr>
-          </a:p>
-          <a:p>
-            <a:pPr marL="0" indent="0">
-              <a:buNone/>
-            </a:pPr>
-            <a:r>
-              <a:rPr lang="en-IN" sz="900" b="0" dirty="0">
-                <a:solidFill>
-                  <a:srgbClr val="D4D4D4"/>
-                </a:solidFill>
-                <a:effectLst/>
-                <a:latin typeface="Consolas" panose="020B0609020204030204" pitchFamily="49" charset="0"/>
-              </a:rPr>
-              <a:t>    </a:t>
-            </a:r>
-            <a:r>
-              <a:rPr lang="en-IN" sz="900" b="0" dirty="0">
-                <a:solidFill>
-                  <a:srgbClr val="9CDCFE"/>
-                </a:solidFill>
-                <a:effectLst/>
-                <a:latin typeface="Consolas" panose="020B0609020204030204" pitchFamily="49" charset="0"/>
-              </a:rPr>
-              <a:t>"details"</a:t>
-            </a:r>
-            <a:r>
-              <a:rPr lang="en-IN" sz="900" b="0" dirty="0">
-                <a:solidFill>
-                  <a:srgbClr val="DCDCDC"/>
-                </a:solidFill>
-                <a:effectLst/>
-                <a:latin typeface="Consolas" panose="020B0609020204030204" pitchFamily="49" charset="0"/>
-              </a:rPr>
-              <a:t>:</a:t>
-            </a:r>
-            <a:r>
-              <a:rPr lang="en-IN" sz="900" b="0" dirty="0">
-                <a:solidFill>
-                  <a:srgbClr val="D4D4D4"/>
-                </a:solidFill>
-                <a:effectLst/>
-                <a:latin typeface="Consolas" panose="020B0609020204030204" pitchFamily="49" charset="0"/>
-              </a:rPr>
-              <a:t> </a:t>
-            </a:r>
-            <a:r>
-              <a:rPr lang="en-IN" sz="900" b="0" dirty="0">
-                <a:solidFill>
-                  <a:srgbClr val="DCDCDC"/>
-                </a:solidFill>
-                <a:effectLst/>
-                <a:latin typeface="Consolas" panose="020B0609020204030204" pitchFamily="49" charset="0"/>
-              </a:rPr>
-              <a:t>[</a:t>
-            </a:r>
-            <a:endParaRPr lang="en-IN" sz="900" b="0" dirty="0">
-              <a:solidFill>
-                <a:srgbClr val="D4D4D4"/>
-              </a:solidFill>
-              <a:effectLst/>
-              <a:latin typeface="Consolas" panose="020B0609020204030204" pitchFamily="49" charset="0"/>
-            </a:endParaRPr>
-          </a:p>
-          <a:p>
-            <a:pPr marL="0" indent="0">
-              <a:buNone/>
-            </a:pPr>
-            <a:r>
-              <a:rPr lang="en-IN" sz="900" b="0" dirty="0">
-                <a:solidFill>
-                  <a:srgbClr val="D4D4D4"/>
-                </a:solidFill>
-                <a:effectLst/>
-                <a:latin typeface="Consolas" panose="020B0609020204030204" pitchFamily="49" charset="0"/>
-              </a:rPr>
-              <a:t>        </a:t>
-            </a:r>
-            <a:r>
-              <a:rPr lang="en-IN" sz="900" b="0" dirty="0">
-                <a:solidFill>
-                  <a:srgbClr val="DCDCDC"/>
-                </a:solidFill>
-                <a:effectLst/>
-                <a:latin typeface="Consolas" panose="020B0609020204030204" pitchFamily="49" charset="0"/>
-              </a:rPr>
-              <a:t>{</a:t>
-            </a:r>
-            <a:endParaRPr lang="en-IN" sz="900" b="0" dirty="0">
-              <a:solidFill>
-                <a:srgbClr val="D4D4D4"/>
-              </a:solidFill>
-              <a:effectLst/>
-              <a:latin typeface="Consolas" panose="020B0609020204030204" pitchFamily="49" charset="0"/>
-            </a:endParaRPr>
-          </a:p>
-          <a:p>
-            <a:pPr marL="0" indent="0">
-              <a:buNone/>
-            </a:pPr>
-            <a:r>
-              <a:rPr lang="en-IN" sz="900" b="0" dirty="0">
-                <a:solidFill>
-                  <a:srgbClr val="D4D4D4"/>
-                </a:solidFill>
-                <a:effectLst/>
-                <a:latin typeface="Consolas" panose="020B0609020204030204" pitchFamily="49" charset="0"/>
-              </a:rPr>
-              <a:t>            </a:t>
-            </a:r>
-            <a:r>
-              <a:rPr lang="en-IN" sz="900" b="0" dirty="0">
-                <a:solidFill>
-                  <a:srgbClr val="9CDCFE"/>
-                </a:solidFill>
-                <a:effectLst/>
-                <a:latin typeface="Consolas" panose="020B0609020204030204" pitchFamily="49" charset="0"/>
-              </a:rPr>
-              <a:t>"_id"</a:t>
-            </a:r>
-            <a:r>
-              <a:rPr lang="en-IN" sz="900" b="0" dirty="0">
-                <a:solidFill>
-                  <a:srgbClr val="DCDCDC"/>
-                </a:solidFill>
-                <a:effectLst/>
-                <a:latin typeface="Consolas" panose="020B0609020204030204" pitchFamily="49" charset="0"/>
-              </a:rPr>
-              <a:t>:</a:t>
-            </a:r>
-            <a:r>
-              <a:rPr lang="en-IN" sz="900" b="0" dirty="0">
-                <a:solidFill>
-                  <a:srgbClr val="D4D4D4"/>
-                </a:solidFill>
-                <a:effectLst/>
-                <a:latin typeface="Consolas" panose="020B0609020204030204" pitchFamily="49" charset="0"/>
-              </a:rPr>
-              <a:t> </a:t>
-            </a:r>
-            <a:r>
-              <a:rPr lang="en-IN" sz="900" b="0" dirty="0">
-                <a:solidFill>
-                  <a:srgbClr val="CE9178"/>
-                </a:solidFill>
-                <a:effectLst/>
-                <a:latin typeface="Consolas" panose="020B0609020204030204" pitchFamily="49" charset="0"/>
-              </a:rPr>
-              <a:t>"5f46d2da8b7db3676021b0aa"</a:t>
-            </a:r>
-            <a:r>
-              <a:rPr lang="en-IN" sz="900" b="0" dirty="0">
-                <a:solidFill>
-                  <a:srgbClr val="DCDCDC"/>
-                </a:solidFill>
-                <a:effectLst/>
-                <a:latin typeface="Consolas" panose="020B0609020204030204" pitchFamily="49" charset="0"/>
-              </a:rPr>
-              <a:t>,</a:t>
-            </a:r>
-            <a:endParaRPr lang="en-IN" sz="900" b="0" dirty="0">
-              <a:solidFill>
-                <a:srgbClr val="D4D4D4"/>
-              </a:solidFill>
-              <a:effectLst/>
-              <a:latin typeface="Consolas" panose="020B0609020204030204" pitchFamily="49" charset="0"/>
-            </a:endParaRPr>
-          </a:p>
-          <a:p>
-            <a:pPr marL="0" indent="0">
-              <a:buNone/>
-            </a:pPr>
-            <a:r>
-              <a:rPr lang="en-IN" sz="900" b="0" dirty="0">
-                <a:solidFill>
-                  <a:srgbClr val="D4D4D4"/>
-                </a:solidFill>
-                <a:effectLst/>
-                <a:latin typeface="Consolas" panose="020B0609020204030204" pitchFamily="49" charset="0"/>
-              </a:rPr>
-              <a:t>            </a:t>
-            </a:r>
-            <a:r>
-              <a:rPr lang="en-IN" sz="900" b="0" dirty="0">
-                <a:solidFill>
-                  <a:srgbClr val="9CDCFE"/>
-                </a:solidFill>
-                <a:effectLst/>
-                <a:latin typeface="Consolas" panose="020B0609020204030204" pitchFamily="49" charset="0"/>
-              </a:rPr>
-              <a:t>"productName"</a:t>
-            </a:r>
-            <a:r>
-              <a:rPr lang="en-IN" sz="900" b="0" dirty="0">
-                <a:solidFill>
-                  <a:srgbClr val="DCDCDC"/>
-                </a:solidFill>
-                <a:effectLst/>
-                <a:latin typeface="Consolas" panose="020B0609020204030204" pitchFamily="49" charset="0"/>
-              </a:rPr>
-              <a:t>:</a:t>
-            </a:r>
-            <a:r>
-              <a:rPr lang="en-IN" sz="900" b="0" dirty="0">
-                <a:solidFill>
-                  <a:srgbClr val="D4D4D4"/>
-                </a:solidFill>
-                <a:effectLst/>
-                <a:latin typeface="Consolas" panose="020B0609020204030204" pitchFamily="49" charset="0"/>
-              </a:rPr>
-              <a:t> </a:t>
-            </a:r>
-            <a:r>
-              <a:rPr lang="en-IN" sz="900" b="0" dirty="0">
-                <a:solidFill>
-                  <a:srgbClr val="CE9178"/>
-                </a:solidFill>
-                <a:effectLst/>
-                <a:latin typeface="Consolas" panose="020B0609020204030204" pitchFamily="49" charset="0"/>
-              </a:rPr>
-              <a:t>"Apple iPhone 11 (64GB) - Black"</a:t>
-            </a:r>
-            <a:r>
-              <a:rPr lang="en-IN" sz="900" b="0" dirty="0">
-                <a:solidFill>
-                  <a:srgbClr val="DCDCDC"/>
-                </a:solidFill>
-                <a:effectLst/>
-                <a:latin typeface="Consolas" panose="020B0609020204030204" pitchFamily="49" charset="0"/>
-              </a:rPr>
-              <a:t>,</a:t>
-            </a:r>
-            <a:endParaRPr lang="en-IN" sz="900" b="0" dirty="0">
-              <a:solidFill>
-                <a:srgbClr val="D4D4D4"/>
-              </a:solidFill>
-              <a:effectLst/>
-              <a:latin typeface="Consolas" panose="020B0609020204030204" pitchFamily="49" charset="0"/>
-            </a:endParaRPr>
-          </a:p>
-          <a:p>
-            <a:pPr marL="0" indent="0">
-              <a:buNone/>
-            </a:pPr>
-            <a:r>
-              <a:rPr lang="en-IN" sz="900" b="0" dirty="0">
-                <a:solidFill>
-                  <a:srgbClr val="D4D4D4"/>
-                </a:solidFill>
-                <a:effectLst/>
-                <a:latin typeface="Consolas" panose="020B0609020204030204" pitchFamily="49" charset="0"/>
-              </a:rPr>
-              <a:t>            </a:t>
-            </a:r>
-            <a:r>
-              <a:rPr lang="en-IN" sz="900" b="0" dirty="0">
-                <a:solidFill>
-                  <a:srgbClr val="9CDCFE"/>
-                </a:solidFill>
-                <a:effectLst/>
-                <a:latin typeface="Consolas" panose="020B0609020204030204" pitchFamily="49" charset="0"/>
-              </a:rPr>
-              <a:t>"categoryId"</a:t>
-            </a:r>
-            <a:r>
-              <a:rPr lang="en-IN" sz="900" b="0" dirty="0">
-                <a:solidFill>
-                  <a:srgbClr val="DCDCDC"/>
-                </a:solidFill>
-                <a:effectLst/>
-                <a:latin typeface="Consolas" panose="020B0609020204030204" pitchFamily="49" charset="0"/>
-              </a:rPr>
-              <a:t>:</a:t>
-            </a:r>
-            <a:r>
-              <a:rPr lang="en-IN" sz="900" b="0" dirty="0">
-                <a:solidFill>
-                  <a:srgbClr val="D4D4D4"/>
-                </a:solidFill>
-                <a:effectLst/>
-                <a:latin typeface="Consolas" panose="020B0609020204030204" pitchFamily="49" charset="0"/>
-              </a:rPr>
-              <a:t> </a:t>
-            </a:r>
-            <a:r>
-              <a:rPr lang="en-IN" sz="900" b="0" dirty="0">
-                <a:solidFill>
-                  <a:srgbClr val="CE9178"/>
-                </a:solidFill>
-                <a:effectLst/>
-                <a:latin typeface="Consolas" panose="020B0609020204030204" pitchFamily="49" charset="0"/>
-              </a:rPr>
-              <a:t>"5f45937abd14352638c6e791"</a:t>
-            </a:r>
-            <a:r>
-              <a:rPr lang="en-IN" sz="900" b="0" dirty="0">
-                <a:solidFill>
-                  <a:srgbClr val="DCDCDC"/>
-                </a:solidFill>
-                <a:effectLst/>
-                <a:latin typeface="Consolas" panose="020B0609020204030204" pitchFamily="49" charset="0"/>
-              </a:rPr>
-              <a:t>,</a:t>
-            </a:r>
-            <a:endParaRPr lang="en-IN" sz="900" b="0" dirty="0">
-              <a:solidFill>
-                <a:srgbClr val="D4D4D4"/>
-              </a:solidFill>
-              <a:effectLst/>
-              <a:latin typeface="Consolas" panose="020B0609020204030204" pitchFamily="49" charset="0"/>
-            </a:endParaRPr>
-          </a:p>
-          <a:p>
-            <a:pPr marL="0" indent="0">
-              <a:buNone/>
-            </a:pPr>
-            <a:r>
-              <a:rPr lang="en-IN" sz="900" b="0" dirty="0">
-                <a:solidFill>
-                  <a:srgbClr val="D4D4D4"/>
-                </a:solidFill>
-                <a:effectLst/>
-                <a:latin typeface="Consolas" panose="020B0609020204030204" pitchFamily="49" charset="0"/>
-              </a:rPr>
-              <a:t>            </a:t>
-            </a:r>
-            <a:r>
-              <a:rPr lang="en-IN" sz="900" b="0" dirty="0">
-                <a:solidFill>
-                  <a:srgbClr val="9CDCFE"/>
-                </a:solidFill>
-                <a:effectLst/>
-                <a:latin typeface="Consolas" panose="020B0609020204030204" pitchFamily="49" charset="0"/>
-              </a:rPr>
-              <a:t>"productPrice"</a:t>
-            </a:r>
-            <a:r>
-              <a:rPr lang="en-IN" sz="900" b="0" dirty="0">
-                <a:solidFill>
-                  <a:srgbClr val="DCDCDC"/>
-                </a:solidFill>
-                <a:effectLst/>
-                <a:latin typeface="Consolas" panose="020B0609020204030204" pitchFamily="49" charset="0"/>
-              </a:rPr>
-              <a:t>:</a:t>
-            </a:r>
-            <a:r>
-              <a:rPr lang="en-IN" sz="900" b="0" dirty="0">
-                <a:solidFill>
-                  <a:srgbClr val="D4D4D4"/>
-                </a:solidFill>
-                <a:effectLst/>
-                <a:latin typeface="Consolas" panose="020B0609020204030204" pitchFamily="49" charset="0"/>
-              </a:rPr>
-              <a:t> </a:t>
-            </a:r>
-            <a:r>
-              <a:rPr lang="en-IN" sz="900" b="0" dirty="0">
-                <a:solidFill>
-                  <a:srgbClr val="B5CEA8"/>
-                </a:solidFill>
-                <a:effectLst/>
-                <a:latin typeface="Consolas" panose="020B0609020204030204" pitchFamily="49" charset="0"/>
-              </a:rPr>
-              <a:t>68300</a:t>
-            </a:r>
-            <a:r>
-              <a:rPr lang="en-IN" sz="900" b="0" dirty="0">
-                <a:solidFill>
-                  <a:srgbClr val="DCDCDC"/>
-                </a:solidFill>
-                <a:effectLst/>
-                <a:latin typeface="Consolas" panose="020B0609020204030204" pitchFamily="49" charset="0"/>
-              </a:rPr>
-              <a:t>,</a:t>
-            </a:r>
-            <a:endParaRPr lang="en-IN" sz="900" b="0" dirty="0">
-              <a:solidFill>
-                <a:srgbClr val="D4D4D4"/>
-              </a:solidFill>
-              <a:effectLst/>
-              <a:latin typeface="Consolas" panose="020B0609020204030204" pitchFamily="49" charset="0"/>
-            </a:endParaRPr>
-          </a:p>
-          <a:p>
-            <a:pPr marL="0" indent="0">
-              <a:buNone/>
-            </a:pPr>
-            <a:r>
-              <a:rPr lang="en-IN" sz="900" b="0" dirty="0">
-                <a:solidFill>
-                  <a:srgbClr val="D4D4D4"/>
-                </a:solidFill>
-                <a:effectLst/>
-                <a:latin typeface="Consolas" panose="020B0609020204030204" pitchFamily="49" charset="0"/>
-              </a:rPr>
-              <a:t>            </a:t>
-            </a:r>
-            <a:r>
-              <a:rPr lang="en-IN" sz="900" b="0" dirty="0">
-                <a:solidFill>
-                  <a:srgbClr val="9CDCFE"/>
-                </a:solidFill>
-                <a:effectLst/>
-                <a:latin typeface="Consolas" panose="020B0609020204030204" pitchFamily="49" charset="0"/>
-              </a:rPr>
-              <a:t>"productCoverImage"</a:t>
-            </a:r>
-            <a:r>
-              <a:rPr lang="en-IN" sz="900" b="0" dirty="0">
-                <a:solidFill>
-                  <a:srgbClr val="DCDCDC"/>
-                </a:solidFill>
-                <a:effectLst/>
-                <a:latin typeface="Consolas" panose="020B0609020204030204" pitchFamily="49" charset="0"/>
-              </a:rPr>
-              <a:t>:</a:t>
-            </a:r>
-            <a:r>
-              <a:rPr lang="en-IN" sz="900" b="0" dirty="0">
-                <a:solidFill>
-                  <a:srgbClr val="D4D4D4"/>
-                </a:solidFill>
-                <a:effectLst/>
-                <a:latin typeface="Consolas" panose="020B0609020204030204" pitchFamily="49" charset="0"/>
-              </a:rPr>
-              <a:t> </a:t>
-            </a:r>
-            <a:r>
-              <a:rPr lang="en-IN" sz="900" b="0" dirty="0">
-                <a:solidFill>
-                  <a:srgbClr val="CE9178"/>
-                </a:solidFill>
-                <a:effectLst/>
-                <a:latin typeface="Consolas" panose="020B0609020204030204" pitchFamily="49" charset="0"/>
-              </a:rPr>
-              <a:t>"https://storage.googleapis.com/lexa-productcovers/iphone11.jpg"</a:t>
-            </a:r>
-            <a:r>
-              <a:rPr lang="en-IN" sz="900" b="0" dirty="0">
-                <a:solidFill>
-                  <a:srgbClr val="DCDCDC"/>
-                </a:solidFill>
-                <a:effectLst/>
-                <a:latin typeface="Consolas" panose="020B0609020204030204" pitchFamily="49" charset="0"/>
-              </a:rPr>
-              <a:t>,</a:t>
-            </a:r>
-            <a:endParaRPr lang="en-IN" sz="900" b="0" dirty="0">
-              <a:solidFill>
-                <a:srgbClr val="D4D4D4"/>
-              </a:solidFill>
-              <a:effectLst/>
-              <a:latin typeface="Consolas" panose="020B0609020204030204" pitchFamily="49" charset="0"/>
-            </a:endParaRPr>
-          </a:p>
-          <a:p>
-            <a:pPr marL="0" indent="0">
-              <a:buNone/>
-            </a:pPr>
-            <a:r>
-              <a:rPr lang="en-IN" sz="900" b="0" dirty="0">
-                <a:solidFill>
-                  <a:srgbClr val="D4D4D4"/>
-                </a:solidFill>
-                <a:effectLst/>
-                <a:latin typeface="Consolas" panose="020B0609020204030204" pitchFamily="49" charset="0"/>
-              </a:rPr>
-              <a:t>            </a:t>
-            </a:r>
-            <a:r>
-              <a:rPr lang="en-IN" sz="900" b="0" dirty="0">
-                <a:solidFill>
-                  <a:srgbClr val="9CDCFE"/>
-                </a:solidFill>
-                <a:effectLst/>
-                <a:latin typeface="Consolas" panose="020B0609020204030204" pitchFamily="49" charset="0"/>
-              </a:rPr>
-              <a:t>"id"</a:t>
-            </a:r>
-            <a:r>
-              <a:rPr lang="en-IN" sz="900" b="0" dirty="0">
-                <a:solidFill>
-                  <a:srgbClr val="DCDCDC"/>
-                </a:solidFill>
-                <a:effectLst/>
-                <a:latin typeface="Consolas" panose="020B0609020204030204" pitchFamily="49" charset="0"/>
-              </a:rPr>
-              <a:t>:</a:t>
-            </a:r>
-            <a:r>
-              <a:rPr lang="en-IN" sz="900" b="0" dirty="0">
-                <a:solidFill>
-                  <a:srgbClr val="D4D4D4"/>
-                </a:solidFill>
-                <a:effectLst/>
-                <a:latin typeface="Consolas" panose="020B0609020204030204" pitchFamily="49" charset="0"/>
-              </a:rPr>
-              <a:t> </a:t>
-            </a:r>
-            <a:r>
-              <a:rPr lang="en-IN" sz="900" b="0" dirty="0">
-                <a:solidFill>
-                  <a:srgbClr val="CE9178"/>
-                </a:solidFill>
-                <a:effectLst/>
-                <a:latin typeface="Consolas" panose="020B0609020204030204" pitchFamily="49" charset="0"/>
-              </a:rPr>
-              <a:t>"5f46d2da8b7db3676021b0aa"</a:t>
-            </a:r>
-            <a:endParaRPr lang="en-IN" sz="900" b="0" dirty="0">
-              <a:solidFill>
-                <a:srgbClr val="D4D4D4"/>
-              </a:solidFill>
-              <a:effectLst/>
-              <a:latin typeface="Consolas" panose="020B0609020204030204" pitchFamily="49" charset="0"/>
-            </a:endParaRPr>
-          </a:p>
-          <a:p>
-            <a:pPr marL="0" indent="0">
-              <a:buNone/>
-            </a:pPr>
-            <a:r>
-              <a:rPr lang="en-IN" sz="900" b="0" dirty="0">
-                <a:solidFill>
-                  <a:srgbClr val="D4D4D4"/>
-                </a:solidFill>
-                <a:effectLst/>
-                <a:latin typeface="Consolas" panose="020B0609020204030204" pitchFamily="49" charset="0"/>
-              </a:rPr>
-              <a:t>        </a:t>
-            </a:r>
-            <a:r>
-              <a:rPr lang="en-IN" sz="900" b="0" dirty="0">
-                <a:solidFill>
-                  <a:srgbClr val="DCDCDC"/>
-                </a:solidFill>
-                <a:effectLst/>
-                <a:latin typeface="Consolas" panose="020B0609020204030204" pitchFamily="49" charset="0"/>
-              </a:rPr>
-              <a:t>}</a:t>
-            </a:r>
-          </a:p>
-          <a:p>
-            <a:pPr marL="0" indent="0">
-              <a:buNone/>
-            </a:pPr>
-            <a:r>
-              <a:rPr lang="en-IN" sz="900" b="0" dirty="0">
-                <a:solidFill>
-                  <a:srgbClr val="D4D4D4"/>
-                </a:solidFill>
-                <a:effectLst/>
-                <a:latin typeface="Consolas" panose="020B0609020204030204" pitchFamily="49" charset="0"/>
-              </a:rPr>
-              <a:t>	]</a:t>
-            </a:r>
-          </a:p>
-          <a:p>
             <a:pPr>
               <a:buFont typeface="Arial" panose="020B0604020202020204" pitchFamily="34" charset="0"/>
               <a:buChar char="•"/>
@@ -7493,6 +6355,42 @@
           </a:p>
         </p:txBody>
       </p:sp>
+      <p:pic>
+        <p:nvPicPr>
+          <p:cNvPr id="5" name="Picture 4">
+            <a:extLst>
+              <a:ext uri="{FF2B5EF4-FFF2-40B4-BE49-F238E27FC236}">
+                <a16:creationId xmlns:a16="http://schemas.microsoft.com/office/drawing/2014/main" id="{3901660C-96C3-428D-BE8A-6A2AE0EB65FA}"/>
+              </a:ext>
+            </a:extLst>
+          </p:cNvPr>
+          <p:cNvPicPr>
+            <a:picLocks noChangeAspect="1"/>
+          </p:cNvPicPr>
+          <p:nvPr/>
+        </p:nvPicPr>
+        <p:blipFill>
+          <a:blip r:embed="rId3">
+            <a:extLst>
+              <a:ext uri="{28A0092B-C50C-407E-A947-70E740481C1C}">
+                <a14:useLocalDpi xmlns:a14="http://schemas.microsoft.com/office/drawing/2010/main" val="0"/>
+              </a:ext>
+            </a:extLst>
+          </a:blip>
+          <a:stretch>
+            <a:fillRect/>
+          </a:stretch>
+        </p:blipFill>
+        <p:spPr>
+          <a:xfrm>
+            <a:off x="393934" y="2361063"/>
+            <a:ext cx="11397732" cy="4419867"/>
+          </a:xfrm>
+          <a:prstGeom prst="rect">
+            <a:avLst/>
+          </a:prstGeom>
+        </p:spPr>
+      </p:pic>
     </p:spTree>
     <p:extLst>
       <p:ext uri="{BB962C8B-B14F-4D97-AF65-F5344CB8AC3E}">
@@ -7918,28 +6816,28 @@
         </p:nvSpPr>
         <p:spPr>
           <a:xfrm>
-            <a:off x="150125" y="618699"/>
-            <a:ext cx="11928144" cy="6109647"/>
+            <a:off x="191068" y="618699"/>
+            <a:ext cx="9130353" cy="1141862"/>
           </a:xfrm>
         </p:spPr>
         <p:txBody>
           <a:bodyPr>
-            <a:normAutofit fontScale="47500" lnSpcReduction="20000"/>
+            <a:normAutofit fontScale="77500" lnSpcReduction="20000"/>
           </a:bodyPr>
           <a:lstStyle/>
           <a:p>
             <a:r>
-              <a:rPr lang="en-US" sz="5600" dirty="0"/>
+              <a:rPr lang="en-US" sz="1300" dirty="0"/>
               <a:t>API ENDPOINT : </a:t>
             </a:r>
             <a:r>
-              <a:rPr lang="en-IN" sz="5600" dirty="0">
+              <a:rPr lang="en-IN" sz="1300" dirty="0">
                 <a:hlinkClick r:id="rId2"/>
               </a:rPr>
               <a:t>https://lexaapi.uc.r.appspot.com/api/v1/</a:t>
             </a:r>
             <a:r>
-              <a:rPr lang="en-IN" sz="5600" b="0" i="0" dirty="0">
+              <a:rPr lang="en-IN" sz="1300" b="0" i="0" dirty="0">
                 <a:solidFill>
                   <a:srgbClr val="F0F0F0"/>
                 </a:solidFill>
@@ -7949,7 +6847,7 @@
               </a:rPr>
               <a:t>product/getProductsDetailsInCart</a:t>
             </a:r>
-            <a:endParaRPr lang="en-IN" sz="5600" b="0" i="0" dirty="0">
+            <a:endParaRPr lang="en-IN" sz="1300" b="0" i="0" dirty="0">
               <a:solidFill>
                 <a:srgbClr val="F0F0F0"/>
               </a:solidFill>
@@ -7959,1134 +6857,271 @@
           </a:p>
           <a:p>
             <a:r>
-              <a:rPr lang="en-IN" sz="5600" dirty="0"/>
+              <a:rPr lang="en-IN" sz="1300" dirty="0"/>
               <a:t>This Routes Doesn’t loop through list and reduce fetch time instead it uses mongo DB's $in method with collection to find the list of products with there unique Ids.</a:t>
             </a:r>
           </a:p>
           <a:p>
             <a:r>
-              <a:rPr lang="en-IN" sz="5600" dirty="0"/>
+              <a:rPr lang="en-IN" sz="1300" dirty="0"/>
               <a:t>This routes take exact cartsItems as req.body’s key </a:t>
             </a:r>
           </a:p>
           <a:p>
             <a:r>
-              <a:rPr lang="en-IN" sz="2000" dirty="0"/>
+              <a:rPr lang="en-IN" sz="1100" dirty="0"/>
               <a:t>Example</a:t>
             </a:r>
           </a:p>
           <a:p>
-            <a:r>
-              <a:rPr lang="en-IN" sz="2000" dirty="0"/>
-              <a:t>Input : </a:t>
-            </a:r>
-            <a:r>
-              <a:rPr lang="en-IN" sz="2000" b="0" dirty="0">
-                <a:solidFill>
-                  <a:srgbClr val="D4D4D4"/>
-                </a:solidFill>
-                <a:effectLst/>
-                <a:latin typeface="Consolas" panose="020B0609020204030204" pitchFamily="49" charset="0"/>
-              </a:rPr>
-              <a:t>{</a:t>
-            </a:r>
-            <a:r>
-              <a:rPr lang="en-IN" sz="2000" b="0" dirty="0">
-                <a:solidFill>
-                  <a:srgbClr val="9CDCFE"/>
-                </a:solidFill>
-                <a:effectLst/>
-                <a:latin typeface="Consolas" panose="020B0609020204030204" pitchFamily="49" charset="0"/>
-              </a:rPr>
-              <a:t>"cartItems"</a:t>
-            </a:r>
-            <a:r>
-              <a:rPr lang="en-IN" sz="2000" b="0" dirty="0">
-                <a:solidFill>
-                  <a:srgbClr val="D4D4D4"/>
-                </a:solidFill>
-                <a:effectLst/>
-                <a:latin typeface="Consolas" panose="020B0609020204030204" pitchFamily="49" charset="0"/>
-              </a:rPr>
-              <a:t> </a:t>
-            </a:r>
-            <a:r>
-              <a:rPr lang="en-IN" sz="2000" b="0" dirty="0">
-                <a:solidFill>
-                  <a:srgbClr val="DCDCDC"/>
-                </a:solidFill>
-                <a:effectLst/>
-                <a:latin typeface="Consolas" panose="020B0609020204030204" pitchFamily="49" charset="0"/>
-              </a:rPr>
-              <a:t>:[</a:t>
-            </a:r>
-            <a:r>
-              <a:rPr lang="en-IN" sz="2000" b="0" dirty="0">
-                <a:solidFill>
-                  <a:srgbClr val="9CDCFE"/>
-                </a:solidFill>
-                <a:effectLst/>
-                <a:latin typeface="Consolas" panose="020B0609020204030204" pitchFamily="49" charset="0"/>
-              </a:rPr>
-              <a:t>"5f47986c87c2644624079997"</a:t>
-            </a:r>
-            <a:r>
-              <a:rPr lang="en-IN" sz="2000" b="0" dirty="0">
-                <a:solidFill>
-                  <a:srgbClr val="DCDCDC"/>
-                </a:solidFill>
-                <a:effectLst/>
-                <a:latin typeface="Consolas" panose="020B0609020204030204" pitchFamily="49" charset="0"/>
-              </a:rPr>
-              <a:t>,</a:t>
-            </a:r>
-            <a:r>
-              <a:rPr lang="en-IN" sz="2000" b="0" dirty="0">
-                <a:solidFill>
-                  <a:srgbClr val="9CDCFE"/>
-                </a:solidFill>
-                <a:effectLst/>
-                <a:latin typeface="Consolas" panose="020B0609020204030204" pitchFamily="49" charset="0"/>
-              </a:rPr>
-              <a:t>"5f479cdc87c2644624079998"</a:t>
-            </a:r>
-            <a:r>
-              <a:rPr lang="en-IN" sz="2000" b="0" dirty="0">
-                <a:solidFill>
-                  <a:srgbClr val="DCDCDC"/>
-                </a:solidFill>
-                <a:effectLst/>
-                <a:latin typeface="Consolas" panose="020B0609020204030204" pitchFamily="49" charset="0"/>
-              </a:rPr>
-              <a:t>]}</a:t>
-            </a:r>
-            <a:endParaRPr lang="en-IN" sz="2000" b="0" dirty="0">
-              <a:solidFill>
-                <a:srgbClr val="D4D4D4"/>
-              </a:solidFill>
-              <a:effectLst/>
-              <a:latin typeface="Consolas" panose="020B0609020204030204" pitchFamily="49" charset="0"/>
-            </a:endParaRPr>
-          </a:p>
-          <a:p>
-            <a:r>
-              <a:rPr lang="en-IN" sz="2000" dirty="0"/>
-              <a:t>Output : </a:t>
-            </a:r>
-            <a:r>
-              <a:rPr lang="en-IN" sz="2000" b="0" dirty="0">
-                <a:solidFill>
-                  <a:srgbClr val="DCDCDC"/>
-                </a:solidFill>
-                <a:effectLst/>
-                <a:latin typeface="Consolas" panose="020B0609020204030204" pitchFamily="49" charset="0"/>
-              </a:rPr>
-              <a:t>{</a:t>
-            </a:r>
-            <a:r>
-              <a:rPr lang="en-IN" sz="2000" b="0" dirty="0">
-                <a:solidFill>
-                  <a:srgbClr val="9CDCFE"/>
-                </a:solidFill>
-                <a:effectLst/>
-                <a:latin typeface="Consolas" panose="020B0609020204030204" pitchFamily="49" charset="0"/>
-              </a:rPr>
-              <a:t>"foundResults"</a:t>
-            </a:r>
-            <a:r>
-              <a:rPr lang="en-IN" sz="2000" b="0" dirty="0">
-                <a:solidFill>
-                  <a:srgbClr val="DCDCDC"/>
-                </a:solidFill>
-                <a:effectLst/>
-                <a:latin typeface="Consolas" panose="020B0609020204030204" pitchFamily="49" charset="0"/>
-              </a:rPr>
-              <a:t>:</a:t>
-            </a:r>
-            <a:r>
-              <a:rPr lang="en-IN" sz="2000" b="0" dirty="0">
-                <a:solidFill>
-                  <a:srgbClr val="D4D4D4"/>
-                </a:solidFill>
-                <a:effectLst/>
-                <a:latin typeface="Consolas" panose="020B0609020204030204" pitchFamily="49" charset="0"/>
-              </a:rPr>
-              <a:t> </a:t>
-            </a:r>
-            <a:r>
-              <a:rPr lang="en-IN" sz="2000" b="0" dirty="0">
-                <a:solidFill>
-                  <a:srgbClr val="B5CEA8"/>
-                </a:solidFill>
-                <a:effectLst/>
-                <a:latin typeface="Consolas" panose="020B0609020204030204" pitchFamily="49" charset="0"/>
-              </a:rPr>
-              <a:t>2</a:t>
-            </a:r>
-            <a:r>
-              <a:rPr lang="en-IN" sz="2000" b="0" dirty="0">
-                <a:solidFill>
-                  <a:srgbClr val="DCDCDC"/>
-                </a:solidFill>
-                <a:effectLst/>
-                <a:latin typeface="Consolas" panose="020B0609020204030204" pitchFamily="49" charset="0"/>
-              </a:rPr>
-              <a:t>,</a:t>
-            </a:r>
-            <a:r>
-              <a:rPr lang="en-IN" sz="2000" b="0" dirty="0">
-                <a:solidFill>
-                  <a:srgbClr val="9CDCFE"/>
-                </a:solidFill>
-                <a:effectLst/>
-                <a:latin typeface="Consolas" panose="020B0609020204030204" pitchFamily="49" charset="0"/>
-              </a:rPr>
-              <a:t>"message"</a:t>
-            </a:r>
-            <a:r>
-              <a:rPr lang="en-IN" sz="2000" b="0" dirty="0">
-                <a:solidFill>
-                  <a:srgbClr val="DCDCDC"/>
-                </a:solidFill>
-                <a:effectLst/>
-                <a:latin typeface="Consolas" panose="020B0609020204030204" pitchFamily="49" charset="0"/>
-              </a:rPr>
-              <a:t>:</a:t>
-            </a:r>
-            <a:r>
-              <a:rPr lang="en-IN" sz="2000" b="0" dirty="0">
-                <a:solidFill>
-                  <a:srgbClr val="D4D4D4"/>
-                </a:solidFill>
-                <a:effectLst/>
-                <a:latin typeface="Consolas" panose="020B0609020204030204" pitchFamily="49" charset="0"/>
-              </a:rPr>
-              <a:t> </a:t>
-            </a:r>
-            <a:r>
-              <a:rPr lang="en-IN" sz="2000" b="0" dirty="0">
-                <a:solidFill>
-                  <a:srgbClr val="CE9178"/>
-                </a:solidFill>
-                <a:effectLst/>
-                <a:latin typeface="Consolas" panose="020B0609020204030204" pitchFamily="49" charset="0"/>
-              </a:rPr>
-              <a:t>"Details Of Products in Cart"</a:t>
-            </a:r>
-            <a:r>
-              <a:rPr lang="en-IN" sz="2000" b="0" dirty="0">
-                <a:solidFill>
-                  <a:srgbClr val="DCDCDC"/>
-                </a:solidFill>
-                <a:effectLst/>
-                <a:latin typeface="Consolas" panose="020B0609020204030204" pitchFamily="49" charset="0"/>
-              </a:rPr>
-              <a:t>,</a:t>
-            </a:r>
-            <a:endParaRPr lang="en-IN" sz="2000" b="0" dirty="0">
-              <a:solidFill>
-                <a:srgbClr val="D4D4D4"/>
-              </a:solidFill>
-              <a:effectLst/>
-              <a:latin typeface="Consolas" panose="020B0609020204030204" pitchFamily="49" charset="0"/>
-            </a:endParaRPr>
-          </a:p>
-          <a:p>
-            <a:r>
-              <a:rPr lang="en-IN" sz="2000" b="0" dirty="0">
-                <a:solidFill>
-                  <a:srgbClr val="D4D4D4"/>
-                </a:solidFill>
-                <a:effectLst/>
-                <a:latin typeface="Consolas" panose="020B0609020204030204" pitchFamily="49" charset="0"/>
-              </a:rPr>
-              <a:t>    </a:t>
-            </a:r>
-            <a:r>
-              <a:rPr lang="en-IN" sz="2000" b="0" dirty="0">
-                <a:solidFill>
-                  <a:srgbClr val="9CDCFE"/>
-                </a:solidFill>
-                <a:effectLst/>
-                <a:latin typeface="Consolas" panose="020B0609020204030204" pitchFamily="49" charset="0"/>
-              </a:rPr>
-              <a:t>"details"</a:t>
-            </a:r>
-            <a:r>
-              <a:rPr lang="en-IN" sz="2000" b="0" dirty="0">
-                <a:solidFill>
-                  <a:srgbClr val="DCDCDC"/>
-                </a:solidFill>
-                <a:effectLst/>
-                <a:latin typeface="Consolas" panose="020B0609020204030204" pitchFamily="49" charset="0"/>
-              </a:rPr>
-              <a:t>:</a:t>
-            </a:r>
-            <a:r>
-              <a:rPr lang="en-IN" sz="2000" b="0" dirty="0">
-                <a:solidFill>
-                  <a:srgbClr val="D4D4D4"/>
-                </a:solidFill>
-                <a:effectLst/>
-                <a:latin typeface="Consolas" panose="020B0609020204030204" pitchFamily="49" charset="0"/>
-              </a:rPr>
-              <a:t> </a:t>
-            </a:r>
-            <a:r>
-              <a:rPr lang="en-IN" sz="2000" b="0" dirty="0">
-                <a:solidFill>
-                  <a:srgbClr val="DCDCDC"/>
-                </a:solidFill>
-                <a:effectLst/>
-                <a:latin typeface="Consolas" panose="020B0609020204030204" pitchFamily="49" charset="0"/>
-              </a:rPr>
-              <a:t>[{</a:t>
-            </a:r>
-            <a:endParaRPr lang="en-IN" sz="2000" b="0" dirty="0">
-              <a:solidFill>
-                <a:srgbClr val="D4D4D4"/>
-              </a:solidFill>
-              <a:effectLst/>
-              <a:latin typeface="Consolas" panose="020B0609020204030204" pitchFamily="49" charset="0"/>
-            </a:endParaRPr>
-          </a:p>
-          <a:p>
-            <a:r>
-              <a:rPr lang="en-IN" sz="2000" b="0" dirty="0">
-                <a:solidFill>
-                  <a:srgbClr val="D4D4D4"/>
-                </a:solidFill>
-                <a:effectLst/>
-                <a:latin typeface="Consolas" panose="020B0609020204030204" pitchFamily="49" charset="0"/>
-              </a:rPr>
-              <a:t>            </a:t>
-            </a:r>
-            <a:r>
-              <a:rPr lang="en-IN" sz="2000" b="0" dirty="0">
-                <a:solidFill>
-                  <a:srgbClr val="9CDCFE"/>
-                </a:solidFill>
-                <a:effectLst/>
-                <a:latin typeface="Consolas" panose="020B0609020204030204" pitchFamily="49" charset="0"/>
-              </a:rPr>
-              <a:t>"_id"</a:t>
-            </a:r>
-            <a:r>
-              <a:rPr lang="en-IN" sz="2000" b="0" dirty="0">
-                <a:solidFill>
-                  <a:srgbClr val="DCDCDC"/>
-                </a:solidFill>
-                <a:effectLst/>
-                <a:latin typeface="Consolas" panose="020B0609020204030204" pitchFamily="49" charset="0"/>
-              </a:rPr>
-              <a:t>:</a:t>
-            </a:r>
-            <a:r>
-              <a:rPr lang="en-IN" sz="2000" b="0" dirty="0">
-                <a:solidFill>
-                  <a:srgbClr val="D4D4D4"/>
-                </a:solidFill>
-                <a:effectLst/>
-                <a:latin typeface="Consolas" panose="020B0609020204030204" pitchFamily="49" charset="0"/>
-              </a:rPr>
-              <a:t> </a:t>
-            </a:r>
-            <a:r>
-              <a:rPr lang="en-IN" sz="2000" b="0" dirty="0">
-                <a:solidFill>
-                  <a:srgbClr val="CE9178"/>
-                </a:solidFill>
-                <a:effectLst/>
-                <a:latin typeface="Consolas" panose="020B0609020204030204" pitchFamily="49" charset="0"/>
-              </a:rPr>
-              <a:t>"5f47986c87c2644624079997"</a:t>
-            </a:r>
-            <a:r>
-              <a:rPr lang="en-IN" sz="2000" b="0" dirty="0">
-                <a:solidFill>
-                  <a:srgbClr val="DCDCDC"/>
-                </a:solidFill>
-                <a:effectLst/>
-                <a:latin typeface="Consolas" panose="020B0609020204030204" pitchFamily="49" charset="0"/>
-              </a:rPr>
-              <a:t>,</a:t>
-            </a:r>
-            <a:endParaRPr lang="en-IN" sz="2000" b="0" dirty="0">
-              <a:solidFill>
-                <a:srgbClr val="D4D4D4"/>
-              </a:solidFill>
-              <a:effectLst/>
-              <a:latin typeface="Consolas" panose="020B0609020204030204" pitchFamily="49" charset="0"/>
-            </a:endParaRPr>
-          </a:p>
-          <a:p>
-            <a:r>
-              <a:rPr lang="en-IN" sz="2000" b="0" dirty="0">
-                <a:solidFill>
-                  <a:srgbClr val="D4D4D4"/>
-                </a:solidFill>
-                <a:effectLst/>
-                <a:latin typeface="Consolas" panose="020B0609020204030204" pitchFamily="49" charset="0"/>
-              </a:rPr>
-              <a:t>            </a:t>
-            </a:r>
-            <a:r>
-              <a:rPr lang="en-IN" sz="2000" b="0" dirty="0">
-                <a:solidFill>
-                  <a:srgbClr val="9CDCFE"/>
-                </a:solidFill>
-                <a:effectLst/>
-                <a:latin typeface="Consolas" panose="020B0609020204030204" pitchFamily="49" charset="0"/>
-              </a:rPr>
-              <a:t>"productName"</a:t>
-            </a:r>
-            <a:r>
-              <a:rPr lang="en-IN" sz="2000" b="0" dirty="0">
-                <a:solidFill>
-                  <a:srgbClr val="DCDCDC"/>
-                </a:solidFill>
-                <a:effectLst/>
-                <a:latin typeface="Consolas" panose="020B0609020204030204" pitchFamily="49" charset="0"/>
-              </a:rPr>
-              <a:t>:</a:t>
-            </a:r>
-            <a:r>
-              <a:rPr lang="en-IN" sz="2000" b="0" dirty="0">
-                <a:solidFill>
-                  <a:srgbClr val="D4D4D4"/>
-                </a:solidFill>
-                <a:effectLst/>
-                <a:latin typeface="Consolas" panose="020B0609020204030204" pitchFamily="49" charset="0"/>
-              </a:rPr>
-              <a:t> </a:t>
-            </a:r>
-            <a:r>
-              <a:rPr lang="en-IN" sz="2000" b="0" dirty="0">
-                <a:solidFill>
-                  <a:srgbClr val="CE9178"/>
-                </a:solidFill>
-                <a:effectLst/>
-                <a:latin typeface="Consolas" panose="020B0609020204030204" pitchFamily="49" charset="0"/>
-              </a:rPr>
-              <a:t>"OnePlus 8 (Glacial Green 6GB RAM+128GB Storage)"</a:t>
-            </a:r>
-            <a:r>
-              <a:rPr lang="en-IN" sz="2000" b="0" dirty="0">
-                <a:solidFill>
-                  <a:srgbClr val="DCDCDC"/>
-                </a:solidFill>
-                <a:effectLst/>
-                <a:latin typeface="Consolas" panose="020B0609020204030204" pitchFamily="49" charset="0"/>
-              </a:rPr>
-              <a:t>,</a:t>
-            </a:r>
-            <a:endParaRPr lang="en-IN" sz="2000" b="0" dirty="0">
-              <a:solidFill>
-                <a:srgbClr val="D4D4D4"/>
-              </a:solidFill>
-              <a:effectLst/>
-              <a:latin typeface="Consolas" panose="020B0609020204030204" pitchFamily="49" charset="0"/>
-            </a:endParaRPr>
-          </a:p>
-          <a:p>
-            <a:r>
-              <a:rPr lang="en-IN" sz="2000" b="0" dirty="0">
-                <a:solidFill>
-                  <a:srgbClr val="D4D4D4"/>
-                </a:solidFill>
-                <a:effectLst/>
-                <a:latin typeface="Consolas" panose="020B0609020204030204" pitchFamily="49" charset="0"/>
-              </a:rPr>
-              <a:t>            </a:t>
-            </a:r>
-            <a:r>
-              <a:rPr lang="en-IN" sz="2000" b="0" dirty="0">
-                <a:solidFill>
-                  <a:srgbClr val="9CDCFE"/>
-                </a:solidFill>
-                <a:effectLst/>
-                <a:latin typeface="Consolas" panose="020B0609020204030204" pitchFamily="49" charset="0"/>
-              </a:rPr>
-              <a:t>"categoryId"</a:t>
-            </a:r>
-            <a:r>
-              <a:rPr lang="en-IN" sz="2000" b="0" dirty="0">
-                <a:solidFill>
-                  <a:srgbClr val="DCDCDC"/>
-                </a:solidFill>
-                <a:effectLst/>
-                <a:latin typeface="Consolas" panose="020B0609020204030204" pitchFamily="49" charset="0"/>
-              </a:rPr>
-              <a:t>:</a:t>
-            </a:r>
-            <a:r>
-              <a:rPr lang="en-IN" sz="2000" b="0" dirty="0">
-                <a:solidFill>
-                  <a:srgbClr val="D4D4D4"/>
-                </a:solidFill>
-                <a:effectLst/>
-                <a:latin typeface="Consolas" panose="020B0609020204030204" pitchFamily="49" charset="0"/>
-              </a:rPr>
-              <a:t> </a:t>
-            </a:r>
-            <a:r>
-              <a:rPr lang="en-IN" sz="2000" b="0" dirty="0">
-                <a:solidFill>
-                  <a:srgbClr val="CE9178"/>
-                </a:solidFill>
-                <a:effectLst/>
-                <a:latin typeface="Consolas" panose="020B0609020204030204" pitchFamily="49" charset="0"/>
-              </a:rPr>
-              <a:t>"5f45937abd14352638c6e791"</a:t>
-            </a:r>
-            <a:r>
-              <a:rPr lang="en-IN" sz="2000" b="0" dirty="0">
-                <a:solidFill>
-                  <a:srgbClr val="DCDCDC"/>
-                </a:solidFill>
-                <a:effectLst/>
-                <a:latin typeface="Consolas" panose="020B0609020204030204" pitchFamily="49" charset="0"/>
-              </a:rPr>
-              <a:t>,</a:t>
-            </a:r>
-            <a:endParaRPr lang="en-IN" sz="2000" b="0" dirty="0">
-              <a:solidFill>
-                <a:srgbClr val="D4D4D4"/>
-              </a:solidFill>
-              <a:effectLst/>
-              <a:latin typeface="Consolas" panose="020B0609020204030204" pitchFamily="49" charset="0"/>
-            </a:endParaRPr>
-          </a:p>
-          <a:p>
-            <a:r>
-              <a:rPr lang="en-IN" sz="2000" b="0" dirty="0">
-                <a:solidFill>
-                  <a:srgbClr val="D4D4D4"/>
-                </a:solidFill>
-                <a:effectLst/>
-                <a:latin typeface="Consolas" panose="020B0609020204030204" pitchFamily="49" charset="0"/>
-              </a:rPr>
-              <a:t>            </a:t>
-            </a:r>
-            <a:r>
-              <a:rPr lang="en-IN" sz="2000" b="0" dirty="0">
-                <a:solidFill>
-                  <a:srgbClr val="9CDCFE"/>
-                </a:solidFill>
-                <a:effectLst/>
-                <a:latin typeface="Consolas" panose="020B0609020204030204" pitchFamily="49" charset="0"/>
-              </a:rPr>
-              <a:t>"productPrice"</a:t>
-            </a:r>
-            <a:r>
-              <a:rPr lang="en-IN" sz="2000" b="0" dirty="0">
-                <a:solidFill>
-                  <a:srgbClr val="DCDCDC"/>
-                </a:solidFill>
-                <a:effectLst/>
-                <a:latin typeface="Consolas" panose="020B0609020204030204" pitchFamily="49" charset="0"/>
-              </a:rPr>
-              <a:t>:</a:t>
-            </a:r>
-            <a:r>
-              <a:rPr lang="en-IN" sz="2000" b="0" dirty="0">
-                <a:solidFill>
-                  <a:srgbClr val="D4D4D4"/>
-                </a:solidFill>
-                <a:effectLst/>
-                <a:latin typeface="Consolas" panose="020B0609020204030204" pitchFamily="49" charset="0"/>
-              </a:rPr>
-              <a:t> </a:t>
-            </a:r>
-            <a:r>
-              <a:rPr lang="en-IN" sz="2000" b="0" dirty="0">
-                <a:solidFill>
-                  <a:srgbClr val="B5CEA8"/>
-                </a:solidFill>
-                <a:effectLst/>
-                <a:latin typeface="Consolas" panose="020B0609020204030204" pitchFamily="49" charset="0"/>
-              </a:rPr>
-              <a:t>41999</a:t>
-            </a:r>
-            <a:r>
-              <a:rPr lang="en-IN" sz="2000" b="0" dirty="0">
-                <a:solidFill>
-                  <a:srgbClr val="DCDCDC"/>
-                </a:solidFill>
-                <a:effectLst/>
-                <a:latin typeface="Consolas" panose="020B0609020204030204" pitchFamily="49" charset="0"/>
-              </a:rPr>
-              <a:t>,</a:t>
-            </a:r>
-            <a:endParaRPr lang="en-IN" sz="2000" b="0" dirty="0">
-              <a:solidFill>
-                <a:srgbClr val="D4D4D4"/>
-              </a:solidFill>
-              <a:effectLst/>
-              <a:latin typeface="Consolas" panose="020B0609020204030204" pitchFamily="49" charset="0"/>
-            </a:endParaRPr>
-          </a:p>
-          <a:p>
-            <a:r>
-              <a:rPr lang="en-IN" sz="2000" b="0" dirty="0">
-                <a:solidFill>
-                  <a:srgbClr val="D4D4D4"/>
-                </a:solidFill>
-                <a:effectLst/>
-                <a:latin typeface="Consolas" panose="020B0609020204030204" pitchFamily="49" charset="0"/>
-              </a:rPr>
-              <a:t>            </a:t>
-            </a:r>
-            <a:r>
-              <a:rPr lang="en-IN" sz="2000" b="0" dirty="0">
-                <a:solidFill>
-                  <a:srgbClr val="9CDCFE"/>
-                </a:solidFill>
-                <a:effectLst/>
-                <a:latin typeface="Consolas" panose="020B0609020204030204" pitchFamily="49" charset="0"/>
-              </a:rPr>
-              <a:t>"productCoverImage"</a:t>
-            </a:r>
-            <a:r>
-              <a:rPr lang="en-IN" sz="2000" b="0" dirty="0">
-                <a:solidFill>
-                  <a:srgbClr val="DCDCDC"/>
-                </a:solidFill>
-                <a:effectLst/>
-                <a:latin typeface="Consolas" panose="020B0609020204030204" pitchFamily="49" charset="0"/>
-              </a:rPr>
-              <a:t>:</a:t>
-            </a:r>
-            <a:r>
-              <a:rPr lang="en-IN" sz="2000" b="0" dirty="0">
-                <a:solidFill>
-                  <a:srgbClr val="D4D4D4"/>
-                </a:solidFill>
-                <a:effectLst/>
-                <a:latin typeface="Consolas" panose="020B0609020204030204" pitchFamily="49" charset="0"/>
-              </a:rPr>
-              <a:t> </a:t>
-            </a:r>
-            <a:r>
-              <a:rPr lang="en-IN" sz="2000" b="0" dirty="0">
-                <a:solidFill>
-                  <a:srgbClr val="CE9178"/>
-                </a:solidFill>
-                <a:effectLst/>
-                <a:latin typeface="Consolas" panose="020B0609020204030204" pitchFamily="49" charset="0"/>
-              </a:rPr>
-              <a:t>"https://storage.googleapis.com/lexa-product-covers/oneplus8glacialgreen.jpg"</a:t>
-            </a:r>
-            <a:r>
-              <a:rPr lang="en-IN" sz="2000" b="0" dirty="0">
-                <a:solidFill>
-                  <a:srgbClr val="DCDCDC"/>
-                </a:solidFill>
-                <a:effectLst/>
-                <a:latin typeface="Consolas" panose="020B0609020204030204" pitchFamily="49" charset="0"/>
-              </a:rPr>
-              <a:t>,</a:t>
-            </a:r>
-            <a:endParaRPr lang="en-IN" sz="2000" b="0" dirty="0">
-              <a:solidFill>
-                <a:srgbClr val="D4D4D4"/>
-              </a:solidFill>
-              <a:effectLst/>
-              <a:latin typeface="Consolas" panose="020B0609020204030204" pitchFamily="49" charset="0"/>
-            </a:endParaRPr>
-          </a:p>
-          <a:p>
-            <a:r>
-              <a:rPr lang="en-IN" sz="2000" b="0" dirty="0">
-                <a:solidFill>
-                  <a:srgbClr val="D4D4D4"/>
-                </a:solidFill>
-                <a:effectLst/>
-                <a:latin typeface="Consolas" panose="020B0609020204030204" pitchFamily="49" charset="0"/>
-              </a:rPr>
-              <a:t>            </a:t>
-            </a:r>
-            <a:r>
-              <a:rPr lang="en-IN" sz="2000" b="0" dirty="0">
-                <a:solidFill>
-                  <a:srgbClr val="9CDCFE"/>
-                </a:solidFill>
-                <a:effectLst/>
-                <a:latin typeface="Consolas" panose="020B0609020204030204" pitchFamily="49" charset="0"/>
-              </a:rPr>
-              <a:t>"id"</a:t>
-            </a:r>
-            <a:r>
-              <a:rPr lang="en-IN" sz="2000" b="0" dirty="0">
-                <a:solidFill>
-                  <a:srgbClr val="DCDCDC"/>
-                </a:solidFill>
-                <a:effectLst/>
-                <a:latin typeface="Consolas" panose="020B0609020204030204" pitchFamily="49" charset="0"/>
-              </a:rPr>
-              <a:t>:</a:t>
-            </a:r>
-            <a:r>
-              <a:rPr lang="en-IN" sz="2000" b="0" dirty="0">
-                <a:solidFill>
-                  <a:srgbClr val="D4D4D4"/>
-                </a:solidFill>
-                <a:effectLst/>
-                <a:latin typeface="Consolas" panose="020B0609020204030204" pitchFamily="49" charset="0"/>
-              </a:rPr>
-              <a:t> </a:t>
-            </a:r>
-            <a:r>
-              <a:rPr lang="en-IN" sz="2000" b="0" dirty="0">
-                <a:solidFill>
-                  <a:srgbClr val="CE9178"/>
-                </a:solidFill>
-                <a:effectLst/>
-                <a:latin typeface="Consolas" panose="020B0609020204030204" pitchFamily="49" charset="0"/>
-              </a:rPr>
-              <a:t>"5f47986c87c2644624079997"</a:t>
-            </a:r>
-            <a:r>
-              <a:rPr lang="en-IN" sz="2000" b="0" dirty="0">
-                <a:solidFill>
-                  <a:srgbClr val="DCDCDC"/>
-                </a:solidFill>
-                <a:effectLst/>
-                <a:latin typeface="Consolas" panose="020B0609020204030204" pitchFamily="49" charset="0"/>
-              </a:rPr>
-              <a:t>},{</a:t>
-            </a:r>
-            <a:endParaRPr lang="en-IN" sz="2000" b="0" dirty="0">
-              <a:solidFill>
-                <a:srgbClr val="D4D4D4"/>
-              </a:solidFill>
-              <a:effectLst/>
-              <a:latin typeface="Consolas" panose="020B0609020204030204" pitchFamily="49" charset="0"/>
-            </a:endParaRPr>
-          </a:p>
-          <a:p>
-            <a:r>
-              <a:rPr lang="en-IN" sz="2000" b="0" dirty="0">
-                <a:solidFill>
-                  <a:srgbClr val="D4D4D4"/>
-                </a:solidFill>
-                <a:effectLst/>
-                <a:latin typeface="Consolas" panose="020B0609020204030204" pitchFamily="49" charset="0"/>
-              </a:rPr>
-              <a:t>            </a:t>
-            </a:r>
-            <a:r>
-              <a:rPr lang="en-IN" sz="2000" b="0" dirty="0">
-                <a:solidFill>
-                  <a:srgbClr val="9CDCFE"/>
-                </a:solidFill>
-                <a:effectLst/>
-                <a:latin typeface="Consolas" panose="020B0609020204030204" pitchFamily="49" charset="0"/>
-              </a:rPr>
-              <a:t>"_id"</a:t>
-            </a:r>
-            <a:r>
-              <a:rPr lang="en-IN" sz="2000" b="0" dirty="0">
-                <a:solidFill>
-                  <a:srgbClr val="DCDCDC"/>
-                </a:solidFill>
-                <a:effectLst/>
-                <a:latin typeface="Consolas" panose="020B0609020204030204" pitchFamily="49" charset="0"/>
-              </a:rPr>
-              <a:t>:</a:t>
-            </a:r>
-            <a:r>
-              <a:rPr lang="en-IN" sz="2000" b="0" dirty="0">
-                <a:solidFill>
-                  <a:srgbClr val="D4D4D4"/>
-                </a:solidFill>
-                <a:effectLst/>
-                <a:latin typeface="Consolas" panose="020B0609020204030204" pitchFamily="49" charset="0"/>
-              </a:rPr>
-              <a:t> </a:t>
-            </a:r>
-            <a:r>
-              <a:rPr lang="en-IN" sz="2000" b="0" dirty="0">
-                <a:solidFill>
-                  <a:srgbClr val="CE9178"/>
-                </a:solidFill>
-                <a:effectLst/>
-                <a:latin typeface="Consolas" panose="020B0609020204030204" pitchFamily="49" charset="0"/>
-              </a:rPr>
-              <a:t>"5f479cdc87c2644624079998"</a:t>
-            </a:r>
-            <a:r>
-              <a:rPr lang="en-IN" sz="2000" b="0" dirty="0">
-                <a:solidFill>
-                  <a:srgbClr val="DCDCDC"/>
-                </a:solidFill>
-                <a:effectLst/>
-                <a:latin typeface="Consolas" panose="020B0609020204030204" pitchFamily="49" charset="0"/>
-              </a:rPr>
-              <a:t>,</a:t>
-            </a:r>
-            <a:endParaRPr lang="en-IN" sz="2000" b="0" dirty="0">
-              <a:solidFill>
-                <a:srgbClr val="D4D4D4"/>
-              </a:solidFill>
-              <a:effectLst/>
-              <a:latin typeface="Consolas" panose="020B0609020204030204" pitchFamily="49" charset="0"/>
-            </a:endParaRPr>
-          </a:p>
-          <a:p>
-            <a:r>
-              <a:rPr lang="en-IN" sz="2000" b="0" dirty="0">
-                <a:solidFill>
-                  <a:srgbClr val="D4D4D4"/>
-                </a:solidFill>
-                <a:effectLst/>
-                <a:latin typeface="Consolas" panose="020B0609020204030204" pitchFamily="49" charset="0"/>
-              </a:rPr>
-              <a:t>            </a:t>
-            </a:r>
-            <a:r>
-              <a:rPr lang="en-IN" sz="2000" b="0" dirty="0">
-                <a:solidFill>
-                  <a:srgbClr val="9CDCFE"/>
-                </a:solidFill>
-                <a:effectLst/>
-                <a:latin typeface="Consolas" panose="020B0609020204030204" pitchFamily="49" charset="0"/>
-              </a:rPr>
-              <a:t>"productName"</a:t>
-            </a:r>
-            <a:r>
-              <a:rPr lang="en-IN" sz="2000" b="0" dirty="0">
-                <a:solidFill>
-                  <a:srgbClr val="DCDCDC"/>
-                </a:solidFill>
-                <a:effectLst/>
-                <a:latin typeface="Consolas" panose="020B0609020204030204" pitchFamily="49" charset="0"/>
-              </a:rPr>
-              <a:t>:</a:t>
-            </a:r>
-            <a:r>
-              <a:rPr lang="en-IN" sz="2000" b="0" dirty="0">
-                <a:solidFill>
-                  <a:srgbClr val="D4D4D4"/>
-                </a:solidFill>
-                <a:effectLst/>
-                <a:latin typeface="Consolas" panose="020B0609020204030204" pitchFamily="49" charset="0"/>
-              </a:rPr>
-              <a:t> </a:t>
-            </a:r>
-            <a:r>
-              <a:rPr lang="en-IN" sz="2000" b="0" dirty="0">
-                <a:solidFill>
-                  <a:srgbClr val="CE9178"/>
-                </a:solidFill>
-                <a:effectLst/>
-                <a:latin typeface="Consolas" panose="020B0609020204030204" pitchFamily="49" charset="0"/>
-              </a:rPr>
-              <a:t>"Apple iPhone 11 (64GB) - Black"</a:t>
-            </a:r>
-            <a:r>
-              <a:rPr lang="en-IN" sz="2000" b="0" dirty="0">
-                <a:solidFill>
-                  <a:srgbClr val="DCDCDC"/>
-                </a:solidFill>
-                <a:effectLst/>
-                <a:latin typeface="Consolas" panose="020B0609020204030204" pitchFamily="49" charset="0"/>
-              </a:rPr>
-              <a:t>,</a:t>
-            </a:r>
-            <a:endParaRPr lang="en-IN" sz="2000" b="0" dirty="0">
-              <a:solidFill>
-                <a:srgbClr val="D4D4D4"/>
-              </a:solidFill>
-              <a:effectLst/>
-              <a:latin typeface="Consolas" panose="020B0609020204030204" pitchFamily="49" charset="0"/>
-            </a:endParaRPr>
-          </a:p>
-          <a:p>
-            <a:r>
-              <a:rPr lang="en-IN" sz="2000" b="0" dirty="0">
-                <a:solidFill>
-                  <a:srgbClr val="D4D4D4"/>
-                </a:solidFill>
-                <a:effectLst/>
-                <a:latin typeface="Consolas" panose="020B0609020204030204" pitchFamily="49" charset="0"/>
-              </a:rPr>
-              <a:t>            </a:t>
-            </a:r>
-            <a:r>
-              <a:rPr lang="en-IN" sz="2000" b="0" dirty="0">
-                <a:solidFill>
-                  <a:srgbClr val="9CDCFE"/>
-                </a:solidFill>
-                <a:effectLst/>
-                <a:latin typeface="Consolas" panose="020B0609020204030204" pitchFamily="49" charset="0"/>
-              </a:rPr>
-              <a:t>"categoryId"</a:t>
-            </a:r>
-            <a:r>
-              <a:rPr lang="en-IN" sz="2000" b="0" dirty="0">
-                <a:solidFill>
-                  <a:srgbClr val="DCDCDC"/>
-                </a:solidFill>
-                <a:effectLst/>
-                <a:latin typeface="Consolas" panose="020B0609020204030204" pitchFamily="49" charset="0"/>
-              </a:rPr>
-              <a:t>:</a:t>
-            </a:r>
-            <a:r>
-              <a:rPr lang="en-IN" sz="2000" b="0" dirty="0">
-                <a:solidFill>
-                  <a:srgbClr val="D4D4D4"/>
-                </a:solidFill>
-                <a:effectLst/>
-                <a:latin typeface="Consolas" panose="020B0609020204030204" pitchFamily="49" charset="0"/>
-              </a:rPr>
-              <a:t> </a:t>
-            </a:r>
-            <a:r>
-              <a:rPr lang="en-IN" sz="2000" b="0" dirty="0">
-                <a:solidFill>
-                  <a:srgbClr val="CE9178"/>
-                </a:solidFill>
-                <a:effectLst/>
-                <a:latin typeface="Consolas" panose="020B0609020204030204" pitchFamily="49" charset="0"/>
-              </a:rPr>
-              <a:t>"5f45937abd14352638c6e791"</a:t>
-            </a:r>
-            <a:r>
-              <a:rPr lang="en-IN" sz="2000" b="0" dirty="0">
-                <a:solidFill>
-                  <a:srgbClr val="DCDCDC"/>
-                </a:solidFill>
-                <a:effectLst/>
-                <a:latin typeface="Consolas" panose="020B0609020204030204" pitchFamily="49" charset="0"/>
-              </a:rPr>
-              <a:t>,</a:t>
-            </a:r>
-            <a:endParaRPr lang="en-IN" sz="2000" b="0" dirty="0">
-              <a:solidFill>
-                <a:srgbClr val="D4D4D4"/>
-              </a:solidFill>
-              <a:effectLst/>
-              <a:latin typeface="Consolas" panose="020B0609020204030204" pitchFamily="49" charset="0"/>
-            </a:endParaRPr>
-          </a:p>
-          <a:p>
-            <a:r>
-              <a:rPr lang="en-IN" sz="2000" b="0" dirty="0">
-                <a:solidFill>
-                  <a:srgbClr val="D4D4D4"/>
-                </a:solidFill>
-                <a:effectLst/>
-                <a:latin typeface="Consolas" panose="020B0609020204030204" pitchFamily="49" charset="0"/>
-              </a:rPr>
-              <a:t>            </a:t>
-            </a:r>
-            <a:r>
-              <a:rPr lang="en-IN" sz="2000" b="0" dirty="0">
-                <a:solidFill>
-                  <a:srgbClr val="9CDCFE"/>
-                </a:solidFill>
-                <a:effectLst/>
-                <a:latin typeface="Consolas" panose="020B0609020204030204" pitchFamily="49" charset="0"/>
-              </a:rPr>
-              <a:t>"productPrice"</a:t>
-            </a:r>
-            <a:r>
-              <a:rPr lang="en-IN" sz="2000" b="0" dirty="0">
-                <a:solidFill>
-                  <a:srgbClr val="DCDCDC"/>
-                </a:solidFill>
-                <a:effectLst/>
-                <a:latin typeface="Consolas" panose="020B0609020204030204" pitchFamily="49" charset="0"/>
-              </a:rPr>
-              <a:t>:</a:t>
-            </a:r>
-            <a:r>
-              <a:rPr lang="en-IN" sz="2000" b="0" dirty="0">
-                <a:solidFill>
-                  <a:srgbClr val="D4D4D4"/>
-                </a:solidFill>
-                <a:effectLst/>
-                <a:latin typeface="Consolas" panose="020B0609020204030204" pitchFamily="49" charset="0"/>
-              </a:rPr>
-              <a:t> </a:t>
-            </a:r>
-            <a:r>
-              <a:rPr lang="en-IN" sz="2000" b="0" dirty="0">
-                <a:solidFill>
-                  <a:srgbClr val="B5CEA8"/>
-                </a:solidFill>
-                <a:effectLst/>
-                <a:latin typeface="Consolas" panose="020B0609020204030204" pitchFamily="49" charset="0"/>
-              </a:rPr>
-              <a:t>68300</a:t>
-            </a:r>
-            <a:r>
-              <a:rPr lang="en-IN" sz="2000" b="0" dirty="0">
-                <a:solidFill>
-                  <a:srgbClr val="DCDCDC"/>
-                </a:solidFill>
-                <a:effectLst/>
-                <a:latin typeface="Consolas" panose="020B0609020204030204" pitchFamily="49" charset="0"/>
-              </a:rPr>
-              <a:t>,</a:t>
-            </a:r>
-            <a:endParaRPr lang="en-IN" sz="2000" b="0" dirty="0">
-              <a:solidFill>
-                <a:srgbClr val="D4D4D4"/>
-              </a:solidFill>
-              <a:effectLst/>
-              <a:latin typeface="Consolas" panose="020B0609020204030204" pitchFamily="49" charset="0"/>
-            </a:endParaRPr>
-          </a:p>
-          <a:p>
-            <a:r>
-              <a:rPr lang="en-IN" sz="2000" b="0" dirty="0">
-                <a:solidFill>
-                  <a:srgbClr val="D4D4D4"/>
-                </a:solidFill>
-                <a:effectLst/>
-                <a:latin typeface="Consolas" panose="020B0609020204030204" pitchFamily="49" charset="0"/>
-              </a:rPr>
-              <a:t>            </a:t>
-            </a:r>
-            <a:r>
-              <a:rPr lang="en-IN" sz="2000" b="0" dirty="0">
-                <a:solidFill>
-                  <a:srgbClr val="9CDCFE"/>
-                </a:solidFill>
-                <a:effectLst/>
-                <a:latin typeface="Consolas" panose="020B0609020204030204" pitchFamily="49" charset="0"/>
-              </a:rPr>
-              <a:t>"productCoverImage"</a:t>
-            </a:r>
-            <a:r>
-              <a:rPr lang="en-IN" sz="2000" b="0" dirty="0">
-                <a:solidFill>
-                  <a:srgbClr val="DCDCDC"/>
-                </a:solidFill>
-                <a:effectLst/>
-                <a:latin typeface="Consolas" panose="020B0609020204030204" pitchFamily="49" charset="0"/>
-              </a:rPr>
-              <a:t>:</a:t>
-            </a:r>
-            <a:r>
-              <a:rPr lang="en-IN" sz="2000" b="0" dirty="0">
-                <a:solidFill>
-                  <a:srgbClr val="D4D4D4"/>
-                </a:solidFill>
-                <a:effectLst/>
-                <a:latin typeface="Consolas" panose="020B0609020204030204" pitchFamily="49" charset="0"/>
-              </a:rPr>
-              <a:t> </a:t>
-            </a:r>
-            <a:r>
-              <a:rPr lang="en-IN" sz="2000" b="0" dirty="0">
-                <a:solidFill>
-                  <a:srgbClr val="CE9178"/>
-                </a:solidFill>
-                <a:effectLst/>
-                <a:latin typeface="Consolas" panose="020B0609020204030204" pitchFamily="49" charset="0"/>
-              </a:rPr>
-              <a:t>"https://storage.googleapis.com/lexa-product-covers/iphone11.jpg"</a:t>
-            </a:r>
-            <a:r>
-              <a:rPr lang="en-IN" sz="2000" b="0" dirty="0">
-                <a:solidFill>
-                  <a:srgbClr val="DCDCDC"/>
-                </a:solidFill>
-                <a:effectLst/>
-                <a:latin typeface="Consolas" panose="020B0609020204030204" pitchFamily="49" charset="0"/>
-              </a:rPr>
-              <a:t>,</a:t>
-            </a:r>
-            <a:endParaRPr lang="en-IN" sz="2000" b="0" dirty="0">
-              <a:solidFill>
-                <a:srgbClr val="D4D4D4"/>
-              </a:solidFill>
-              <a:effectLst/>
-              <a:latin typeface="Consolas" panose="020B0609020204030204" pitchFamily="49" charset="0"/>
-            </a:endParaRPr>
-          </a:p>
-          <a:p>
-            <a:r>
-              <a:rPr lang="en-IN" sz="2000" b="0" dirty="0">
-                <a:solidFill>
-                  <a:srgbClr val="D4D4D4"/>
-                </a:solidFill>
-                <a:effectLst/>
-                <a:latin typeface="Consolas" panose="020B0609020204030204" pitchFamily="49" charset="0"/>
-              </a:rPr>
-              <a:t>            </a:t>
-            </a:r>
-            <a:r>
-              <a:rPr lang="en-IN" sz="2000" b="0" dirty="0">
-                <a:solidFill>
-                  <a:srgbClr val="9CDCFE"/>
-                </a:solidFill>
-                <a:effectLst/>
-                <a:latin typeface="Consolas" panose="020B0609020204030204" pitchFamily="49" charset="0"/>
-              </a:rPr>
-              <a:t>"id"</a:t>
-            </a:r>
-            <a:r>
-              <a:rPr lang="en-IN" sz="2000" b="0" dirty="0">
-                <a:solidFill>
-                  <a:srgbClr val="DCDCDC"/>
-                </a:solidFill>
-                <a:effectLst/>
-                <a:latin typeface="Consolas" panose="020B0609020204030204" pitchFamily="49" charset="0"/>
-              </a:rPr>
-              <a:t>:</a:t>
-            </a:r>
-            <a:r>
-              <a:rPr lang="en-IN" sz="2000" b="0" dirty="0">
-                <a:solidFill>
-                  <a:srgbClr val="D4D4D4"/>
-                </a:solidFill>
-                <a:effectLst/>
-                <a:latin typeface="Consolas" panose="020B0609020204030204" pitchFamily="49" charset="0"/>
-              </a:rPr>
-              <a:t> </a:t>
-            </a:r>
-            <a:r>
-              <a:rPr lang="en-IN" sz="2000" b="0" dirty="0">
-                <a:solidFill>
-                  <a:srgbClr val="CE9178"/>
-                </a:solidFill>
-                <a:effectLst/>
-                <a:latin typeface="Consolas" panose="020B0609020204030204" pitchFamily="49" charset="0"/>
-              </a:rPr>
-              <a:t>"5f479cdc87c2644624079998"</a:t>
-            </a:r>
-            <a:r>
-              <a:rPr lang="en-IN" sz="2000" b="0" dirty="0">
-                <a:solidFill>
-                  <a:srgbClr val="DCDCDC"/>
-                </a:solidFill>
-                <a:effectLst/>
-                <a:latin typeface="Consolas" panose="020B0609020204030204" pitchFamily="49" charset="0"/>
-              </a:rPr>
-              <a:t>}]}</a:t>
-            </a:r>
-            <a:endParaRPr lang="en-IN" sz="2000" b="0" dirty="0">
-              <a:solidFill>
-                <a:srgbClr val="D4D4D4"/>
-              </a:solidFill>
-              <a:effectLst/>
-              <a:latin typeface="Consolas" panose="020B0609020204030204" pitchFamily="49" charset="0"/>
-            </a:endParaRPr>
-          </a:p>
-          <a:p>
             <a:endParaRPr lang="en-IN" dirty="0"/>
           </a:p>
         </p:txBody>
       </p:sp>
+      <p:pic>
+        <p:nvPicPr>
+          <p:cNvPr id="5" name="Picture 4">
+            <a:extLst>
+              <a:ext uri="{FF2B5EF4-FFF2-40B4-BE49-F238E27FC236}">
+                <a16:creationId xmlns:a16="http://schemas.microsoft.com/office/drawing/2014/main" id="{E00E12FB-41DC-4E83-B281-83F1C8B33F98}"/>
+              </a:ext>
+            </a:extLst>
+          </p:cNvPr>
+          <p:cNvPicPr>
+            <a:picLocks noChangeAspect="1"/>
+          </p:cNvPicPr>
+          <p:nvPr/>
+        </p:nvPicPr>
+        <p:blipFill>
+          <a:blip r:embed="rId3">
+            <a:extLst>
+              <a:ext uri="{28A0092B-C50C-407E-A947-70E740481C1C}">
+                <a14:useLocalDpi xmlns:a14="http://schemas.microsoft.com/office/drawing/2010/main" val="0"/>
+              </a:ext>
+            </a:extLst>
+          </a:blip>
+          <a:stretch>
+            <a:fillRect/>
+          </a:stretch>
+        </p:blipFill>
+        <p:spPr>
+          <a:xfrm>
+            <a:off x="361233" y="1636865"/>
+            <a:ext cx="11296933" cy="5058997"/>
+          </a:xfrm>
+          <a:prstGeom prst="rect">
+            <a:avLst/>
+          </a:prstGeom>
+        </p:spPr>
+      </p:pic>
     </p:spTree>
     <p:extLst>
       <p:ext uri="{BB962C8B-B14F-4D97-AF65-F5344CB8AC3E}">
         <p14:creationId xmlns:p14="http://schemas.microsoft.com/office/powerpoint/2010/main" val="2535831858"/>
+      </p:ext>
+    </p:extLst>
+  </p:cSld>
+  <p:clrMapOvr>
+    <a:masterClrMapping/>
+  </p:clrMapOvr>
+</p:sld>
+</file>
+
+<file path=ppt/slides/slide6.xml><?xml version="1.0" encoding="utf-8"?>
+<p:sld xmlns:a="http://schemas.openxmlformats.org/drawingml/2006/main" xmlns:r="http://schemas.openxmlformats.org/officeDocument/2006/relationships" xmlns:p="http://schemas.openxmlformats.org/presentationml/2006/main">
+  <p:cSld>
+    <p:spTree>
+      <p:nvGrpSpPr>
+        <p:cNvPr id="1" name=""/>
+        <p:cNvGrpSpPr/>
+        <p:nvPr/>
+      </p:nvGrpSpPr>
+      <p:grpSpPr>
+        <a:xfrm>
+          <a:off x="0" y="0"/>
+          <a:ext cx="0" cy="0"/>
+          <a:chOff x="0" y="0"/>
+          <a:chExt cx="0" cy="0"/>
+        </a:xfrm>
+      </p:grpSpPr>
+      <p:sp>
+        <p:nvSpPr>
+          <p:cNvPr id="2" name="Title 1">
+            <a:extLst>
+              <a:ext uri="{FF2B5EF4-FFF2-40B4-BE49-F238E27FC236}">
+                <a16:creationId xmlns:a16="http://schemas.microsoft.com/office/drawing/2014/main" id="{D3946D28-2227-4AAE-A85B-06F28D40D685}"/>
+              </a:ext>
+            </a:extLst>
+          </p:cNvPr>
+          <p:cNvSpPr>
+            <a:spLocks noGrp="1"/>
+          </p:cNvSpPr>
+          <p:nvPr>
+            <p:ph type="title"/>
+          </p:nvPr>
+        </p:nvSpPr>
+        <p:spPr>
+          <a:xfrm>
+            <a:off x="685801" y="609601"/>
+            <a:ext cx="8335369" cy="291152"/>
+          </a:xfrm>
+        </p:spPr>
+        <p:txBody>
+          <a:bodyPr>
+            <a:noAutofit/>
+          </a:bodyPr>
+          <a:lstStyle/>
+          <a:p>
+            <a:pPr>
+              <a:lnSpc>
+                <a:spcPct val="107000"/>
+              </a:lnSpc>
+              <a:spcAft>
+                <a:spcPts val="800"/>
+              </a:spcAft>
+            </a:pPr>
+            <a:r>
+              <a:rPr lang="en-IN" sz="1800" dirty="0">
+                <a:effectLst/>
+                <a:latin typeface="Times New Roman" panose="02020603050405020304" pitchFamily="18" charset="0"/>
+                <a:ea typeface="Calibri" panose="020F0502020204030204" pitchFamily="34" charset="0"/>
+                <a:cs typeface="Times New Roman" panose="02020603050405020304" pitchFamily="18" charset="0"/>
+              </a:rPr>
+              <a:t>GET Product by Id or Individual (METHOD: GET)</a:t>
+            </a:r>
+            <a:br>
+              <a:rPr lang="en-IN" sz="1800" dirty="0">
+                <a:effectLst/>
+                <a:latin typeface="Calibri" panose="020F0502020204030204" pitchFamily="34" charset="0"/>
+                <a:ea typeface="Calibri" panose="020F0502020204030204" pitchFamily="34" charset="0"/>
+                <a:cs typeface="Times New Roman" panose="02020603050405020304" pitchFamily="18" charset="0"/>
+              </a:rPr>
+            </a:br>
+            <a:br>
+              <a:rPr lang="en-IN" sz="1800" dirty="0">
+                <a:effectLst/>
+                <a:latin typeface="Calibri" panose="020F0502020204030204" pitchFamily="34" charset="0"/>
+                <a:ea typeface="Calibri" panose="020F0502020204030204" pitchFamily="34" charset="0"/>
+                <a:cs typeface="Times New Roman" panose="02020603050405020304" pitchFamily="18" charset="0"/>
+              </a:rPr>
+            </a:br>
+            <a:endParaRPr lang="en-IN" sz="1800" dirty="0"/>
+          </a:p>
+        </p:txBody>
+      </p:sp>
+      <p:sp>
+        <p:nvSpPr>
+          <p:cNvPr id="3" name="Content Placeholder 2">
+            <a:extLst>
+              <a:ext uri="{FF2B5EF4-FFF2-40B4-BE49-F238E27FC236}">
+                <a16:creationId xmlns:a16="http://schemas.microsoft.com/office/drawing/2014/main" id="{C42C7462-1411-41A8-8D27-AC66554FC052}"/>
+              </a:ext>
+            </a:extLst>
+          </p:cNvPr>
+          <p:cNvSpPr>
+            <a:spLocks noGrp="1"/>
+          </p:cNvSpPr>
+          <p:nvPr>
+            <p:ph idx="1"/>
+          </p:nvPr>
+        </p:nvSpPr>
+        <p:spPr>
+          <a:xfrm>
+            <a:off x="685801" y="605052"/>
+            <a:ext cx="6892120" cy="1301086"/>
+          </a:xfrm>
+        </p:spPr>
+        <p:txBody>
+          <a:bodyPr/>
+          <a:lstStyle/>
+          <a:p>
+            <a:r>
+              <a:rPr lang="en-IN" sz="1100" dirty="0">
+                <a:effectLst/>
+                <a:latin typeface="Times New Roman" panose="02020603050405020304" pitchFamily="18" charset="0"/>
+                <a:ea typeface="Calibri" panose="020F0502020204030204" pitchFamily="34" charset="0"/>
+                <a:cs typeface="Times New Roman" panose="02020603050405020304" pitchFamily="18" charset="0"/>
+              </a:rPr>
+              <a:t>Gets Complete detail about the product through virtual fields.</a:t>
+            </a:r>
+            <a:endParaRPr lang="en-IN" sz="1100" dirty="0">
+              <a:latin typeface="Calibri" panose="020F0502020204030204" pitchFamily="34" charset="0"/>
+              <a:ea typeface="Calibri" panose="020F0502020204030204" pitchFamily="34" charset="0"/>
+              <a:cs typeface="Times New Roman" panose="02020603050405020304" pitchFamily="18" charset="0"/>
+            </a:endParaRPr>
+          </a:p>
+          <a:p>
+            <a:r>
+              <a:rPr lang="en-IN" sz="1100" dirty="0">
+                <a:effectLst/>
+                <a:latin typeface="Times New Roman" panose="02020603050405020304" pitchFamily="18" charset="0"/>
+                <a:ea typeface="Calibri" panose="020F0502020204030204" pitchFamily="34" charset="0"/>
+                <a:cs typeface="Times New Roman" panose="02020603050405020304" pitchFamily="18" charset="0"/>
+              </a:rPr>
+              <a:t>This route gets different sets of data through reference.</a:t>
+            </a:r>
+            <a:endParaRPr lang="en-IN" sz="1100" dirty="0">
+              <a:latin typeface="Calibri" panose="020F0502020204030204" pitchFamily="34" charset="0"/>
+              <a:ea typeface="Calibri" panose="020F0502020204030204" pitchFamily="34" charset="0"/>
+              <a:cs typeface="Times New Roman" panose="02020603050405020304" pitchFamily="18" charset="0"/>
+            </a:endParaRPr>
+          </a:p>
+          <a:p>
+            <a:r>
+              <a:rPr lang="en-IN" sz="1100" dirty="0">
+                <a:effectLst/>
+                <a:latin typeface="Times New Roman" panose="02020603050405020304" pitchFamily="18" charset="0"/>
+                <a:ea typeface="Calibri" panose="020F0502020204030204" pitchFamily="34" charset="0"/>
+                <a:cs typeface="Times New Roman" panose="02020603050405020304" pitchFamily="18" charset="0"/>
+              </a:rPr>
+              <a:t>Example</a:t>
+            </a:r>
+          </a:p>
+          <a:p>
+            <a:endParaRPr lang="en-IN" dirty="0"/>
+          </a:p>
+        </p:txBody>
+      </p:sp>
+      <p:pic>
+        <p:nvPicPr>
+          <p:cNvPr id="7" name="Picture 6">
+            <a:extLst>
+              <a:ext uri="{FF2B5EF4-FFF2-40B4-BE49-F238E27FC236}">
+                <a16:creationId xmlns:a16="http://schemas.microsoft.com/office/drawing/2014/main" id="{9BB8BF63-D7C8-4F56-B191-C9595864B67A}"/>
+              </a:ext>
+            </a:extLst>
+          </p:cNvPr>
+          <p:cNvPicPr>
+            <a:picLocks noChangeAspect="1"/>
+          </p:cNvPicPr>
+          <p:nvPr/>
+        </p:nvPicPr>
+        <p:blipFill>
+          <a:blip r:embed="rId2">
+            <a:extLst>
+              <a:ext uri="{28A0092B-C50C-407E-A947-70E740481C1C}">
+                <a14:useLocalDpi xmlns:a14="http://schemas.microsoft.com/office/drawing/2010/main" val="0"/>
+              </a:ext>
+            </a:extLst>
+          </a:blip>
+          <a:stretch>
+            <a:fillRect/>
+          </a:stretch>
+        </p:blipFill>
+        <p:spPr>
+          <a:xfrm>
+            <a:off x="299228" y="1487606"/>
+            <a:ext cx="11697154" cy="5226397"/>
+          </a:xfrm>
+          <a:prstGeom prst="rect">
+            <a:avLst/>
+          </a:prstGeom>
+        </p:spPr>
+      </p:pic>
+    </p:spTree>
+    <p:extLst>
+      <p:ext uri="{BB962C8B-B14F-4D97-AF65-F5344CB8AC3E}">
+        <p14:creationId xmlns:p14="http://schemas.microsoft.com/office/powerpoint/2010/main" val="2730626728"/>
       </p:ext>
     </p:extLst>
   </p:cSld>

</xml_diff>